<commit_message>
add var comps to manu
</commit_message>
<xml_diff>
--- a/manuscript/rafa-style-schematic-v1.pptx
+++ b/manuscript/rafa-style-schematic-v1.pptx
@@ -7,7 +7,8 @@
   <p:sldIdLst>
     <p:sldId id="256" r:id="rId2"/>
     <p:sldId id="258" r:id="rId3"/>
-    <p:sldId id="257" r:id="rId4"/>
+    <p:sldId id="259" r:id="rId4"/>
+    <p:sldId id="257" r:id="rId5"/>
   </p:sldIdLst>
   <p:sldSz cx="12192000" cy="6858000"/>
   <p:notesSz cx="6858000" cy="9144000"/>
@@ -261,7 +262,7 @@
           <a:p>
             <a:fld id="{C1479234-584E-4873-8CD3-B53B1333C3D5}" type="datetimeFigureOut">
               <a:rPr lang="en-US" smtClean="0"/>
-              <a:t>4/21/2021</a:t>
+              <a:t>4/28/2021</a:t>
             </a:fld>
             <a:endParaRPr lang="en-US"/>
           </a:p>
@@ -459,7 +460,7 @@
           <a:p>
             <a:fld id="{C1479234-584E-4873-8CD3-B53B1333C3D5}" type="datetimeFigureOut">
               <a:rPr lang="en-US" smtClean="0"/>
-              <a:t>4/21/2021</a:t>
+              <a:t>4/28/2021</a:t>
             </a:fld>
             <a:endParaRPr lang="en-US"/>
           </a:p>
@@ -667,7 +668,7 @@
           <a:p>
             <a:fld id="{C1479234-584E-4873-8CD3-B53B1333C3D5}" type="datetimeFigureOut">
               <a:rPr lang="en-US" smtClean="0"/>
-              <a:t>4/21/2021</a:t>
+              <a:t>4/28/2021</a:t>
             </a:fld>
             <a:endParaRPr lang="en-US"/>
           </a:p>
@@ -865,7 +866,7 @@
           <a:p>
             <a:fld id="{C1479234-584E-4873-8CD3-B53B1333C3D5}" type="datetimeFigureOut">
               <a:rPr lang="en-US" smtClean="0"/>
-              <a:t>4/21/2021</a:t>
+              <a:t>4/28/2021</a:t>
             </a:fld>
             <a:endParaRPr lang="en-US"/>
           </a:p>
@@ -1140,7 +1141,7 @@
           <a:p>
             <a:fld id="{C1479234-584E-4873-8CD3-B53B1333C3D5}" type="datetimeFigureOut">
               <a:rPr lang="en-US" smtClean="0"/>
-              <a:t>4/21/2021</a:t>
+              <a:t>4/28/2021</a:t>
             </a:fld>
             <a:endParaRPr lang="en-US"/>
           </a:p>
@@ -1405,7 +1406,7 @@
           <a:p>
             <a:fld id="{C1479234-584E-4873-8CD3-B53B1333C3D5}" type="datetimeFigureOut">
               <a:rPr lang="en-US" smtClean="0"/>
-              <a:t>4/21/2021</a:t>
+              <a:t>4/28/2021</a:t>
             </a:fld>
             <a:endParaRPr lang="en-US"/>
           </a:p>
@@ -1817,7 +1818,7 @@
           <a:p>
             <a:fld id="{C1479234-584E-4873-8CD3-B53B1333C3D5}" type="datetimeFigureOut">
               <a:rPr lang="en-US" smtClean="0"/>
-              <a:t>4/21/2021</a:t>
+              <a:t>4/28/2021</a:t>
             </a:fld>
             <a:endParaRPr lang="en-US"/>
           </a:p>
@@ -1958,7 +1959,7 @@
           <a:p>
             <a:fld id="{C1479234-584E-4873-8CD3-B53B1333C3D5}" type="datetimeFigureOut">
               <a:rPr lang="en-US" smtClean="0"/>
-              <a:t>4/21/2021</a:t>
+              <a:t>4/28/2021</a:t>
             </a:fld>
             <a:endParaRPr lang="en-US"/>
           </a:p>
@@ -2071,7 +2072,7 @@
           <a:p>
             <a:fld id="{C1479234-584E-4873-8CD3-B53B1333C3D5}" type="datetimeFigureOut">
               <a:rPr lang="en-US" smtClean="0"/>
-              <a:t>4/21/2021</a:t>
+              <a:t>4/28/2021</a:t>
             </a:fld>
             <a:endParaRPr lang="en-US"/>
           </a:p>
@@ -2382,7 +2383,7 @@
           <a:p>
             <a:fld id="{C1479234-584E-4873-8CD3-B53B1333C3D5}" type="datetimeFigureOut">
               <a:rPr lang="en-US" smtClean="0"/>
-              <a:t>4/21/2021</a:t>
+              <a:t>4/28/2021</a:t>
             </a:fld>
             <a:endParaRPr lang="en-US"/>
           </a:p>
@@ -2670,7 +2671,7 @@
           <a:p>
             <a:fld id="{C1479234-584E-4873-8CD3-B53B1333C3D5}" type="datetimeFigureOut">
               <a:rPr lang="en-US" smtClean="0"/>
-              <a:t>4/21/2021</a:t>
+              <a:t>4/28/2021</a:t>
             </a:fld>
             <a:endParaRPr lang="en-US"/>
           </a:p>
@@ -2911,7 +2912,7 @@
           <a:p>
             <a:fld id="{C1479234-584E-4873-8CD3-B53B1333C3D5}" type="datetimeFigureOut">
               <a:rPr lang="en-US" smtClean="0"/>
-              <a:t>4/21/2021</a:t>
+              <a:t>4/28/2021</a:t>
             </a:fld>
             <a:endParaRPr lang="en-US"/>
           </a:p>
@@ -7969,6 +7970,2430 @@
 </file>
 
 <file path=ppt/slides/slide3.xml><?xml version="1.0" encoding="utf-8"?>
+<p:sld xmlns:a="http://schemas.openxmlformats.org/drawingml/2006/main" xmlns:r="http://schemas.openxmlformats.org/officeDocument/2006/relationships" xmlns:p="http://schemas.openxmlformats.org/presentationml/2006/main">
+  <p:cSld>
+    <p:spTree>
+      <p:nvGrpSpPr>
+        <p:cNvPr id="1" name=""/>
+        <p:cNvGrpSpPr/>
+        <p:nvPr/>
+      </p:nvGrpSpPr>
+      <p:grpSpPr>
+        <a:xfrm>
+          <a:off x="0" y="0"/>
+          <a:ext cx="0" cy="0"/>
+          <a:chOff x="0" y="0"/>
+          <a:chExt cx="0" cy="0"/>
+        </a:xfrm>
+      </p:grpSpPr>
+      <p:grpSp>
+        <p:nvGrpSpPr>
+          <p:cNvPr id="10" name="Group 9">
+            <a:extLst>
+              <a:ext uri="{FF2B5EF4-FFF2-40B4-BE49-F238E27FC236}">
+                <a16:creationId xmlns:a16="http://schemas.microsoft.com/office/drawing/2014/main" id="{31F9EB94-EEF6-4995-AF46-816DD46DC239}"/>
+              </a:ext>
+            </a:extLst>
+          </p:cNvPr>
+          <p:cNvGrpSpPr/>
+          <p:nvPr/>
+        </p:nvGrpSpPr>
+        <p:grpSpPr>
+          <a:xfrm>
+            <a:off x="-90829" y="405400"/>
+            <a:ext cx="11108856" cy="5976633"/>
+            <a:chOff x="-90829" y="405400"/>
+            <a:chExt cx="11108856" cy="5976633"/>
+          </a:xfrm>
+        </p:grpSpPr>
+        <p:sp>
+          <p:nvSpPr>
+            <p:cNvPr id="43" name="Rectangle 42">
+              <a:extLst>
+                <a:ext uri="{FF2B5EF4-FFF2-40B4-BE49-F238E27FC236}">
+                  <a16:creationId xmlns:a16="http://schemas.microsoft.com/office/drawing/2014/main" id="{BBBE6F46-2A42-4A8D-B1C1-E038B0C3D875}"/>
+                </a:ext>
+              </a:extLst>
+            </p:cNvPr>
+            <p:cNvSpPr/>
+            <p:nvPr/>
+          </p:nvSpPr>
+          <p:spPr>
+            <a:xfrm>
+              <a:off x="8292582" y="2809810"/>
+              <a:ext cx="2725445" cy="1880403"/>
+            </a:xfrm>
+            <a:prstGeom prst="rect">
+              <a:avLst/>
+            </a:prstGeom>
+            <a:solidFill>
+              <a:schemeClr val="accent3"/>
+            </a:solidFill>
+          </p:spPr>
+          <p:style>
+            <a:lnRef idx="2">
+              <a:schemeClr val="accent1">
+                <a:shade val="50000"/>
+              </a:schemeClr>
+            </a:lnRef>
+            <a:fillRef idx="1">
+              <a:schemeClr val="accent1"/>
+            </a:fillRef>
+            <a:effectRef idx="0">
+              <a:schemeClr val="accent1"/>
+            </a:effectRef>
+            <a:fontRef idx="minor">
+              <a:schemeClr val="lt1"/>
+            </a:fontRef>
+          </p:style>
+          <p:txBody>
+            <a:bodyPr rtlCol="0" anchor="ctr"/>
+            <a:lstStyle/>
+            <a:p>
+              <a:pPr algn="ctr"/>
+              <a:endParaRPr lang="en-US"/>
+            </a:p>
+          </p:txBody>
+        </p:sp>
+        <p:sp>
+          <p:nvSpPr>
+            <p:cNvPr id="6" name="TextBox 5">
+              <a:extLst>
+                <a:ext uri="{FF2B5EF4-FFF2-40B4-BE49-F238E27FC236}">
+                  <a16:creationId xmlns:a16="http://schemas.microsoft.com/office/drawing/2014/main" id="{21876E51-290C-4303-A6AD-0D8D552ADC8C}"/>
+                </a:ext>
+              </a:extLst>
+            </p:cNvPr>
+            <p:cNvSpPr txBox="1"/>
+            <p:nvPr/>
+          </p:nvSpPr>
+          <p:spPr>
+            <a:xfrm>
+              <a:off x="5483090" y="1738516"/>
+              <a:ext cx="2334485" cy="369332"/>
+            </a:xfrm>
+            <a:prstGeom prst="rect">
+              <a:avLst/>
+            </a:prstGeom>
+            <a:solidFill>
+              <a:schemeClr val="bg2">
+                <a:lumMod val="40000"/>
+                <a:lumOff val="60000"/>
+              </a:schemeClr>
+            </a:solidFill>
+          </p:spPr>
+          <p:txBody>
+            <a:bodyPr wrap="none" rtlCol="0">
+              <a:spAutoFit/>
+            </a:bodyPr>
+            <a:lstStyle/>
+            <a:p>
+              <a:r>
+                <a:rPr lang="en-US" dirty="0"/>
+                <a:t>Below-ground Biomass</a:t>
+              </a:r>
+            </a:p>
+          </p:txBody>
+        </p:sp>
+        <p:sp>
+          <p:nvSpPr>
+            <p:cNvPr id="7" name="TextBox 6">
+              <a:extLst>
+                <a:ext uri="{FF2B5EF4-FFF2-40B4-BE49-F238E27FC236}">
+                  <a16:creationId xmlns:a16="http://schemas.microsoft.com/office/drawing/2014/main" id="{4CBE0429-E328-4B03-9806-D12E4D5356C8}"/>
+                </a:ext>
+              </a:extLst>
+            </p:cNvPr>
+            <p:cNvSpPr txBox="1"/>
+            <p:nvPr/>
+          </p:nvSpPr>
+          <p:spPr>
+            <a:xfrm>
+              <a:off x="3425871" y="2863212"/>
+              <a:ext cx="1757661" cy="369332"/>
+            </a:xfrm>
+            <a:prstGeom prst="rect">
+              <a:avLst/>
+            </a:prstGeom>
+            <a:solidFill>
+              <a:schemeClr val="bg2">
+                <a:lumMod val="40000"/>
+                <a:lumOff val="60000"/>
+              </a:schemeClr>
+            </a:solidFill>
+          </p:spPr>
+          <p:txBody>
+            <a:bodyPr wrap="none" rtlCol="0">
+              <a:spAutoFit/>
+            </a:bodyPr>
+            <a:lstStyle/>
+            <a:p>
+              <a:r>
+                <a:rPr lang="en-US" dirty="0"/>
+                <a:t>Soil temperature</a:t>
+              </a:r>
+            </a:p>
+          </p:txBody>
+        </p:sp>
+        <p:sp>
+          <p:nvSpPr>
+            <p:cNvPr id="8" name="TextBox 7">
+              <a:extLst>
+                <a:ext uri="{FF2B5EF4-FFF2-40B4-BE49-F238E27FC236}">
+                  <a16:creationId xmlns:a16="http://schemas.microsoft.com/office/drawing/2014/main" id="{DE9C3297-30F2-4EDE-BBE3-90264159B724}"/>
+                </a:ext>
+              </a:extLst>
+            </p:cNvPr>
+            <p:cNvSpPr txBox="1"/>
+            <p:nvPr/>
+          </p:nvSpPr>
+          <p:spPr>
+            <a:xfrm>
+              <a:off x="9716285" y="2899601"/>
+              <a:ext cx="1183529" cy="369332"/>
+            </a:xfrm>
+            <a:prstGeom prst="rect">
+              <a:avLst/>
+            </a:prstGeom>
+            <a:solidFill>
+              <a:schemeClr val="bg2">
+                <a:lumMod val="40000"/>
+                <a:lumOff val="60000"/>
+              </a:schemeClr>
+            </a:solidFill>
+          </p:spPr>
+          <p:txBody>
+            <a:bodyPr wrap="none" rtlCol="0">
+              <a:spAutoFit/>
+            </a:bodyPr>
+            <a:lstStyle/>
+            <a:p>
+              <a:r>
+                <a:rPr lang="en-US" dirty="0"/>
+                <a:t>Soil N Pool</a:t>
+              </a:r>
+            </a:p>
+          </p:txBody>
+        </p:sp>
+        <p:sp>
+          <p:nvSpPr>
+            <p:cNvPr id="12" name="TextBox 11">
+              <a:extLst>
+                <a:ext uri="{FF2B5EF4-FFF2-40B4-BE49-F238E27FC236}">
+                  <a16:creationId xmlns:a16="http://schemas.microsoft.com/office/drawing/2014/main" id="{746B2C31-FA0B-46FE-8943-7254BCEF2D15}"/>
+                </a:ext>
+              </a:extLst>
+            </p:cNvPr>
+            <p:cNvSpPr txBox="1"/>
+            <p:nvPr/>
+          </p:nvSpPr>
+          <p:spPr>
+            <a:xfrm>
+              <a:off x="6218990" y="6012701"/>
+              <a:ext cx="1251496" cy="369332"/>
+            </a:xfrm>
+            <a:prstGeom prst="rect">
+              <a:avLst/>
+            </a:prstGeom>
+            <a:solidFill>
+              <a:schemeClr val="accent4"/>
+            </a:solidFill>
+          </p:spPr>
+          <p:txBody>
+            <a:bodyPr wrap="none" rtlCol="0">
+              <a:spAutoFit/>
+            </a:bodyPr>
+            <a:lstStyle/>
+            <a:p>
+              <a:r>
+                <a:rPr lang="en-US" dirty="0"/>
+                <a:t>Maize Yield</a:t>
+              </a:r>
+            </a:p>
+          </p:txBody>
+        </p:sp>
+        <p:sp>
+          <p:nvSpPr>
+            <p:cNvPr id="16" name="TextBox 15">
+              <a:extLst>
+                <a:ext uri="{FF2B5EF4-FFF2-40B4-BE49-F238E27FC236}">
+                  <a16:creationId xmlns:a16="http://schemas.microsoft.com/office/drawing/2014/main" id="{6EFC2D2F-82ED-4332-86E1-5D3DCB71E395}"/>
+                </a:ext>
+              </a:extLst>
+            </p:cNvPr>
+            <p:cNvSpPr txBox="1"/>
+            <p:nvPr/>
+          </p:nvSpPr>
+          <p:spPr>
+            <a:xfrm>
+              <a:off x="8778272" y="1733628"/>
+              <a:ext cx="1687257" cy="369332"/>
+            </a:xfrm>
+            <a:prstGeom prst="rect">
+              <a:avLst/>
+            </a:prstGeom>
+            <a:solidFill>
+              <a:schemeClr val="bg2">
+                <a:lumMod val="40000"/>
+                <a:lumOff val="60000"/>
+              </a:schemeClr>
+            </a:solidFill>
+          </p:spPr>
+          <p:txBody>
+            <a:bodyPr wrap="none" rtlCol="0">
+              <a:spAutoFit/>
+            </a:bodyPr>
+            <a:lstStyle/>
+            <a:p>
+              <a:r>
+                <a:rPr lang="en-US" dirty="0"/>
+                <a:t>Organic C and N</a:t>
+              </a:r>
+            </a:p>
+          </p:txBody>
+        </p:sp>
+        <p:sp>
+          <p:nvSpPr>
+            <p:cNvPr id="27" name="TextBox 26">
+              <a:extLst>
+                <a:ext uri="{FF2B5EF4-FFF2-40B4-BE49-F238E27FC236}">
+                  <a16:creationId xmlns:a16="http://schemas.microsoft.com/office/drawing/2014/main" id="{A8BF0BC3-B10A-4BC5-9397-D880332680E1}"/>
+                </a:ext>
+              </a:extLst>
+            </p:cNvPr>
+            <p:cNvSpPr txBox="1"/>
+            <p:nvPr/>
+          </p:nvSpPr>
+          <p:spPr>
+            <a:xfrm>
+              <a:off x="2562965" y="1745054"/>
+              <a:ext cx="2348143" cy="369332"/>
+            </a:xfrm>
+            <a:prstGeom prst="rect">
+              <a:avLst/>
+            </a:prstGeom>
+            <a:solidFill>
+              <a:schemeClr val="bg2">
+                <a:lumMod val="40000"/>
+                <a:lumOff val="60000"/>
+              </a:schemeClr>
+            </a:solidFill>
+          </p:spPr>
+          <p:txBody>
+            <a:bodyPr wrap="none" rtlCol="0">
+              <a:spAutoFit/>
+            </a:bodyPr>
+            <a:lstStyle/>
+            <a:p>
+              <a:r>
+                <a:rPr lang="en-US" dirty="0"/>
+                <a:t>Above-ground Biomass</a:t>
+              </a:r>
+            </a:p>
+          </p:txBody>
+        </p:sp>
+        <p:sp>
+          <p:nvSpPr>
+            <p:cNvPr id="28" name="TextBox 27">
+              <a:extLst>
+                <a:ext uri="{FF2B5EF4-FFF2-40B4-BE49-F238E27FC236}">
+                  <a16:creationId xmlns:a16="http://schemas.microsoft.com/office/drawing/2014/main" id="{3F812CC4-A17B-4FFE-8444-99E901669275}"/>
+                </a:ext>
+              </a:extLst>
+            </p:cNvPr>
+            <p:cNvSpPr txBox="1"/>
+            <p:nvPr/>
+          </p:nvSpPr>
+          <p:spPr>
+            <a:xfrm>
+              <a:off x="4828724" y="2044634"/>
+              <a:ext cx="803425" cy="369332"/>
+            </a:xfrm>
+            <a:prstGeom prst="rect">
+              <a:avLst/>
+            </a:prstGeom>
+            <a:noFill/>
+          </p:spPr>
+          <p:txBody>
+            <a:bodyPr wrap="none" rtlCol="0">
+              <a:spAutoFit/>
+            </a:bodyPr>
+            <a:lstStyle/>
+            <a:p>
+              <a:r>
+                <a:rPr lang="en-US" i="1" dirty="0"/>
+                <a:t>Tillage</a:t>
+              </a:r>
+            </a:p>
+          </p:txBody>
+        </p:sp>
+        <p:cxnSp>
+          <p:nvCxnSpPr>
+            <p:cNvPr id="30" name="Straight Arrow Connector 29">
+              <a:extLst>
+                <a:ext uri="{FF2B5EF4-FFF2-40B4-BE49-F238E27FC236}">
+                  <a16:creationId xmlns:a16="http://schemas.microsoft.com/office/drawing/2014/main" id="{25640F78-4FE1-4D28-8557-ED62F3D94D16}"/>
+                </a:ext>
+              </a:extLst>
+            </p:cNvPr>
+            <p:cNvCxnSpPr>
+              <a:stCxn id="27" idx="3"/>
+              <a:endCxn id="6" idx="1"/>
+            </p:cNvCxnSpPr>
+            <p:nvPr/>
+          </p:nvCxnSpPr>
+          <p:spPr>
+            <a:xfrm flipV="1">
+              <a:off x="4911108" y="1923182"/>
+              <a:ext cx="571982" cy="6538"/>
+            </a:xfrm>
+            <a:prstGeom prst="straightConnector1">
+              <a:avLst/>
+            </a:prstGeom>
+            <a:ln w="57150">
+              <a:solidFill>
+                <a:schemeClr val="tx1"/>
+              </a:solidFill>
+              <a:prstDash val="solid"/>
+              <a:tailEnd type="triangle"/>
+            </a:ln>
+          </p:spPr>
+          <p:style>
+            <a:lnRef idx="1">
+              <a:schemeClr val="accent1"/>
+            </a:lnRef>
+            <a:fillRef idx="0">
+              <a:schemeClr val="accent1"/>
+            </a:fillRef>
+            <a:effectRef idx="0">
+              <a:schemeClr val="accent1"/>
+            </a:effectRef>
+            <a:fontRef idx="minor">
+              <a:schemeClr val="tx1"/>
+            </a:fontRef>
+          </p:style>
+        </p:cxnSp>
+        <p:sp>
+          <p:nvSpPr>
+            <p:cNvPr id="34" name="TextBox 33">
+              <a:extLst>
+                <a:ext uri="{FF2B5EF4-FFF2-40B4-BE49-F238E27FC236}">
+                  <a16:creationId xmlns:a16="http://schemas.microsoft.com/office/drawing/2014/main" id="{A5F7D44D-E9ED-4B85-9A55-0A0CEED27E5A}"/>
+                </a:ext>
+              </a:extLst>
+            </p:cNvPr>
+            <p:cNvSpPr txBox="1"/>
+            <p:nvPr/>
+          </p:nvSpPr>
+          <p:spPr>
+            <a:xfrm>
+              <a:off x="9159850" y="3400920"/>
+              <a:ext cx="1103764" cy="369332"/>
+            </a:xfrm>
+            <a:prstGeom prst="rect">
+              <a:avLst/>
+            </a:prstGeom>
+            <a:solidFill>
+              <a:schemeClr val="bg1">
+                <a:lumMod val="50000"/>
+              </a:schemeClr>
+            </a:solidFill>
+          </p:spPr>
+          <p:txBody>
+            <a:bodyPr wrap="none" rtlCol="0">
+              <a:spAutoFit/>
+            </a:bodyPr>
+            <a:lstStyle/>
+            <a:p>
+              <a:r>
+                <a:rPr lang="en-US" dirty="0"/>
+                <a:t>Organic N</a:t>
+              </a:r>
+            </a:p>
+          </p:txBody>
+        </p:sp>
+        <p:sp>
+          <p:nvSpPr>
+            <p:cNvPr id="35" name="TextBox 34">
+              <a:extLst>
+                <a:ext uri="{FF2B5EF4-FFF2-40B4-BE49-F238E27FC236}">
+                  <a16:creationId xmlns:a16="http://schemas.microsoft.com/office/drawing/2014/main" id="{CD3D4ADE-6820-40EF-BD68-3C0CDBF5FDE4}"/>
+                </a:ext>
+              </a:extLst>
+            </p:cNvPr>
+            <p:cNvSpPr txBox="1"/>
+            <p:nvPr/>
+          </p:nvSpPr>
+          <p:spPr>
+            <a:xfrm>
+              <a:off x="9159850" y="3975783"/>
+              <a:ext cx="1112869" cy="369332"/>
+            </a:xfrm>
+            <a:prstGeom prst="rect">
+              <a:avLst/>
+            </a:prstGeom>
+            <a:solidFill>
+              <a:schemeClr val="bg1">
+                <a:lumMod val="50000"/>
+              </a:schemeClr>
+            </a:solidFill>
+          </p:spPr>
+          <p:txBody>
+            <a:bodyPr wrap="none" rtlCol="0">
+              <a:spAutoFit/>
+            </a:bodyPr>
+            <a:lstStyle/>
+            <a:p>
+              <a:r>
+                <a:rPr lang="en-US" dirty="0"/>
+                <a:t>Mineral N</a:t>
+              </a:r>
+            </a:p>
+          </p:txBody>
+        </p:sp>
+        <p:sp>
+          <p:nvSpPr>
+            <p:cNvPr id="37" name="TextBox 36">
+              <a:extLst>
+                <a:ext uri="{FF2B5EF4-FFF2-40B4-BE49-F238E27FC236}">
+                  <a16:creationId xmlns:a16="http://schemas.microsoft.com/office/drawing/2014/main" id="{82704AEF-63B6-4115-BCA0-748519CD8A6F}"/>
+                </a:ext>
+              </a:extLst>
+            </p:cNvPr>
+            <p:cNvSpPr txBox="1"/>
+            <p:nvPr/>
+          </p:nvSpPr>
+          <p:spPr>
+            <a:xfrm>
+              <a:off x="3270460" y="3951120"/>
+              <a:ext cx="1864357" cy="369332"/>
+            </a:xfrm>
+            <a:prstGeom prst="rect">
+              <a:avLst/>
+            </a:prstGeom>
+            <a:solidFill>
+              <a:schemeClr val="bg2">
+                <a:lumMod val="40000"/>
+                <a:lumOff val="60000"/>
+              </a:schemeClr>
+            </a:solidFill>
+          </p:spPr>
+          <p:txBody>
+            <a:bodyPr wrap="none" rtlCol="0">
+              <a:spAutoFit/>
+            </a:bodyPr>
+            <a:lstStyle/>
+            <a:p>
+              <a:r>
+                <a:rPr lang="en-US" dirty="0"/>
+                <a:t>Emergence Speed</a:t>
+              </a:r>
+            </a:p>
+          </p:txBody>
+        </p:sp>
+        <p:sp>
+          <p:nvSpPr>
+            <p:cNvPr id="38" name="TextBox 37">
+              <a:extLst>
+                <a:ext uri="{FF2B5EF4-FFF2-40B4-BE49-F238E27FC236}">
+                  <a16:creationId xmlns:a16="http://schemas.microsoft.com/office/drawing/2014/main" id="{2E683A25-9597-4B36-9608-E86C6D3E22F4}"/>
+                </a:ext>
+              </a:extLst>
+            </p:cNvPr>
+            <p:cNvSpPr txBox="1"/>
+            <p:nvPr/>
+          </p:nvSpPr>
+          <p:spPr>
+            <a:xfrm>
+              <a:off x="5338943" y="2863212"/>
+              <a:ext cx="1421415" cy="369332"/>
+            </a:xfrm>
+            <a:prstGeom prst="rect">
+              <a:avLst/>
+            </a:prstGeom>
+            <a:solidFill>
+              <a:schemeClr val="bg2">
+                <a:lumMod val="40000"/>
+                <a:lumOff val="60000"/>
+              </a:schemeClr>
+            </a:solidFill>
+          </p:spPr>
+          <p:txBody>
+            <a:bodyPr wrap="none" rtlCol="0">
+              <a:spAutoFit/>
+            </a:bodyPr>
+            <a:lstStyle/>
+            <a:p>
+              <a:r>
+                <a:rPr lang="en-US" dirty="0"/>
+                <a:t>Soil Moisture</a:t>
+              </a:r>
+            </a:p>
+          </p:txBody>
+        </p:sp>
+        <p:sp>
+          <p:nvSpPr>
+            <p:cNvPr id="39" name="TextBox 38">
+              <a:extLst>
+                <a:ext uri="{FF2B5EF4-FFF2-40B4-BE49-F238E27FC236}">
+                  <a16:creationId xmlns:a16="http://schemas.microsoft.com/office/drawing/2014/main" id="{C88535CE-04F6-4F00-8976-230E49A5674A}"/>
+                </a:ext>
+              </a:extLst>
+            </p:cNvPr>
+            <p:cNvSpPr txBox="1"/>
+            <p:nvPr/>
+          </p:nvSpPr>
+          <p:spPr>
+            <a:xfrm>
+              <a:off x="1539730" y="2863212"/>
+              <a:ext cx="1730730" cy="369332"/>
+            </a:xfrm>
+            <a:prstGeom prst="rect">
+              <a:avLst/>
+            </a:prstGeom>
+            <a:solidFill>
+              <a:schemeClr val="bg2">
+                <a:lumMod val="40000"/>
+                <a:lumOff val="60000"/>
+              </a:schemeClr>
+            </a:solidFill>
+          </p:spPr>
+          <p:txBody>
+            <a:bodyPr wrap="none" rtlCol="0">
+              <a:spAutoFit/>
+            </a:bodyPr>
+            <a:lstStyle/>
+            <a:p>
+              <a:r>
+                <a:rPr lang="en-US" dirty="0"/>
+                <a:t>Plant Population</a:t>
+              </a:r>
+            </a:p>
+          </p:txBody>
+        </p:sp>
+        <p:sp>
+          <p:nvSpPr>
+            <p:cNvPr id="40" name="TextBox 39">
+              <a:extLst>
+                <a:ext uri="{FF2B5EF4-FFF2-40B4-BE49-F238E27FC236}">
+                  <a16:creationId xmlns:a16="http://schemas.microsoft.com/office/drawing/2014/main" id="{D29EBCB2-DAFE-4E53-9427-A32478F274C9}"/>
+                </a:ext>
+              </a:extLst>
+            </p:cNvPr>
+            <p:cNvSpPr txBox="1"/>
+            <p:nvPr/>
+          </p:nvSpPr>
+          <p:spPr>
+            <a:xfrm>
+              <a:off x="-90829" y="2863212"/>
+              <a:ext cx="1475147" cy="369332"/>
+            </a:xfrm>
+            <a:prstGeom prst="rect">
+              <a:avLst/>
+            </a:prstGeom>
+            <a:solidFill>
+              <a:schemeClr val="bg2">
+                <a:lumMod val="40000"/>
+                <a:lumOff val="60000"/>
+              </a:schemeClr>
+            </a:solidFill>
+          </p:spPr>
+          <p:txBody>
+            <a:bodyPr wrap="none" rtlCol="0">
+              <a:spAutoFit/>
+            </a:bodyPr>
+            <a:lstStyle/>
+            <a:p>
+              <a:r>
+                <a:rPr lang="en-US" dirty="0"/>
+                <a:t>Foliar Disease</a:t>
+              </a:r>
+            </a:p>
+          </p:txBody>
+        </p:sp>
+        <p:sp>
+          <p:nvSpPr>
+            <p:cNvPr id="42" name="TextBox 41">
+              <a:extLst>
+                <a:ext uri="{FF2B5EF4-FFF2-40B4-BE49-F238E27FC236}">
+                  <a16:creationId xmlns:a16="http://schemas.microsoft.com/office/drawing/2014/main" id="{B50287FD-D8CF-4F3F-BB26-4D1EE2C652C4}"/>
+                </a:ext>
+              </a:extLst>
+            </p:cNvPr>
+            <p:cNvSpPr txBox="1"/>
+            <p:nvPr/>
+          </p:nvSpPr>
+          <p:spPr>
+            <a:xfrm>
+              <a:off x="5696050" y="3951120"/>
+              <a:ext cx="2182303" cy="369332"/>
+            </a:xfrm>
+            <a:prstGeom prst="rect">
+              <a:avLst/>
+            </a:prstGeom>
+            <a:solidFill>
+              <a:schemeClr val="bg2">
+                <a:lumMod val="40000"/>
+                <a:lumOff val="60000"/>
+              </a:schemeClr>
+            </a:solidFill>
+          </p:spPr>
+          <p:txBody>
+            <a:bodyPr wrap="square" rtlCol="0">
+              <a:spAutoFit/>
+            </a:bodyPr>
+            <a:lstStyle/>
+            <a:p>
+              <a:pPr algn="ctr"/>
+              <a:r>
+                <a:rPr lang="en-US" dirty="0"/>
+                <a:t>Root Disease</a:t>
+              </a:r>
+            </a:p>
+          </p:txBody>
+        </p:sp>
+        <p:cxnSp>
+          <p:nvCxnSpPr>
+            <p:cNvPr id="45" name="Straight Arrow Connector 44">
+              <a:extLst>
+                <a:ext uri="{FF2B5EF4-FFF2-40B4-BE49-F238E27FC236}">
+                  <a16:creationId xmlns:a16="http://schemas.microsoft.com/office/drawing/2014/main" id="{17E1A0A6-BA50-4618-8F03-27F30C4ACB4F}"/>
+                </a:ext>
+              </a:extLst>
+            </p:cNvPr>
+            <p:cNvCxnSpPr/>
+            <p:nvPr/>
+          </p:nvCxnSpPr>
+          <p:spPr>
+            <a:xfrm>
+              <a:off x="10263614" y="4699344"/>
+              <a:ext cx="0" cy="700042"/>
+            </a:xfrm>
+            <a:prstGeom prst="straightConnector1">
+              <a:avLst/>
+            </a:prstGeom>
+            <a:ln w="57150">
+              <a:solidFill>
+                <a:schemeClr val="tx1"/>
+              </a:solidFill>
+              <a:tailEnd type="triangle"/>
+            </a:ln>
+          </p:spPr>
+          <p:style>
+            <a:lnRef idx="1">
+              <a:schemeClr val="accent1"/>
+            </a:lnRef>
+            <a:fillRef idx="0">
+              <a:schemeClr val="accent1"/>
+            </a:fillRef>
+            <a:effectRef idx="0">
+              <a:schemeClr val="accent1"/>
+            </a:effectRef>
+            <a:fontRef idx="minor">
+              <a:schemeClr val="tx1"/>
+            </a:fontRef>
+          </p:style>
+        </p:cxnSp>
+        <p:sp>
+          <p:nvSpPr>
+            <p:cNvPr id="46" name="TextBox 45">
+              <a:extLst>
+                <a:ext uri="{FF2B5EF4-FFF2-40B4-BE49-F238E27FC236}">
+                  <a16:creationId xmlns:a16="http://schemas.microsoft.com/office/drawing/2014/main" id="{03E68496-FC9E-4E89-8753-BA5205E35FCE}"/>
+                </a:ext>
+              </a:extLst>
+            </p:cNvPr>
+            <p:cNvSpPr txBox="1"/>
+            <p:nvPr/>
+          </p:nvSpPr>
+          <p:spPr>
+            <a:xfrm>
+              <a:off x="9766991" y="5608459"/>
+              <a:ext cx="1016625" cy="369332"/>
+            </a:xfrm>
+            <a:prstGeom prst="rect">
+              <a:avLst/>
+            </a:prstGeom>
+            <a:noFill/>
+          </p:spPr>
+          <p:txBody>
+            <a:bodyPr wrap="none" rtlCol="0">
+              <a:spAutoFit/>
+            </a:bodyPr>
+            <a:lstStyle/>
+            <a:p>
+              <a:r>
+                <a:rPr lang="en-US" i="1" dirty="0"/>
+                <a:t>Leaching</a:t>
+              </a:r>
+            </a:p>
+          </p:txBody>
+        </p:sp>
+        <p:sp>
+          <p:nvSpPr>
+            <p:cNvPr id="47" name="TextBox 46">
+              <a:extLst>
+                <a:ext uri="{FF2B5EF4-FFF2-40B4-BE49-F238E27FC236}">
+                  <a16:creationId xmlns:a16="http://schemas.microsoft.com/office/drawing/2014/main" id="{71A64A20-948F-481E-9E7E-0DFCA922ED2D}"/>
+                </a:ext>
+              </a:extLst>
+            </p:cNvPr>
+            <p:cNvSpPr txBox="1"/>
+            <p:nvPr/>
+          </p:nvSpPr>
+          <p:spPr>
+            <a:xfrm>
+              <a:off x="6011059" y="5003420"/>
+              <a:ext cx="1552284" cy="369332"/>
+            </a:xfrm>
+            <a:prstGeom prst="rect">
+              <a:avLst/>
+            </a:prstGeom>
+            <a:solidFill>
+              <a:schemeClr val="bg2">
+                <a:lumMod val="40000"/>
+                <a:lumOff val="60000"/>
+              </a:schemeClr>
+            </a:solidFill>
+          </p:spPr>
+          <p:txBody>
+            <a:bodyPr wrap="none" rtlCol="0">
+              <a:spAutoFit/>
+            </a:bodyPr>
+            <a:lstStyle/>
+            <a:p>
+              <a:r>
+                <a:rPr lang="en-US" dirty="0"/>
+                <a:t>Root Structure</a:t>
+              </a:r>
+            </a:p>
+          </p:txBody>
+        </p:sp>
+        <p:cxnSp>
+          <p:nvCxnSpPr>
+            <p:cNvPr id="51" name="Straight Arrow Connector 50">
+              <a:extLst>
+                <a:ext uri="{FF2B5EF4-FFF2-40B4-BE49-F238E27FC236}">
+                  <a16:creationId xmlns:a16="http://schemas.microsoft.com/office/drawing/2014/main" id="{87EBDFAD-4A5A-4BE9-A809-4D8186D8DCEE}"/>
+                </a:ext>
+              </a:extLst>
+            </p:cNvPr>
+            <p:cNvCxnSpPr>
+              <a:endCxn id="40" idx="0"/>
+            </p:cNvCxnSpPr>
+            <p:nvPr/>
+          </p:nvCxnSpPr>
+          <p:spPr>
+            <a:xfrm>
+              <a:off x="646744" y="2467992"/>
+              <a:ext cx="1" cy="395220"/>
+            </a:xfrm>
+            <a:prstGeom prst="straightConnector1">
+              <a:avLst/>
+            </a:prstGeom>
+            <a:ln w="12700">
+              <a:solidFill>
+                <a:schemeClr val="bg2">
+                  <a:lumMod val="75000"/>
+                </a:schemeClr>
+              </a:solidFill>
+              <a:prstDash val="sysDash"/>
+              <a:tailEnd type="triangle"/>
+            </a:ln>
+          </p:spPr>
+          <p:style>
+            <a:lnRef idx="1">
+              <a:schemeClr val="accent1"/>
+            </a:lnRef>
+            <a:fillRef idx="0">
+              <a:schemeClr val="accent1"/>
+            </a:fillRef>
+            <a:effectRef idx="0">
+              <a:schemeClr val="accent1"/>
+            </a:effectRef>
+            <a:fontRef idx="minor">
+              <a:schemeClr val="tx1"/>
+            </a:fontRef>
+          </p:style>
+        </p:cxnSp>
+        <p:cxnSp>
+          <p:nvCxnSpPr>
+            <p:cNvPr id="52" name="Straight Arrow Connector 51">
+              <a:extLst>
+                <a:ext uri="{FF2B5EF4-FFF2-40B4-BE49-F238E27FC236}">
+                  <a16:creationId xmlns:a16="http://schemas.microsoft.com/office/drawing/2014/main" id="{DF4D5B51-D868-4ABE-B4DF-77C63F6D68E1}"/>
+                </a:ext>
+              </a:extLst>
+            </p:cNvPr>
+            <p:cNvCxnSpPr/>
+            <p:nvPr/>
+          </p:nvCxnSpPr>
+          <p:spPr>
+            <a:xfrm>
+              <a:off x="2391634" y="2467992"/>
+              <a:ext cx="1" cy="395220"/>
+            </a:xfrm>
+            <a:prstGeom prst="straightConnector1">
+              <a:avLst/>
+            </a:prstGeom>
+            <a:ln w="12700">
+              <a:solidFill>
+                <a:schemeClr val="bg2">
+                  <a:lumMod val="75000"/>
+                </a:schemeClr>
+              </a:solidFill>
+              <a:prstDash val="sysDash"/>
+              <a:tailEnd type="triangle"/>
+            </a:ln>
+          </p:spPr>
+          <p:style>
+            <a:lnRef idx="1">
+              <a:schemeClr val="accent1"/>
+            </a:lnRef>
+            <a:fillRef idx="0">
+              <a:schemeClr val="accent1"/>
+            </a:fillRef>
+            <a:effectRef idx="0">
+              <a:schemeClr val="accent1"/>
+            </a:effectRef>
+            <a:fontRef idx="minor">
+              <a:schemeClr val="tx1"/>
+            </a:fontRef>
+          </p:style>
+        </p:cxnSp>
+        <p:cxnSp>
+          <p:nvCxnSpPr>
+            <p:cNvPr id="53" name="Straight Arrow Connector 52">
+              <a:extLst>
+                <a:ext uri="{FF2B5EF4-FFF2-40B4-BE49-F238E27FC236}">
+                  <a16:creationId xmlns:a16="http://schemas.microsoft.com/office/drawing/2014/main" id="{B0D3A137-DF2B-45FF-A99F-CCB3DB683E2F}"/>
+                </a:ext>
+              </a:extLst>
+            </p:cNvPr>
+            <p:cNvCxnSpPr/>
+            <p:nvPr/>
+          </p:nvCxnSpPr>
+          <p:spPr>
+            <a:xfrm>
+              <a:off x="4277775" y="2467992"/>
+              <a:ext cx="1" cy="395220"/>
+            </a:xfrm>
+            <a:prstGeom prst="straightConnector1">
+              <a:avLst/>
+            </a:prstGeom>
+            <a:ln w="3175">
+              <a:solidFill>
+                <a:schemeClr val="tx1"/>
+              </a:solidFill>
+              <a:tailEnd type="triangle"/>
+            </a:ln>
+          </p:spPr>
+          <p:style>
+            <a:lnRef idx="1">
+              <a:schemeClr val="accent1"/>
+            </a:lnRef>
+            <a:fillRef idx="0">
+              <a:schemeClr val="accent1"/>
+            </a:fillRef>
+            <a:effectRef idx="0">
+              <a:schemeClr val="accent1"/>
+            </a:effectRef>
+            <a:fontRef idx="minor">
+              <a:schemeClr val="tx1"/>
+            </a:fontRef>
+          </p:style>
+        </p:cxnSp>
+        <p:cxnSp>
+          <p:nvCxnSpPr>
+            <p:cNvPr id="54" name="Straight Arrow Connector 53">
+              <a:extLst>
+                <a:ext uri="{FF2B5EF4-FFF2-40B4-BE49-F238E27FC236}">
+                  <a16:creationId xmlns:a16="http://schemas.microsoft.com/office/drawing/2014/main" id="{3033AB08-870D-4629-B0D8-BC7D3B22D391}"/>
+                </a:ext>
+              </a:extLst>
+            </p:cNvPr>
+            <p:cNvCxnSpPr/>
+            <p:nvPr/>
+          </p:nvCxnSpPr>
+          <p:spPr>
+            <a:xfrm>
+              <a:off x="6035435" y="2481240"/>
+              <a:ext cx="1" cy="395220"/>
+            </a:xfrm>
+            <a:prstGeom prst="straightConnector1">
+              <a:avLst/>
+            </a:prstGeom>
+            <a:ln w="3175">
+              <a:solidFill>
+                <a:schemeClr val="tx1"/>
+              </a:solidFill>
+              <a:tailEnd type="triangle"/>
+            </a:ln>
+          </p:spPr>
+          <p:style>
+            <a:lnRef idx="1">
+              <a:schemeClr val="accent1"/>
+            </a:lnRef>
+            <a:fillRef idx="0">
+              <a:schemeClr val="accent1"/>
+            </a:fillRef>
+            <a:effectRef idx="0">
+              <a:schemeClr val="accent1"/>
+            </a:effectRef>
+            <a:fontRef idx="minor">
+              <a:schemeClr val="tx1"/>
+            </a:fontRef>
+          </p:style>
+        </p:cxnSp>
+        <p:cxnSp>
+          <p:nvCxnSpPr>
+            <p:cNvPr id="56" name="Straight Connector 55">
+              <a:extLst>
+                <a:ext uri="{FF2B5EF4-FFF2-40B4-BE49-F238E27FC236}">
+                  <a16:creationId xmlns:a16="http://schemas.microsoft.com/office/drawing/2014/main" id="{7A2E10CA-4474-4A6C-9709-769561D28077}"/>
+                </a:ext>
+              </a:extLst>
+            </p:cNvPr>
+            <p:cNvCxnSpPr/>
+            <p:nvPr/>
+          </p:nvCxnSpPr>
+          <p:spPr>
+            <a:xfrm>
+              <a:off x="660905" y="2481240"/>
+              <a:ext cx="5374531" cy="0"/>
+            </a:xfrm>
+            <a:prstGeom prst="line">
+              <a:avLst/>
+            </a:prstGeom>
+            <a:ln w="3175">
+              <a:solidFill>
+                <a:schemeClr val="tx1"/>
+              </a:solidFill>
+            </a:ln>
+          </p:spPr>
+          <p:style>
+            <a:lnRef idx="1">
+              <a:schemeClr val="accent1"/>
+            </a:lnRef>
+            <a:fillRef idx="0">
+              <a:schemeClr val="accent1"/>
+            </a:fillRef>
+            <a:effectRef idx="0">
+              <a:schemeClr val="accent1"/>
+            </a:effectRef>
+            <a:fontRef idx="minor">
+              <a:schemeClr val="tx1"/>
+            </a:fontRef>
+          </p:style>
+        </p:cxnSp>
+        <p:cxnSp>
+          <p:nvCxnSpPr>
+            <p:cNvPr id="57" name="Straight Arrow Connector 56">
+              <a:extLst>
+                <a:ext uri="{FF2B5EF4-FFF2-40B4-BE49-F238E27FC236}">
+                  <a16:creationId xmlns:a16="http://schemas.microsoft.com/office/drawing/2014/main" id="{31BA66BD-48A8-4DD6-B57A-134D8438CFE3}"/>
+                </a:ext>
+              </a:extLst>
+            </p:cNvPr>
+            <p:cNvCxnSpPr/>
+            <p:nvPr/>
+          </p:nvCxnSpPr>
+          <p:spPr>
+            <a:xfrm>
+              <a:off x="3734941" y="2105701"/>
+              <a:ext cx="1" cy="395220"/>
+            </a:xfrm>
+            <a:prstGeom prst="straightConnector1">
+              <a:avLst/>
+            </a:prstGeom>
+            <a:ln w="3175">
+              <a:solidFill>
+                <a:schemeClr val="tx1"/>
+              </a:solidFill>
+              <a:tailEnd type="triangle"/>
+            </a:ln>
+          </p:spPr>
+          <p:style>
+            <a:lnRef idx="1">
+              <a:schemeClr val="accent1"/>
+            </a:lnRef>
+            <a:fillRef idx="0">
+              <a:schemeClr val="accent1"/>
+            </a:fillRef>
+            <a:effectRef idx="0">
+              <a:schemeClr val="accent1"/>
+            </a:effectRef>
+            <a:fontRef idx="minor">
+              <a:schemeClr val="tx1"/>
+            </a:fontRef>
+          </p:style>
+        </p:cxnSp>
+        <p:cxnSp>
+          <p:nvCxnSpPr>
+            <p:cNvPr id="59" name="Straight Arrow Connector 58">
+              <a:extLst>
+                <a:ext uri="{FF2B5EF4-FFF2-40B4-BE49-F238E27FC236}">
+                  <a16:creationId xmlns:a16="http://schemas.microsoft.com/office/drawing/2014/main" id="{04E70E58-42AC-4675-B455-935EC2D04F90}"/>
+                </a:ext>
+              </a:extLst>
+            </p:cNvPr>
+            <p:cNvCxnSpPr>
+              <a:cxnSpLocks/>
+              <a:stCxn id="6" idx="3"/>
+              <a:endCxn id="16" idx="1"/>
+            </p:cNvCxnSpPr>
+            <p:nvPr/>
+          </p:nvCxnSpPr>
+          <p:spPr>
+            <a:xfrm flipV="1">
+              <a:off x="7817575" y="1918294"/>
+              <a:ext cx="960697" cy="4888"/>
+            </a:xfrm>
+            <a:prstGeom prst="straightConnector1">
+              <a:avLst/>
+            </a:prstGeom>
+            <a:ln w="57150">
+              <a:solidFill>
+                <a:schemeClr val="tx1"/>
+              </a:solidFill>
+              <a:tailEnd type="triangle"/>
+            </a:ln>
+          </p:spPr>
+          <p:style>
+            <a:lnRef idx="1">
+              <a:schemeClr val="accent1"/>
+            </a:lnRef>
+            <a:fillRef idx="0">
+              <a:schemeClr val="accent1"/>
+            </a:fillRef>
+            <a:effectRef idx="0">
+              <a:schemeClr val="accent1"/>
+            </a:effectRef>
+            <a:fontRef idx="minor">
+              <a:schemeClr val="tx1"/>
+            </a:fontRef>
+          </p:style>
+        </p:cxnSp>
+        <p:cxnSp>
+          <p:nvCxnSpPr>
+            <p:cNvPr id="62" name="Straight Arrow Connector 61">
+              <a:extLst>
+                <a:ext uri="{FF2B5EF4-FFF2-40B4-BE49-F238E27FC236}">
+                  <a16:creationId xmlns:a16="http://schemas.microsoft.com/office/drawing/2014/main" id="{98BF088E-82BB-48E2-B48C-D3A32F67900B}"/>
+                </a:ext>
+              </a:extLst>
+            </p:cNvPr>
+            <p:cNvCxnSpPr/>
+            <p:nvPr/>
+          </p:nvCxnSpPr>
+          <p:spPr>
+            <a:xfrm>
+              <a:off x="9640836" y="2114386"/>
+              <a:ext cx="0" cy="700042"/>
+            </a:xfrm>
+            <a:prstGeom prst="straightConnector1">
+              <a:avLst/>
+            </a:prstGeom>
+            <a:ln w="57150">
+              <a:solidFill>
+                <a:schemeClr val="tx1"/>
+              </a:solidFill>
+              <a:tailEnd type="triangle"/>
+            </a:ln>
+          </p:spPr>
+          <p:style>
+            <a:lnRef idx="1">
+              <a:schemeClr val="accent1"/>
+            </a:lnRef>
+            <a:fillRef idx="0">
+              <a:schemeClr val="accent1"/>
+            </a:fillRef>
+            <a:effectRef idx="0">
+              <a:schemeClr val="accent1"/>
+            </a:effectRef>
+            <a:fontRef idx="minor">
+              <a:schemeClr val="tx1"/>
+            </a:fontRef>
+          </p:style>
+        </p:cxnSp>
+        <p:cxnSp>
+          <p:nvCxnSpPr>
+            <p:cNvPr id="65" name="Straight Arrow Connector 64">
+              <a:extLst>
+                <a:ext uri="{FF2B5EF4-FFF2-40B4-BE49-F238E27FC236}">
+                  <a16:creationId xmlns:a16="http://schemas.microsoft.com/office/drawing/2014/main" id="{4965D3D2-1395-41AA-8475-03AAB87FA8F8}"/>
+                </a:ext>
+              </a:extLst>
+            </p:cNvPr>
+            <p:cNvCxnSpPr>
+              <a:stCxn id="47" idx="2"/>
+              <a:endCxn id="12" idx="0"/>
+            </p:cNvCxnSpPr>
+            <p:nvPr/>
+          </p:nvCxnSpPr>
+          <p:spPr>
+            <a:xfrm>
+              <a:off x="6787201" y="5372752"/>
+              <a:ext cx="57537" cy="639949"/>
+            </a:xfrm>
+            <a:prstGeom prst="straightConnector1">
+              <a:avLst/>
+            </a:prstGeom>
+            <a:ln w="57150">
+              <a:solidFill>
+                <a:schemeClr val="tx1"/>
+              </a:solidFill>
+              <a:tailEnd type="triangle"/>
+            </a:ln>
+          </p:spPr>
+          <p:style>
+            <a:lnRef idx="1">
+              <a:schemeClr val="accent1"/>
+            </a:lnRef>
+            <a:fillRef idx="0">
+              <a:schemeClr val="accent1"/>
+            </a:fillRef>
+            <a:effectRef idx="0">
+              <a:schemeClr val="accent1"/>
+            </a:effectRef>
+            <a:fontRef idx="minor">
+              <a:schemeClr val="tx1"/>
+            </a:fontRef>
+          </p:style>
+        </p:cxnSp>
+        <p:cxnSp>
+          <p:nvCxnSpPr>
+            <p:cNvPr id="68" name="Straight Arrow Connector 67">
+              <a:extLst>
+                <a:ext uri="{FF2B5EF4-FFF2-40B4-BE49-F238E27FC236}">
+                  <a16:creationId xmlns:a16="http://schemas.microsoft.com/office/drawing/2014/main" id="{1EF946F1-6A66-4B77-A814-CD71F166BADB}"/>
+                </a:ext>
+              </a:extLst>
+            </p:cNvPr>
+            <p:cNvCxnSpPr>
+              <a:cxnSpLocks/>
+            </p:cNvCxnSpPr>
+            <p:nvPr/>
+          </p:nvCxnSpPr>
+          <p:spPr>
+            <a:xfrm flipH="1">
+              <a:off x="6787201" y="5661843"/>
+              <a:ext cx="2054959" cy="0"/>
+            </a:xfrm>
+            <a:prstGeom prst="straightConnector1">
+              <a:avLst/>
+            </a:prstGeom>
+            <a:ln w="57150">
+              <a:solidFill>
+                <a:schemeClr val="tx1"/>
+              </a:solidFill>
+              <a:tailEnd type="triangle"/>
+            </a:ln>
+          </p:spPr>
+          <p:style>
+            <a:lnRef idx="1">
+              <a:schemeClr val="accent1"/>
+            </a:lnRef>
+            <a:fillRef idx="0">
+              <a:schemeClr val="accent1"/>
+            </a:fillRef>
+            <a:effectRef idx="0">
+              <a:schemeClr val="accent1"/>
+            </a:effectRef>
+            <a:fontRef idx="minor">
+              <a:schemeClr val="tx1"/>
+            </a:fontRef>
+          </p:style>
+        </p:cxnSp>
+        <p:cxnSp>
+          <p:nvCxnSpPr>
+            <p:cNvPr id="72" name="Straight Connector 71">
+              <a:extLst>
+                <a:ext uri="{FF2B5EF4-FFF2-40B4-BE49-F238E27FC236}">
+                  <a16:creationId xmlns:a16="http://schemas.microsoft.com/office/drawing/2014/main" id="{1DD3FCC7-0CE7-453E-B02F-2DC6EB94BE8A}"/>
+                </a:ext>
+              </a:extLst>
+            </p:cNvPr>
+            <p:cNvCxnSpPr/>
+            <p:nvPr/>
+          </p:nvCxnSpPr>
+          <p:spPr>
+            <a:xfrm>
+              <a:off x="8831540" y="4690213"/>
+              <a:ext cx="0" cy="971630"/>
+            </a:xfrm>
+            <a:prstGeom prst="line">
+              <a:avLst/>
+            </a:prstGeom>
+            <a:ln w="57150">
+              <a:solidFill>
+                <a:schemeClr val="tx1"/>
+              </a:solidFill>
+            </a:ln>
+          </p:spPr>
+          <p:style>
+            <a:lnRef idx="1">
+              <a:schemeClr val="accent1"/>
+            </a:lnRef>
+            <a:fillRef idx="0">
+              <a:schemeClr val="accent1"/>
+            </a:fillRef>
+            <a:effectRef idx="0">
+              <a:schemeClr val="accent1"/>
+            </a:effectRef>
+            <a:fontRef idx="minor">
+              <a:schemeClr val="tx1"/>
+            </a:fontRef>
+          </p:style>
+        </p:cxnSp>
+        <p:cxnSp>
+          <p:nvCxnSpPr>
+            <p:cNvPr id="73" name="Straight Arrow Connector 72">
+              <a:extLst>
+                <a:ext uri="{FF2B5EF4-FFF2-40B4-BE49-F238E27FC236}">
+                  <a16:creationId xmlns:a16="http://schemas.microsoft.com/office/drawing/2014/main" id="{AEA4EBB5-9187-4147-9D3F-FA252E91157F}"/>
+                </a:ext>
+              </a:extLst>
+            </p:cNvPr>
+            <p:cNvCxnSpPr>
+              <a:cxnSpLocks/>
+            </p:cNvCxnSpPr>
+            <p:nvPr/>
+          </p:nvCxnSpPr>
+          <p:spPr>
+            <a:xfrm>
+              <a:off x="6769336" y="3061904"/>
+              <a:ext cx="1523246" cy="0"/>
+            </a:xfrm>
+            <a:prstGeom prst="straightConnector1">
+              <a:avLst/>
+            </a:prstGeom>
+            <a:ln w="19050">
+              <a:solidFill>
+                <a:schemeClr val="tx1"/>
+              </a:solidFill>
+              <a:tailEnd type="triangle"/>
+            </a:ln>
+          </p:spPr>
+          <p:style>
+            <a:lnRef idx="1">
+              <a:schemeClr val="accent1"/>
+            </a:lnRef>
+            <a:fillRef idx="0">
+              <a:schemeClr val="accent1"/>
+            </a:fillRef>
+            <a:effectRef idx="0">
+              <a:schemeClr val="accent1"/>
+            </a:effectRef>
+            <a:fontRef idx="minor">
+              <a:schemeClr val="tx1"/>
+            </a:fontRef>
+          </p:style>
+        </p:cxnSp>
+        <p:cxnSp>
+          <p:nvCxnSpPr>
+            <p:cNvPr id="79" name="Straight Connector 78">
+              <a:extLst>
+                <a:ext uri="{FF2B5EF4-FFF2-40B4-BE49-F238E27FC236}">
+                  <a16:creationId xmlns:a16="http://schemas.microsoft.com/office/drawing/2014/main" id="{0931AD5F-99AF-42C8-B490-DFF8FDC93D0C}"/>
+                </a:ext>
+              </a:extLst>
+            </p:cNvPr>
+            <p:cNvCxnSpPr>
+              <a:cxnSpLocks/>
+            </p:cNvCxnSpPr>
+            <p:nvPr/>
+          </p:nvCxnSpPr>
+          <p:spPr>
+            <a:xfrm>
+              <a:off x="4277775" y="3232544"/>
+              <a:ext cx="0" cy="359288"/>
+            </a:xfrm>
+            <a:prstGeom prst="line">
+              <a:avLst/>
+            </a:prstGeom>
+            <a:ln w="19050">
+              <a:solidFill>
+                <a:schemeClr val="tx1"/>
+              </a:solidFill>
+            </a:ln>
+          </p:spPr>
+          <p:style>
+            <a:lnRef idx="1">
+              <a:schemeClr val="accent1"/>
+            </a:lnRef>
+            <a:fillRef idx="0">
+              <a:schemeClr val="accent1"/>
+            </a:fillRef>
+            <a:effectRef idx="0">
+              <a:schemeClr val="accent1"/>
+            </a:effectRef>
+            <a:fontRef idx="minor">
+              <a:schemeClr val="tx1"/>
+            </a:fontRef>
+          </p:style>
+        </p:cxnSp>
+        <p:cxnSp>
+          <p:nvCxnSpPr>
+            <p:cNvPr id="81" name="Straight Arrow Connector 80">
+              <a:extLst>
+                <a:ext uri="{FF2B5EF4-FFF2-40B4-BE49-F238E27FC236}">
+                  <a16:creationId xmlns:a16="http://schemas.microsoft.com/office/drawing/2014/main" id="{9D4AD687-BD91-428F-B600-C779938FB226}"/>
+                </a:ext>
+              </a:extLst>
+            </p:cNvPr>
+            <p:cNvCxnSpPr>
+              <a:cxnSpLocks/>
+            </p:cNvCxnSpPr>
+            <p:nvPr/>
+          </p:nvCxnSpPr>
+          <p:spPr>
+            <a:xfrm>
+              <a:off x="4279277" y="3591832"/>
+              <a:ext cx="4013305" cy="0"/>
+            </a:xfrm>
+            <a:prstGeom prst="straightConnector1">
+              <a:avLst/>
+            </a:prstGeom>
+            <a:ln w="19050">
+              <a:solidFill>
+                <a:schemeClr val="tx1"/>
+              </a:solidFill>
+              <a:tailEnd type="triangle"/>
+            </a:ln>
+          </p:spPr>
+          <p:style>
+            <a:lnRef idx="1">
+              <a:schemeClr val="accent1"/>
+            </a:lnRef>
+            <a:fillRef idx="0">
+              <a:schemeClr val="accent1"/>
+            </a:fillRef>
+            <a:effectRef idx="0">
+              <a:schemeClr val="accent1"/>
+            </a:effectRef>
+            <a:fontRef idx="minor">
+              <a:schemeClr val="tx1"/>
+            </a:fontRef>
+          </p:style>
+        </p:cxnSp>
+        <p:cxnSp>
+          <p:nvCxnSpPr>
+            <p:cNvPr id="83" name="Straight Arrow Connector 82">
+              <a:extLst>
+                <a:ext uri="{FF2B5EF4-FFF2-40B4-BE49-F238E27FC236}">
+                  <a16:creationId xmlns:a16="http://schemas.microsoft.com/office/drawing/2014/main" id="{F38062AB-3426-468E-A20F-02D159FF5BE0}"/>
+                </a:ext>
+              </a:extLst>
+            </p:cNvPr>
+            <p:cNvCxnSpPr/>
+            <p:nvPr/>
+          </p:nvCxnSpPr>
+          <p:spPr>
+            <a:xfrm>
+              <a:off x="4270210" y="3532044"/>
+              <a:ext cx="1" cy="395220"/>
+            </a:xfrm>
+            <a:prstGeom prst="straightConnector1">
+              <a:avLst/>
+            </a:prstGeom>
+            <a:ln w="12700">
+              <a:solidFill>
+                <a:schemeClr val="bg2">
+                  <a:lumMod val="75000"/>
+                </a:schemeClr>
+              </a:solidFill>
+              <a:prstDash val="sysDash"/>
+              <a:tailEnd type="triangle"/>
+            </a:ln>
+          </p:spPr>
+          <p:style>
+            <a:lnRef idx="1">
+              <a:schemeClr val="accent1"/>
+            </a:lnRef>
+            <a:fillRef idx="0">
+              <a:schemeClr val="accent1"/>
+            </a:fillRef>
+            <a:effectRef idx="0">
+              <a:schemeClr val="accent1"/>
+            </a:effectRef>
+            <a:fontRef idx="minor">
+              <a:schemeClr val="tx1"/>
+            </a:fontRef>
+          </p:style>
+        </p:cxnSp>
+        <p:cxnSp>
+          <p:nvCxnSpPr>
+            <p:cNvPr id="84" name="Straight Arrow Connector 83">
+              <a:extLst>
+                <a:ext uri="{FF2B5EF4-FFF2-40B4-BE49-F238E27FC236}">
+                  <a16:creationId xmlns:a16="http://schemas.microsoft.com/office/drawing/2014/main" id="{A40F3762-1150-4392-9305-F7F771E78299}"/>
+                </a:ext>
+              </a:extLst>
+            </p:cNvPr>
+            <p:cNvCxnSpPr>
+              <a:cxnSpLocks/>
+              <a:stCxn id="42" idx="2"/>
+            </p:cNvCxnSpPr>
+            <p:nvPr/>
+          </p:nvCxnSpPr>
+          <p:spPr>
+            <a:xfrm flipH="1">
+              <a:off x="6787201" y="4320452"/>
+              <a:ext cx="1" cy="675752"/>
+            </a:xfrm>
+            <a:prstGeom prst="straightConnector1">
+              <a:avLst/>
+            </a:prstGeom>
+            <a:ln w="57150">
+              <a:solidFill>
+                <a:schemeClr val="tx1"/>
+              </a:solidFill>
+              <a:tailEnd type="triangle"/>
+            </a:ln>
+          </p:spPr>
+          <p:style>
+            <a:lnRef idx="1">
+              <a:schemeClr val="accent1"/>
+            </a:lnRef>
+            <a:fillRef idx="0">
+              <a:schemeClr val="accent1"/>
+            </a:fillRef>
+            <a:effectRef idx="0">
+              <a:schemeClr val="accent1"/>
+            </a:effectRef>
+            <a:fontRef idx="minor">
+              <a:schemeClr val="tx1"/>
+            </a:fontRef>
+          </p:style>
+        </p:cxnSp>
+        <p:cxnSp>
+          <p:nvCxnSpPr>
+            <p:cNvPr id="90" name="Straight Arrow Connector 89">
+              <a:extLst>
+                <a:ext uri="{FF2B5EF4-FFF2-40B4-BE49-F238E27FC236}">
+                  <a16:creationId xmlns:a16="http://schemas.microsoft.com/office/drawing/2014/main" id="{BB890F74-A463-4C40-A27B-35FB56527423}"/>
+                </a:ext>
+              </a:extLst>
+            </p:cNvPr>
+            <p:cNvCxnSpPr>
+              <a:cxnSpLocks/>
+            </p:cNvCxnSpPr>
+            <p:nvPr/>
+          </p:nvCxnSpPr>
+          <p:spPr>
+            <a:xfrm>
+              <a:off x="3734940" y="678035"/>
+              <a:ext cx="1" cy="1044412"/>
+            </a:xfrm>
+            <a:prstGeom prst="straightConnector1">
+              <a:avLst/>
+            </a:prstGeom>
+            <a:ln w="57150">
+              <a:solidFill>
+                <a:schemeClr val="tx1"/>
+              </a:solidFill>
+              <a:tailEnd type="triangle"/>
+            </a:ln>
+          </p:spPr>
+          <p:style>
+            <a:lnRef idx="1">
+              <a:schemeClr val="accent1"/>
+            </a:lnRef>
+            <a:fillRef idx="0">
+              <a:schemeClr val="accent1"/>
+            </a:fillRef>
+            <a:effectRef idx="0">
+              <a:schemeClr val="accent1"/>
+            </a:effectRef>
+            <a:fontRef idx="minor">
+              <a:schemeClr val="tx1"/>
+            </a:fontRef>
+          </p:style>
+        </p:cxnSp>
+        <p:cxnSp>
+          <p:nvCxnSpPr>
+            <p:cNvPr id="91" name="Straight Arrow Connector 90">
+              <a:extLst>
+                <a:ext uri="{FF2B5EF4-FFF2-40B4-BE49-F238E27FC236}">
+                  <a16:creationId xmlns:a16="http://schemas.microsoft.com/office/drawing/2014/main" id="{7E40E1B6-6876-41B9-90D2-E708A7BFB424}"/>
+                </a:ext>
+              </a:extLst>
+            </p:cNvPr>
+            <p:cNvCxnSpPr>
+              <a:cxnSpLocks/>
+            </p:cNvCxnSpPr>
+            <p:nvPr/>
+          </p:nvCxnSpPr>
+          <p:spPr>
+            <a:xfrm>
+              <a:off x="6659879" y="753063"/>
+              <a:ext cx="0" cy="991991"/>
+            </a:xfrm>
+            <a:prstGeom prst="straightConnector1">
+              <a:avLst/>
+            </a:prstGeom>
+            <a:ln w="57150">
+              <a:solidFill>
+                <a:schemeClr val="tx1"/>
+              </a:solidFill>
+              <a:tailEnd type="triangle"/>
+            </a:ln>
+          </p:spPr>
+          <p:style>
+            <a:lnRef idx="1">
+              <a:schemeClr val="accent1"/>
+            </a:lnRef>
+            <a:fillRef idx="0">
+              <a:schemeClr val="accent1"/>
+            </a:fillRef>
+            <a:effectRef idx="0">
+              <a:schemeClr val="accent1"/>
+            </a:effectRef>
+            <a:fontRef idx="minor">
+              <a:schemeClr val="tx1"/>
+            </a:fontRef>
+          </p:style>
+        </p:cxnSp>
+        <p:sp>
+          <p:nvSpPr>
+            <p:cNvPr id="5" name="TextBox 4">
+              <a:extLst>
+                <a:ext uri="{FF2B5EF4-FFF2-40B4-BE49-F238E27FC236}">
+                  <a16:creationId xmlns:a16="http://schemas.microsoft.com/office/drawing/2014/main" id="{FB7D1191-B076-4898-9B0F-3270A8A581F9}"/>
+                </a:ext>
+              </a:extLst>
+            </p:cNvPr>
+            <p:cNvSpPr txBox="1"/>
+            <p:nvPr/>
+          </p:nvSpPr>
+          <p:spPr>
+            <a:xfrm>
+              <a:off x="3396578" y="405400"/>
+              <a:ext cx="7621449" cy="369332"/>
+            </a:xfrm>
+            <a:prstGeom prst="rect">
+              <a:avLst/>
+            </a:prstGeom>
+            <a:solidFill>
+              <a:schemeClr val="accent2"/>
+            </a:solidFill>
+          </p:spPr>
+          <p:txBody>
+            <a:bodyPr wrap="square" rtlCol="0">
+              <a:spAutoFit/>
+            </a:bodyPr>
+            <a:lstStyle/>
+            <a:p>
+              <a:pPr algn="ctr"/>
+              <a:r>
+                <a:rPr lang="en-US" dirty="0"/>
+                <a:t>Previous Crop</a:t>
+              </a:r>
+            </a:p>
+          </p:txBody>
+        </p:sp>
+        <p:cxnSp>
+          <p:nvCxnSpPr>
+            <p:cNvPr id="94" name="Straight Arrow Connector 93">
+              <a:extLst>
+                <a:ext uri="{FF2B5EF4-FFF2-40B4-BE49-F238E27FC236}">
+                  <a16:creationId xmlns:a16="http://schemas.microsoft.com/office/drawing/2014/main" id="{690588DE-30A4-4BEC-A610-E55B1803AB55}"/>
+                </a:ext>
+              </a:extLst>
+            </p:cNvPr>
+            <p:cNvCxnSpPr>
+              <a:cxnSpLocks/>
+              <a:endCxn id="12" idx="1"/>
+            </p:cNvCxnSpPr>
+            <p:nvPr/>
+          </p:nvCxnSpPr>
+          <p:spPr>
+            <a:xfrm flipV="1">
+              <a:off x="646744" y="6197367"/>
+              <a:ext cx="5572246" cy="5884"/>
+            </a:xfrm>
+            <a:prstGeom prst="straightConnector1">
+              <a:avLst/>
+            </a:prstGeom>
+            <a:ln w="12700">
+              <a:solidFill>
+                <a:schemeClr val="bg2">
+                  <a:lumMod val="75000"/>
+                </a:schemeClr>
+              </a:solidFill>
+              <a:prstDash val="sysDash"/>
+              <a:tailEnd type="triangle"/>
+            </a:ln>
+          </p:spPr>
+          <p:style>
+            <a:lnRef idx="1">
+              <a:schemeClr val="accent1"/>
+            </a:lnRef>
+            <a:fillRef idx="0">
+              <a:schemeClr val="accent1"/>
+            </a:fillRef>
+            <a:effectRef idx="0">
+              <a:schemeClr val="accent1"/>
+            </a:effectRef>
+            <a:fontRef idx="minor">
+              <a:schemeClr val="tx1"/>
+            </a:fontRef>
+          </p:style>
+        </p:cxnSp>
+        <p:cxnSp>
+          <p:nvCxnSpPr>
+            <p:cNvPr id="97" name="Straight Connector 96">
+              <a:extLst>
+                <a:ext uri="{FF2B5EF4-FFF2-40B4-BE49-F238E27FC236}">
+                  <a16:creationId xmlns:a16="http://schemas.microsoft.com/office/drawing/2014/main" id="{5A3131BE-2CCC-4F21-8B85-8FE573AA913C}"/>
+                </a:ext>
+              </a:extLst>
+            </p:cNvPr>
+            <p:cNvCxnSpPr>
+              <a:stCxn id="40" idx="2"/>
+            </p:cNvCxnSpPr>
+            <p:nvPr/>
+          </p:nvCxnSpPr>
+          <p:spPr>
+            <a:xfrm flipH="1">
+              <a:off x="646744" y="3232544"/>
+              <a:ext cx="1" cy="2973184"/>
+            </a:xfrm>
+            <a:prstGeom prst="line">
+              <a:avLst/>
+            </a:prstGeom>
+            <a:ln w="12700">
+              <a:solidFill>
+                <a:schemeClr val="bg2">
+                  <a:lumMod val="75000"/>
+                </a:schemeClr>
+              </a:solidFill>
+              <a:prstDash val="sysDash"/>
+            </a:ln>
+          </p:spPr>
+          <p:style>
+            <a:lnRef idx="1">
+              <a:schemeClr val="accent1"/>
+            </a:lnRef>
+            <a:fillRef idx="0">
+              <a:schemeClr val="accent1"/>
+            </a:fillRef>
+            <a:effectRef idx="0">
+              <a:schemeClr val="accent1"/>
+            </a:effectRef>
+            <a:fontRef idx="minor">
+              <a:schemeClr val="tx1"/>
+            </a:fontRef>
+          </p:style>
+        </p:cxnSp>
+        <p:cxnSp>
+          <p:nvCxnSpPr>
+            <p:cNvPr id="99" name="Straight Connector 98">
+              <a:extLst>
+                <a:ext uri="{FF2B5EF4-FFF2-40B4-BE49-F238E27FC236}">
+                  <a16:creationId xmlns:a16="http://schemas.microsoft.com/office/drawing/2014/main" id="{0421ADB1-7B54-4E34-9C80-9EF687584961}"/>
+                </a:ext>
+              </a:extLst>
+            </p:cNvPr>
+            <p:cNvCxnSpPr/>
+            <p:nvPr/>
+          </p:nvCxnSpPr>
+          <p:spPr>
+            <a:xfrm flipH="1">
+              <a:off x="2391629" y="3230066"/>
+              <a:ext cx="1" cy="2973184"/>
+            </a:xfrm>
+            <a:prstGeom prst="line">
+              <a:avLst/>
+            </a:prstGeom>
+            <a:ln w="12700">
+              <a:solidFill>
+                <a:schemeClr val="bg2">
+                  <a:lumMod val="75000"/>
+                </a:schemeClr>
+              </a:solidFill>
+              <a:prstDash val="sysDash"/>
+            </a:ln>
+          </p:spPr>
+          <p:style>
+            <a:lnRef idx="1">
+              <a:schemeClr val="accent1"/>
+            </a:lnRef>
+            <a:fillRef idx="0">
+              <a:schemeClr val="accent1"/>
+            </a:fillRef>
+            <a:effectRef idx="0">
+              <a:schemeClr val="accent1"/>
+            </a:effectRef>
+            <a:fontRef idx="minor">
+              <a:schemeClr val="tx1"/>
+            </a:fontRef>
+          </p:style>
+        </p:cxnSp>
+        <p:cxnSp>
+          <p:nvCxnSpPr>
+            <p:cNvPr id="100" name="Straight Arrow Connector 99">
+              <a:extLst>
+                <a:ext uri="{FF2B5EF4-FFF2-40B4-BE49-F238E27FC236}">
+                  <a16:creationId xmlns:a16="http://schemas.microsoft.com/office/drawing/2014/main" id="{E017AB7F-25DC-4D92-B58D-D77D92CA8150}"/>
+                </a:ext>
+              </a:extLst>
+            </p:cNvPr>
+            <p:cNvCxnSpPr>
+              <a:cxnSpLocks/>
+              <a:stCxn id="37" idx="3"/>
+              <a:endCxn id="42" idx="1"/>
+            </p:cNvCxnSpPr>
+            <p:nvPr/>
+          </p:nvCxnSpPr>
+          <p:spPr>
+            <a:xfrm>
+              <a:off x="5134817" y="4135786"/>
+              <a:ext cx="561233" cy="0"/>
+            </a:xfrm>
+            <a:prstGeom prst="straightConnector1">
+              <a:avLst/>
+            </a:prstGeom>
+            <a:ln w="19050">
+              <a:solidFill>
+                <a:schemeClr val="tx1"/>
+              </a:solidFill>
+              <a:tailEnd type="triangle"/>
+            </a:ln>
+          </p:spPr>
+          <p:style>
+            <a:lnRef idx="1">
+              <a:schemeClr val="accent1"/>
+            </a:lnRef>
+            <a:fillRef idx="0">
+              <a:schemeClr val="accent1"/>
+            </a:fillRef>
+            <a:effectRef idx="0">
+              <a:schemeClr val="accent1"/>
+            </a:effectRef>
+            <a:fontRef idx="minor">
+              <a:schemeClr val="tx1"/>
+            </a:fontRef>
+          </p:style>
+        </p:cxnSp>
+        <p:cxnSp>
+          <p:nvCxnSpPr>
+            <p:cNvPr id="103" name="Straight Connector 102">
+              <a:extLst>
+                <a:ext uri="{FF2B5EF4-FFF2-40B4-BE49-F238E27FC236}">
+                  <a16:creationId xmlns:a16="http://schemas.microsoft.com/office/drawing/2014/main" id="{C031D529-3B64-4D02-8D22-B111957738C3}"/>
+                </a:ext>
+              </a:extLst>
+            </p:cNvPr>
+            <p:cNvCxnSpPr>
+              <a:cxnSpLocks/>
+            </p:cNvCxnSpPr>
+            <p:nvPr/>
+          </p:nvCxnSpPr>
+          <p:spPr>
+            <a:xfrm flipH="1">
+              <a:off x="3885155" y="5012085"/>
+              <a:ext cx="1" cy="1191165"/>
+            </a:xfrm>
+            <a:prstGeom prst="line">
+              <a:avLst/>
+            </a:prstGeom>
+            <a:ln w="12700">
+              <a:solidFill>
+                <a:schemeClr val="bg2">
+                  <a:lumMod val="75000"/>
+                </a:schemeClr>
+              </a:solidFill>
+              <a:prstDash val="sysDash"/>
+            </a:ln>
+          </p:spPr>
+          <p:style>
+            <a:lnRef idx="1">
+              <a:schemeClr val="accent1"/>
+            </a:lnRef>
+            <a:fillRef idx="0">
+              <a:schemeClr val="accent1"/>
+            </a:fillRef>
+            <a:effectRef idx="0">
+              <a:schemeClr val="accent1"/>
+            </a:effectRef>
+            <a:fontRef idx="minor">
+              <a:schemeClr val="tx1"/>
+            </a:fontRef>
+          </p:style>
+        </p:cxnSp>
+        <p:sp>
+          <p:nvSpPr>
+            <p:cNvPr id="58" name="TextBox 57">
+              <a:extLst>
+                <a:ext uri="{FF2B5EF4-FFF2-40B4-BE49-F238E27FC236}">
+                  <a16:creationId xmlns:a16="http://schemas.microsoft.com/office/drawing/2014/main" id="{9C5D36EB-7B3E-4476-870C-F7C91DFDF3C2}"/>
+                </a:ext>
+              </a:extLst>
+            </p:cNvPr>
+            <p:cNvSpPr txBox="1"/>
+            <p:nvPr/>
+          </p:nvSpPr>
+          <p:spPr>
+            <a:xfrm>
+              <a:off x="3270460" y="4642753"/>
+              <a:ext cx="1637243" cy="369332"/>
+            </a:xfrm>
+            <a:prstGeom prst="rect">
+              <a:avLst/>
+            </a:prstGeom>
+            <a:solidFill>
+              <a:schemeClr val="bg2">
+                <a:lumMod val="40000"/>
+                <a:lumOff val="60000"/>
+              </a:schemeClr>
+            </a:solidFill>
+          </p:spPr>
+          <p:txBody>
+            <a:bodyPr wrap="none" rtlCol="0">
+              <a:spAutoFit/>
+            </a:bodyPr>
+            <a:lstStyle/>
+            <a:p>
+              <a:r>
+                <a:rPr lang="en-US" dirty="0"/>
+                <a:t>Emergence Day</a:t>
+              </a:r>
+            </a:p>
+          </p:txBody>
+        </p:sp>
+        <p:cxnSp>
+          <p:nvCxnSpPr>
+            <p:cNvPr id="60" name="Straight Arrow Connector 59">
+              <a:extLst>
+                <a:ext uri="{FF2B5EF4-FFF2-40B4-BE49-F238E27FC236}">
+                  <a16:creationId xmlns:a16="http://schemas.microsoft.com/office/drawing/2014/main" id="{6ADF7F4A-E999-4873-AED9-391655338804}"/>
+                </a:ext>
+              </a:extLst>
+            </p:cNvPr>
+            <p:cNvCxnSpPr>
+              <a:cxnSpLocks/>
+            </p:cNvCxnSpPr>
+            <p:nvPr/>
+          </p:nvCxnSpPr>
+          <p:spPr>
+            <a:xfrm>
+              <a:off x="3879803" y="4320452"/>
+              <a:ext cx="0" cy="334067"/>
+            </a:xfrm>
+            <a:prstGeom prst="straightConnector1">
+              <a:avLst/>
+            </a:prstGeom>
+            <a:ln w="12700">
+              <a:solidFill>
+                <a:schemeClr val="bg2">
+                  <a:lumMod val="75000"/>
+                </a:schemeClr>
+              </a:solidFill>
+              <a:prstDash val="sysDash"/>
+              <a:tailEnd type="triangle"/>
+            </a:ln>
+          </p:spPr>
+          <p:style>
+            <a:lnRef idx="1">
+              <a:schemeClr val="accent1"/>
+            </a:lnRef>
+            <a:fillRef idx="0">
+              <a:schemeClr val="accent1"/>
+            </a:fillRef>
+            <a:effectRef idx="0">
+              <a:schemeClr val="accent1"/>
+            </a:effectRef>
+            <a:fontRef idx="minor">
+              <a:schemeClr val="tx1"/>
+            </a:fontRef>
+          </p:style>
+        </p:cxnSp>
+        <p:cxnSp>
+          <p:nvCxnSpPr>
+            <p:cNvPr id="61" name="Straight Arrow Connector 60">
+              <a:extLst>
+                <a:ext uri="{FF2B5EF4-FFF2-40B4-BE49-F238E27FC236}">
+                  <a16:creationId xmlns:a16="http://schemas.microsoft.com/office/drawing/2014/main" id="{2F4B8D6B-6F34-4F20-8E8A-75225967EF40}"/>
+                </a:ext>
+              </a:extLst>
+            </p:cNvPr>
+            <p:cNvCxnSpPr>
+              <a:cxnSpLocks/>
+            </p:cNvCxnSpPr>
+            <p:nvPr/>
+          </p:nvCxnSpPr>
+          <p:spPr>
+            <a:xfrm>
+              <a:off x="10875408" y="753063"/>
+              <a:ext cx="0" cy="2056747"/>
+            </a:xfrm>
+            <a:prstGeom prst="straightConnector1">
+              <a:avLst/>
+            </a:prstGeom>
+            <a:ln w="57150">
+              <a:solidFill>
+                <a:schemeClr val="tx1"/>
+              </a:solidFill>
+              <a:tailEnd type="triangle"/>
+            </a:ln>
+          </p:spPr>
+          <p:style>
+            <a:lnRef idx="1">
+              <a:schemeClr val="accent1"/>
+            </a:lnRef>
+            <a:fillRef idx="0">
+              <a:schemeClr val="accent1"/>
+            </a:fillRef>
+            <a:effectRef idx="0">
+              <a:schemeClr val="accent1"/>
+            </a:effectRef>
+            <a:fontRef idx="minor">
+              <a:schemeClr val="tx1"/>
+            </a:fontRef>
+          </p:style>
+        </p:cxnSp>
+        <p:sp>
+          <p:nvSpPr>
+            <p:cNvPr id="2" name="Rectangle 1">
+              <a:extLst>
+                <a:ext uri="{FF2B5EF4-FFF2-40B4-BE49-F238E27FC236}">
+                  <a16:creationId xmlns:a16="http://schemas.microsoft.com/office/drawing/2014/main" id="{07BEBFF8-A687-48C4-937A-B4F2BE28ADA5}"/>
+                </a:ext>
+              </a:extLst>
+            </p:cNvPr>
+            <p:cNvSpPr/>
+            <p:nvPr/>
+          </p:nvSpPr>
+          <p:spPr>
+            <a:xfrm>
+              <a:off x="6330319" y="3516804"/>
+              <a:ext cx="128248" cy="145222"/>
+            </a:xfrm>
+            <a:prstGeom prst="rect">
+              <a:avLst/>
+            </a:prstGeom>
+            <a:solidFill>
+              <a:schemeClr val="bg1"/>
+            </a:solidFill>
+            <a:ln>
+              <a:noFill/>
+            </a:ln>
+          </p:spPr>
+          <p:style>
+            <a:lnRef idx="2">
+              <a:schemeClr val="accent1">
+                <a:shade val="50000"/>
+              </a:schemeClr>
+            </a:lnRef>
+            <a:fillRef idx="1">
+              <a:schemeClr val="accent1"/>
+            </a:fillRef>
+            <a:effectRef idx="0">
+              <a:schemeClr val="accent1"/>
+            </a:effectRef>
+            <a:fontRef idx="minor">
+              <a:schemeClr val="lt1"/>
+            </a:fontRef>
+          </p:style>
+          <p:txBody>
+            <a:bodyPr rtlCol="0" anchor="ctr"/>
+            <a:lstStyle/>
+            <a:p>
+              <a:pPr algn="ctr"/>
+              <a:endParaRPr lang="en-US"/>
+            </a:p>
+          </p:txBody>
+        </p:sp>
+        <p:cxnSp>
+          <p:nvCxnSpPr>
+            <p:cNvPr id="75" name="Straight Arrow Connector 74">
+              <a:extLst>
+                <a:ext uri="{FF2B5EF4-FFF2-40B4-BE49-F238E27FC236}">
+                  <a16:creationId xmlns:a16="http://schemas.microsoft.com/office/drawing/2014/main" id="{76A977F8-4785-4E1A-909E-0F43CCC64B80}"/>
+                </a:ext>
+              </a:extLst>
+            </p:cNvPr>
+            <p:cNvCxnSpPr>
+              <a:cxnSpLocks/>
+            </p:cNvCxnSpPr>
+            <p:nvPr/>
+          </p:nvCxnSpPr>
+          <p:spPr>
+            <a:xfrm>
+              <a:off x="6387707" y="3231305"/>
+              <a:ext cx="0" cy="721054"/>
+            </a:xfrm>
+            <a:prstGeom prst="straightConnector1">
+              <a:avLst/>
+            </a:prstGeom>
+            <a:ln w="19050">
+              <a:solidFill>
+                <a:schemeClr val="tx1"/>
+              </a:solidFill>
+              <a:tailEnd type="triangle"/>
+            </a:ln>
+          </p:spPr>
+          <p:style>
+            <a:lnRef idx="1">
+              <a:schemeClr val="accent1"/>
+            </a:lnRef>
+            <a:fillRef idx="0">
+              <a:schemeClr val="accent1"/>
+            </a:fillRef>
+            <a:effectRef idx="0">
+              <a:schemeClr val="accent1"/>
+            </a:effectRef>
+            <a:fontRef idx="minor">
+              <a:schemeClr val="tx1"/>
+            </a:fontRef>
+          </p:style>
+        </p:cxnSp>
+        <p:sp>
+          <p:nvSpPr>
+            <p:cNvPr id="63" name="Rectangle 62">
+              <a:extLst>
+                <a:ext uri="{FF2B5EF4-FFF2-40B4-BE49-F238E27FC236}">
+                  <a16:creationId xmlns:a16="http://schemas.microsoft.com/office/drawing/2014/main" id="{21470CFF-E20D-4C5C-9253-984492DFD85F}"/>
+                </a:ext>
+              </a:extLst>
+            </p:cNvPr>
+            <p:cNvSpPr/>
+            <p:nvPr/>
+          </p:nvSpPr>
+          <p:spPr>
+            <a:xfrm>
+              <a:off x="6949797" y="3498578"/>
+              <a:ext cx="128248" cy="145222"/>
+            </a:xfrm>
+            <a:prstGeom prst="rect">
+              <a:avLst/>
+            </a:prstGeom>
+            <a:solidFill>
+              <a:schemeClr val="bg1"/>
+            </a:solidFill>
+            <a:ln>
+              <a:noFill/>
+            </a:ln>
+          </p:spPr>
+          <p:style>
+            <a:lnRef idx="2">
+              <a:schemeClr val="accent1">
+                <a:shade val="50000"/>
+              </a:schemeClr>
+            </a:lnRef>
+            <a:fillRef idx="1">
+              <a:schemeClr val="accent1"/>
+            </a:fillRef>
+            <a:effectRef idx="0">
+              <a:schemeClr val="accent1"/>
+            </a:effectRef>
+            <a:fontRef idx="minor">
+              <a:schemeClr val="lt1"/>
+            </a:fontRef>
+          </p:style>
+          <p:txBody>
+            <a:bodyPr rtlCol="0" anchor="ctr"/>
+            <a:lstStyle/>
+            <a:p>
+              <a:pPr algn="ctr"/>
+              <a:endParaRPr lang="en-US"/>
+            </a:p>
+          </p:txBody>
+        </p:sp>
+        <p:sp>
+          <p:nvSpPr>
+            <p:cNvPr id="64" name="Rectangle 63">
+              <a:extLst>
+                <a:ext uri="{FF2B5EF4-FFF2-40B4-BE49-F238E27FC236}">
+                  <a16:creationId xmlns:a16="http://schemas.microsoft.com/office/drawing/2014/main" id="{5E85C8EC-A4EB-405D-8B99-89A65282CA04}"/>
+                </a:ext>
+              </a:extLst>
+            </p:cNvPr>
+            <p:cNvSpPr/>
+            <p:nvPr/>
+          </p:nvSpPr>
+          <p:spPr>
+            <a:xfrm>
+              <a:off x="6951277" y="3002904"/>
+              <a:ext cx="128248" cy="145222"/>
+            </a:xfrm>
+            <a:prstGeom prst="rect">
+              <a:avLst/>
+            </a:prstGeom>
+            <a:solidFill>
+              <a:schemeClr val="bg1"/>
+            </a:solidFill>
+            <a:ln>
+              <a:noFill/>
+            </a:ln>
+          </p:spPr>
+          <p:style>
+            <a:lnRef idx="2">
+              <a:schemeClr val="accent1">
+                <a:shade val="50000"/>
+              </a:schemeClr>
+            </a:lnRef>
+            <a:fillRef idx="1">
+              <a:schemeClr val="accent1"/>
+            </a:fillRef>
+            <a:effectRef idx="0">
+              <a:schemeClr val="accent1"/>
+            </a:effectRef>
+            <a:fontRef idx="minor">
+              <a:schemeClr val="lt1"/>
+            </a:fontRef>
+          </p:style>
+          <p:txBody>
+            <a:bodyPr rtlCol="0" anchor="ctr"/>
+            <a:lstStyle/>
+            <a:p>
+              <a:pPr algn="ctr"/>
+              <a:endParaRPr lang="en-US"/>
+            </a:p>
+          </p:txBody>
+        </p:sp>
+        <p:cxnSp>
+          <p:nvCxnSpPr>
+            <p:cNvPr id="55" name="Straight Arrow Connector 54">
+              <a:extLst>
+                <a:ext uri="{FF2B5EF4-FFF2-40B4-BE49-F238E27FC236}">
+                  <a16:creationId xmlns:a16="http://schemas.microsoft.com/office/drawing/2014/main" id="{5D8D7D46-2A1D-45AD-B6A1-5746E33716E6}"/>
+                </a:ext>
+              </a:extLst>
+            </p:cNvPr>
+            <p:cNvCxnSpPr>
+              <a:cxnSpLocks/>
+            </p:cNvCxnSpPr>
+            <p:nvPr/>
+          </p:nvCxnSpPr>
+          <p:spPr>
+            <a:xfrm flipH="1">
+              <a:off x="7014462" y="2092389"/>
+              <a:ext cx="2" cy="1832263"/>
+            </a:xfrm>
+            <a:prstGeom prst="straightConnector1">
+              <a:avLst/>
+            </a:prstGeom>
+            <a:ln w="57150">
+              <a:solidFill>
+                <a:schemeClr val="tx1"/>
+              </a:solidFill>
+              <a:tailEnd type="triangle"/>
+            </a:ln>
+          </p:spPr>
+          <p:style>
+            <a:lnRef idx="1">
+              <a:schemeClr val="accent1"/>
+            </a:lnRef>
+            <a:fillRef idx="0">
+              <a:schemeClr val="accent1"/>
+            </a:fillRef>
+            <a:effectRef idx="0">
+              <a:schemeClr val="accent1"/>
+            </a:effectRef>
+            <a:fontRef idx="minor">
+              <a:schemeClr val="tx1"/>
+            </a:fontRef>
+          </p:style>
+        </p:cxnSp>
+        <p:cxnSp>
+          <p:nvCxnSpPr>
+            <p:cNvPr id="66" name="Straight Arrow Connector 65">
+              <a:extLst>
+                <a:ext uri="{FF2B5EF4-FFF2-40B4-BE49-F238E27FC236}">
+                  <a16:creationId xmlns:a16="http://schemas.microsoft.com/office/drawing/2014/main" id="{F38062AB-3426-468E-A20F-02D159FF5BE0}"/>
+                </a:ext>
+              </a:extLst>
+            </p:cNvPr>
+            <p:cNvCxnSpPr/>
+            <p:nvPr/>
+          </p:nvCxnSpPr>
+          <p:spPr>
+            <a:xfrm>
+              <a:off x="5954072" y="3599850"/>
+              <a:ext cx="1" cy="351270"/>
+            </a:xfrm>
+            <a:prstGeom prst="straightConnector1">
+              <a:avLst/>
+            </a:prstGeom>
+            <a:ln w="19050">
+              <a:solidFill>
+                <a:schemeClr val="tx1"/>
+              </a:solidFill>
+              <a:tailEnd type="triangle"/>
+            </a:ln>
+          </p:spPr>
+          <p:style>
+            <a:lnRef idx="1">
+              <a:schemeClr val="accent1"/>
+            </a:lnRef>
+            <a:fillRef idx="0">
+              <a:schemeClr val="accent1"/>
+            </a:fillRef>
+            <a:effectRef idx="0">
+              <a:schemeClr val="accent1"/>
+            </a:effectRef>
+            <a:fontRef idx="minor">
+              <a:schemeClr val="tx1"/>
+            </a:fontRef>
+          </p:style>
+        </p:cxnSp>
+        <p:sp>
+          <p:nvSpPr>
+            <p:cNvPr id="69" name="Rectangle 68">
+              <a:extLst>
+                <a:ext uri="{FF2B5EF4-FFF2-40B4-BE49-F238E27FC236}">
+                  <a16:creationId xmlns:a16="http://schemas.microsoft.com/office/drawing/2014/main" id="{98EF623B-F444-4230-8E70-281038687623}"/>
+                </a:ext>
+              </a:extLst>
+            </p:cNvPr>
+            <p:cNvSpPr/>
+            <p:nvPr/>
+          </p:nvSpPr>
+          <p:spPr>
+            <a:xfrm>
+              <a:off x="4850214" y="3536432"/>
+              <a:ext cx="128248" cy="145222"/>
+            </a:xfrm>
+            <a:prstGeom prst="rect">
+              <a:avLst/>
+            </a:prstGeom>
+            <a:solidFill>
+              <a:schemeClr val="bg1"/>
+            </a:solidFill>
+            <a:ln>
+              <a:noFill/>
+            </a:ln>
+          </p:spPr>
+          <p:style>
+            <a:lnRef idx="2">
+              <a:schemeClr val="accent1">
+                <a:shade val="50000"/>
+              </a:schemeClr>
+            </a:lnRef>
+            <a:fillRef idx="1">
+              <a:schemeClr val="accent1"/>
+            </a:fillRef>
+            <a:effectRef idx="0">
+              <a:schemeClr val="accent1"/>
+            </a:effectRef>
+            <a:fontRef idx="minor">
+              <a:schemeClr val="lt1"/>
+            </a:fontRef>
+          </p:style>
+          <p:txBody>
+            <a:bodyPr rtlCol="0" anchor="ctr"/>
+            <a:lstStyle/>
+            <a:p>
+              <a:pPr algn="ctr"/>
+              <a:endParaRPr lang="en-US"/>
+            </a:p>
+          </p:txBody>
+        </p:sp>
+        <p:cxnSp>
+          <p:nvCxnSpPr>
+            <p:cNvPr id="67" name="Straight Arrow Connector 66">
+              <a:extLst>
+                <a:ext uri="{FF2B5EF4-FFF2-40B4-BE49-F238E27FC236}">
+                  <a16:creationId xmlns:a16="http://schemas.microsoft.com/office/drawing/2014/main" id="{76A977F8-4785-4E1A-909E-0F43CCC64B80}"/>
+                </a:ext>
+              </a:extLst>
+            </p:cNvPr>
+            <p:cNvCxnSpPr>
+              <a:cxnSpLocks/>
+            </p:cNvCxnSpPr>
+            <p:nvPr/>
+          </p:nvCxnSpPr>
+          <p:spPr>
+            <a:xfrm>
+              <a:off x="4920886" y="3412188"/>
+              <a:ext cx="0" cy="538932"/>
+            </a:xfrm>
+            <a:prstGeom prst="straightConnector1">
+              <a:avLst/>
+            </a:prstGeom>
+            <a:ln w="19050">
+              <a:solidFill>
+                <a:schemeClr val="tx1"/>
+              </a:solidFill>
+              <a:tailEnd type="triangle"/>
+            </a:ln>
+          </p:spPr>
+          <p:style>
+            <a:lnRef idx="1">
+              <a:schemeClr val="accent1"/>
+            </a:lnRef>
+            <a:fillRef idx="0">
+              <a:schemeClr val="accent1"/>
+            </a:fillRef>
+            <a:effectRef idx="0">
+              <a:schemeClr val="accent1"/>
+            </a:effectRef>
+            <a:fontRef idx="minor">
+              <a:schemeClr val="tx1"/>
+            </a:fontRef>
+          </p:style>
+        </p:cxnSp>
+        <p:cxnSp>
+          <p:nvCxnSpPr>
+            <p:cNvPr id="70" name="Straight Connector 69">
+              <a:extLst>
+                <a:ext uri="{FF2B5EF4-FFF2-40B4-BE49-F238E27FC236}">
+                  <a16:creationId xmlns:a16="http://schemas.microsoft.com/office/drawing/2014/main" id="{27D25462-1569-46E6-BE3A-49EB120D35BA}"/>
+                </a:ext>
+              </a:extLst>
+            </p:cNvPr>
+            <p:cNvCxnSpPr>
+              <a:cxnSpLocks/>
+            </p:cNvCxnSpPr>
+            <p:nvPr/>
+          </p:nvCxnSpPr>
+          <p:spPr>
+            <a:xfrm>
+              <a:off x="4920359" y="3417570"/>
+              <a:ext cx="1470181" cy="0"/>
+            </a:xfrm>
+            <a:prstGeom prst="line">
+              <a:avLst/>
+            </a:prstGeom>
+            <a:ln w="19050">
+              <a:solidFill>
+                <a:schemeClr val="tx1"/>
+              </a:solidFill>
+            </a:ln>
+          </p:spPr>
+          <p:style>
+            <a:lnRef idx="1">
+              <a:schemeClr val="accent1"/>
+            </a:lnRef>
+            <a:fillRef idx="0">
+              <a:schemeClr val="accent1"/>
+            </a:fillRef>
+            <a:effectRef idx="0">
+              <a:schemeClr val="accent1"/>
+            </a:effectRef>
+            <a:fontRef idx="minor">
+              <a:schemeClr val="tx1"/>
+            </a:fontRef>
+          </p:style>
+        </p:cxnSp>
+      </p:grpSp>
+    </p:spTree>
+    <p:extLst>
+      <p:ext uri="{BB962C8B-B14F-4D97-AF65-F5344CB8AC3E}">
+        <p14:creationId xmlns:p14="http://schemas.microsoft.com/office/powerpoint/2010/main" val="3297819989"/>
+      </p:ext>
+    </p:extLst>
+  </p:cSld>
+  <p:clrMapOvr>
+    <a:masterClrMapping/>
+  </p:clrMapOvr>
+</p:sld>
+</file>
+
+<file path=ppt/slides/slide4.xml><?xml version="1.0" encoding="utf-8"?>
 <p:sld xmlns:a="http://schemas.openxmlformats.org/drawingml/2006/main" xmlns:r="http://schemas.openxmlformats.org/officeDocument/2006/relationships" xmlns:p="http://schemas.openxmlformats.org/presentationml/2006/main">
   <p:cSld>
     <p:spTree>
@@ -8560,42 +10985,42 @@
 <file path=ppt/theme/theme1.xml><?xml version="1.0" encoding="utf-8"?>
 <a:theme xmlns:a="http://schemas.openxmlformats.org/drawingml/2006/main" name="Office Theme">
   <a:themeElements>
-    <a:clrScheme name="Office">
+    <a:clrScheme name="Custom 6">
       <a:dk1>
-        <a:sysClr val="windowText" lastClr="000000"/>
+        <a:srgbClr val="000000"/>
       </a:dk1>
       <a:lt1>
-        <a:sysClr val="window" lastClr="FFFFFF"/>
+        <a:srgbClr val="FFFFFF"/>
       </a:lt1>
       <a:dk2>
-        <a:srgbClr val="44546A"/>
+        <a:srgbClr val="000000"/>
       </a:dk2>
       <a:lt2>
-        <a:srgbClr val="E7E6E6"/>
+        <a:srgbClr val="808080"/>
       </a:lt2>
       <a:accent1>
-        <a:srgbClr val="4472C4"/>
+        <a:srgbClr val="2D2D8A"/>
       </a:accent1>
       <a:accent2>
-        <a:srgbClr val="ED7D31"/>
+        <a:srgbClr val="00B050"/>
       </a:accent2>
       <a:accent3>
-        <a:srgbClr val="A5A5A5"/>
+        <a:srgbClr val="FFC000"/>
       </a:accent3>
       <a:accent4>
-        <a:srgbClr val="FFC000"/>
+        <a:srgbClr val="CC0099"/>
       </a:accent4>
       <a:accent5>
-        <a:srgbClr val="5B9BD5"/>
+        <a:srgbClr val="DAEDEF"/>
       </a:accent5>
       <a:accent6>
-        <a:srgbClr val="70AD47"/>
+        <a:srgbClr val="2D2D8A"/>
       </a:accent6>
       <a:hlink>
-        <a:srgbClr val="0563C1"/>
+        <a:srgbClr val="009999"/>
       </a:hlink>
       <a:folHlink>
-        <a:srgbClr val="954F72"/>
+        <a:srgbClr val="009999"/>
       </a:folHlink>
     </a:clrScheme>
     <a:fontScheme name="Office">

</xml_diff>

<commit_message>
abstract and figs manu update
</commit_message>
<xml_diff>
--- a/manuscript/rafa-style-schematic-v1.pptx
+++ b/manuscript/rafa-style-schematic-v1.pptx
@@ -262,7 +262,7 @@
           <a:p>
             <a:fld id="{C1479234-584E-4873-8CD3-B53B1333C3D5}" type="datetimeFigureOut">
               <a:rPr lang="en-US" smtClean="0"/>
-              <a:t>4/28/2021</a:t>
+              <a:t>5/5/2021</a:t>
             </a:fld>
             <a:endParaRPr lang="en-US"/>
           </a:p>
@@ -460,7 +460,7 @@
           <a:p>
             <a:fld id="{C1479234-584E-4873-8CD3-B53B1333C3D5}" type="datetimeFigureOut">
               <a:rPr lang="en-US" smtClean="0"/>
-              <a:t>4/28/2021</a:t>
+              <a:t>5/5/2021</a:t>
             </a:fld>
             <a:endParaRPr lang="en-US"/>
           </a:p>
@@ -668,7 +668,7 @@
           <a:p>
             <a:fld id="{C1479234-584E-4873-8CD3-B53B1333C3D5}" type="datetimeFigureOut">
               <a:rPr lang="en-US" smtClean="0"/>
-              <a:t>4/28/2021</a:t>
+              <a:t>5/5/2021</a:t>
             </a:fld>
             <a:endParaRPr lang="en-US"/>
           </a:p>
@@ -866,7 +866,7 @@
           <a:p>
             <a:fld id="{C1479234-584E-4873-8CD3-B53B1333C3D5}" type="datetimeFigureOut">
               <a:rPr lang="en-US" smtClean="0"/>
-              <a:t>4/28/2021</a:t>
+              <a:t>5/5/2021</a:t>
             </a:fld>
             <a:endParaRPr lang="en-US"/>
           </a:p>
@@ -1141,7 +1141,7 @@
           <a:p>
             <a:fld id="{C1479234-584E-4873-8CD3-B53B1333C3D5}" type="datetimeFigureOut">
               <a:rPr lang="en-US" smtClean="0"/>
-              <a:t>4/28/2021</a:t>
+              <a:t>5/5/2021</a:t>
             </a:fld>
             <a:endParaRPr lang="en-US"/>
           </a:p>
@@ -1406,7 +1406,7 @@
           <a:p>
             <a:fld id="{C1479234-584E-4873-8CD3-B53B1333C3D5}" type="datetimeFigureOut">
               <a:rPr lang="en-US" smtClean="0"/>
-              <a:t>4/28/2021</a:t>
+              <a:t>5/5/2021</a:t>
             </a:fld>
             <a:endParaRPr lang="en-US"/>
           </a:p>
@@ -1818,7 +1818,7 @@
           <a:p>
             <a:fld id="{C1479234-584E-4873-8CD3-B53B1333C3D5}" type="datetimeFigureOut">
               <a:rPr lang="en-US" smtClean="0"/>
-              <a:t>4/28/2021</a:t>
+              <a:t>5/5/2021</a:t>
             </a:fld>
             <a:endParaRPr lang="en-US"/>
           </a:p>
@@ -1959,7 +1959,7 @@
           <a:p>
             <a:fld id="{C1479234-584E-4873-8CD3-B53B1333C3D5}" type="datetimeFigureOut">
               <a:rPr lang="en-US" smtClean="0"/>
-              <a:t>4/28/2021</a:t>
+              <a:t>5/5/2021</a:t>
             </a:fld>
             <a:endParaRPr lang="en-US"/>
           </a:p>
@@ -2072,7 +2072,7 @@
           <a:p>
             <a:fld id="{C1479234-584E-4873-8CD3-B53B1333C3D5}" type="datetimeFigureOut">
               <a:rPr lang="en-US" smtClean="0"/>
-              <a:t>4/28/2021</a:t>
+              <a:t>5/5/2021</a:t>
             </a:fld>
             <a:endParaRPr lang="en-US"/>
           </a:p>
@@ -2383,7 +2383,7 @@
           <a:p>
             <a:fld id="{C1479234-584E-4873-8CD3-B53B1333C3D5}" type="datetimeFigureOut">
               <a:rPr lang="en-US" smtClean="0"/>
-              <a:t>4/28/2021</a:t>
+              <a:t>5/5/2021</a:t>
             </a:fld>
             <a:endParaRPr lang="en-US"/>
           </a:p>
@@ -2671,7 +2671,7 @@
           <a:p>
             <a:fld id="{C1479234-584E-4873-8CD3-B53B1333C3D5}" type="datetimeFigureOut">
               <a:rPr lang="en-US" smtClean="0"/>
-              <a:t>4/28/2021</a:t>
+              <a:t>5/5/2021</a:t>
             </a:fld>
             <a:endParaRPr lang="en-US"/>
           </a:p>
@@ -2912,7 +2912,7 @@
           <a:p>
             <a:fld id="{C1479234-584E-4873-8CD3-B53B1333C3D5}" type="datetimeFigureOut">
               <a:rPr lang="en-US" smtClean="0"/>
-              <a:t>4/28/2021</a:t>
+              <a:t>5/5/2021</a:t>
             </a:fld>
             <a:endParaRPr lang="en-US"/>
           </a:p>
@@ -7988,10 +7988,10 @@
       </p:grpSpPr>
       <p:grpSp>
         <p:nvGrpSpPr>
-          <p:cNvPr id="10" name="Group 9">
-            <a:extLst>
-              <a:ext uri="{FF2B5EF4-FFF2-40B4-BE49-F238E27FC236}">
-                <a16:creationId xmlns:a16="http://schemas.microsoft.com/office/drawing/2014/main" id="{31F9EB94-EEF6-4995-AF46-816DD46DC239}"/>
+          <p:cNvPr id="4" name="Group 3">
+            <a:extLst>
+              <a:ext uri="{FF2B5EF4-FFF2-40B4-BE49-F238E27FC236}">
+                <a16:creationId xmlns:a16="http://schemas.microsoft.com/office/drawing/2014/main" id="{123C9A9A-4D29-4C83-ACC1-391F1BADE728}"/>
               </a:ext>
             </a:extLst>
           </p:cNvPr>
@@ -8000,9 +8000,9 @@
         </p:nvGrpSpPr>
         <p:grpSpPr>
           <a:xfrm>
-            <a:off x="-90829" y="405400"/>
+            <a:off x="0" y="369890"/>
             <a:ext cx="11108856" cy="5976633"/>
-            <a:chOff x="-90829" y="405400"/>
+            <a:chOff x="0" y="369890"/>
             <a:chExt cx="11108856" cy="5976633"/>
           </a:xfrm>
         </p:grpSpPr>
@@ -8020,7 +8020,7 @@
           </p:nvSpPr>
           <p:spPr>
             <a:xfrm>
-              <a:off x="8292582" y="2809810"/>
+              <a:off x="8383411" y="2774300"/>
               <a:ext cx="2725445" cy="1880403"/>
             </a:xfrm>
             <a:prstGeom prst="rect">
@@ -8069,7 +8069,7 @@
           </p:nvSpPr>
           <p:spPr>
             <a:xfrm>
-              <a:off x="5483090" y="1738516"/>
+              <a:off x="5573919" y="1703006"/>
               <a:ext cx="2334485" cy="369332"/>
             </a:xfrm>
             <a:prstGeom prst="rect">
@@ -8109,7 +8109,7 @@
           </p:nvSpPr>
           <p:spPr>
             <a:xfrm>
-              <a:off x="3425871" y="2863212"/>
+              <a:off x="3516700" y="2827702"/>
               <a:ext cx="1757661" cy="369332"/>
             </a:xfrm>
             <a:prstGeom prst="rect">
@@ -8149,7 +8149,7 @@
           </p:nvSpPr>
           <p:spPr>
             <a:xfrm>
-              <a:off x="9716285" y="2899601"/>
+              <a:off x="9807114" y="2864091"/>
               <a:ext cx="1183529" cy="369332"/>
             </a:xfrm>
             <a:prstGeom prst="rect">
@@ -8189,7 +8189,7 @@
           </p:nvSpPr>
           <p:spPr>
             <a:xfrm>
-              <a:off x="6218990" y="6012701"/>
+              <a:off x="6252282" y="5977191"/>
               <a:ext cx="1251496" cy="369332"/>
             </a:xfrm>
             <a:prstGeom prst="rect">
@@ -8226,7 +8226,7 @@
           </p:nvSpPr>
           <p:spPr>
             <a:xfrm>
-              <a:off x="8778272" y="1733628"/>
+              <a:off x="8869101" y="1698118"/>
               <a:ext cx="1687257" cy="369332"/>
             </a:xfrm>
             <a:prstGeom prst="rect">
@@ -8266,7 +8266,7 @@
           </p:nvSpPr>
           <p:spPr>
             <a:xfrm>
-              <a:off x="2562965" y="1745054"/>
+              <a:off x="2653794" y="1709544"/>
               <a:ext cx="2348143" cy="369332"/>
             </a:xfrm>
             <a:prstGeom prst="rect">
@@ -8306,7 +8306,7 @@
           </p:nvSpPr>
           <p:spPr>
             <a:xfrm>
-              <a:off x="4828724" y="2044634"/>
+              <a:off x="4919553" y="2009124"/>
               <a:ext cx="803425" cy="369332"/>
             </a:xfrm>
             <a:prstGeom prst="rect">
@@ -8344,7 +8344,7 @@
           </p:nvCxnSpPr>
           <p:spPr>
             <a:xfrm flipV="1">
-              <a:off x="4911108" y="1923182"/>
+              <a:off x="5001937" y="1887672"/>
               <a:ext cx="571982" cy="6538"/>
             </a:xfrm>
             <a:prstGeom prst="straightConnector1">
@@ -8387,7 +8387,7 @@
           </p:nvSpPr>
           <p:spPr>
             <a:xfrm>
-              <a:off x="9159850" y="3400920"/>
+              <a:off x="9250679" y="3365410"/>
               <a:ext cx="1103764" cy="369332"/>
             </a:xfrm>
             <a:prstGeom prst="rect">
@@ -8426,7 +8426,7 @@
           </p:nvSpPr>
           <p:spPr>
             <a:xfrm>
-              <a:off x="9159850" y="3975783"/>
+              <a:off x="9250679" y="3940273"/>
               <a:ext cx="1112869" cy="369332"/>
             </a:xfrm>
             <a:prstGeom prst="rect">
@@ -8465,7 +8465,7 @@
           </p:nvSpPr>
           <p:spPr>
             <a:xfrm>
-              <a:off x="3270460" y="3951120"/>
+              <a:off x="3361289" y="3915610"/>
               <a:ext cx="1864357" cy="369332"/>
             </a:xfrm>
             <a:prstGeom prst="rect">
@@ -8505,7 +8505,7 @@
           </p:nvSpPr>
           <p:spPr>
             <a:xfrm>
-              <a:off x="5338943" y="2863212"/>
+              <a:off x="5429772" y="2827702"/>
               <a:ext cx="1421415" cy="369332"/>
             </a:xfrm>
             <a:prstGeom prst="rect">
@@ -8545,7 +8545,7 @@
           </p:nvSpPr>
           <p:spPr>
             <a:xfrm>
-              <a:off x="1539730" y="2863212"/>
+              <a:off x="1630559" y="2827702"/>
               <a:ext cx="1730730" cy="369332"/>
             </a:xfrm>
             <a:prstGeom prst="rect">
@@ -8585,7 +8585,7 @@
           </p:nvSpPr>
           <p:spPr>
             <a:xfrm>
-              <a:off x="-90829" y="2863212"/>
+              <a:off x="0" y="2827702"/>
               <a:ext cx="1475147" cy="369332"/>
             </a:xfrm>
             <a:prstGeom prst="rect">
@@ -8625,7 +8625,7 @@
           </p:nvSpPr>
           <p:spPr>
             <a:xfrm>
-              <a:off x="5696050" y="3951120"/>
+              <a:off x="5786879" y="3915610"/>
               <a:ext cx="2182303" cy="369332"/>
             </a:xfrm>
             <a:prstGeom prst="rect">
@@ -8666,7 +8666,7 @@
           </p:nvCxnSpPr>
           <p:spPr>
             <a:xfrm>
-              <a:off x="10263614" y="4699344"/>
+              <a:off x="10354443" y="4663834"/>
               <a:ext cx="0" cy="700042"/>
             </a:xfrm>
             <a:prstGeom prst="straightConnector1">
@@ -8708,7 +8708,7 @@
           </p:nvSpPr>
           <p:spPr>
             <a:xfrm>
-              <a:off x="9766991" y="5608459"/>
+              <a:off x="9857820" y="5572949"/>
               <a:ext cx="1016625" cy="369332"/>
             </a:xfrm>
             <a:prstGeom prst="rect">
@@ -8743,7 +8743,7 @@
           </p:nvSpPr>
           <p:spPr>
             <a:xfrm>
-              <a:off x="6011059" y="5003420"/>
+              <a:off x="6101888" y="4967910"/>
               <a:ext cx="1552284" cy="369332"/>
             </a:xfrm>
             <a:prstGeom prst="rect">
@@ -8785,7 +8785,7 @@
           </p:nvCxnSpPr>
           <p:spPr>
             <a:xfrm>
-              <a:off x="646744" y="2467992"/>
+              <a:off x="737573" y="2432482"/>
               <a:ext cx="1" cy="395220"/>
             </a:xfrm>
             <a:prstGeom prst="straightConnector1">
@@ -8830,7 +8830,7 @@
           </p:nvCxnSpPr>
           <p:spPr>
             <a:xfrm>
-              <a:off x="2391634" y="2467992"/>
+              <a:off x="2482463" y="2432482"/>
               <a:ext cx="1" cy="395220"/>
             </a:xfrm>
             <a:prstGeom prst="straightConnector1">
@@ -8875,7 +8875,7 @@
           </p:nvCxnSpPr>
           <p:spPr>
             <a:xfrm>
-              <a:off x="4277775" y="2467992"/>
+              <a:off x="4368604" y="2432482"/>
               <a:ext cx="1" cy="395220"/>
             </a:xfrm>
             <a:prstGeom prst="straightConnector1">
@@ -8917,7 +8917,7 @@
           </p:nvCxnSpPr>
           <p:spPr>
             <a:xfrm>
-              <a:off x="6035435" y="2481240"/>
+              <a:off x="6126264" y="2445730"/>
               <a:ext cx="1" cy="395220"/>
             </a:xfrm>
             <a:prstGeom prst="straightConnector1">
@@ -8959,7 +8959,7 @@
           </p:nvCxnSpPr>
           <p:spPr>
             <a:xfrm>
-              <a:off x="660905" y="2481240"/>
+              <a:off x="751734" y="2445730"/>
               <a:ext cx="5374531" cy="0"/>
             </a:xfrm>
             <a:prstGeom prst="line">
@@ -9000,7 +9000,7 @@
           </p:nvCxnSpPr>
           <p:spPr>
             <a:xfrm>
-              <a:off x="3734941" y="2105701"/>
+              <a:off x="3825770" y="2070191"/>
               <a:ext cx="1" cy="395220"/>
             </a:xfrm>
             <a:prstGeom prst="straightConnector1">
@@ -9046,7 +9046,7 @@
           </p:nvCxnSpPr>
           <p:spPr>
             <a:xfrm flipV="1">
-              <a:off x="7817575" y="1918294"/>
+              <a:off x="7908404" y="1882784"/>
               <a:ext cx="960697" cy="4888"/>
             </a:xfrm>
             <a:prstGeom prst="straightConnector1">
@@ -9088,7 +9088,7 @@
           </p:nvCxnSpPr>
           <p:spPr>
             <a:xfrm>
-              <a:off x="9640836" y="2114386"/>
+              <a:off x="9731665" y="2078876"/>
               <a:ext cx="0" cy="700042"/>
             </a:xfrm>
             <a:prstGeom prst="straightConnector1">
@@ -9133,8 +9133,8 @@
           </p:nvCxnSpPr>
           <p:spPr>
             <a:xfrm>
-              <a:off x="6787201" y="5372752"/>
-              <a:ext cx="57537" cy="639949"/>
+              <a:off x="6878030" y="5337242"/>
+              <a:ext cx="0" cy="639949"/>
             </a:xfrm>
             <a:prstGeom prst="straightConnector1">
               <a:avLst/>
@@ -9177,7 +9177,7 @@
           </p:nvCxnSpPr>
           <p:spPr>
             <a:xfrm flipH="1">
-              <a:off x="6787201" y="5661843"/>
+              <a:off x="6878030" y="5626333"/>
               <a:ext cx="2054959" cy="0"/>
             </a:xfrm>
             <a:prstGeom prst="straightConnector1">
@@ -9219,7 +9219,7 @@
           </p:nvCxnSpPr>
           <p:spPr>
             <a:xfrm>
-              <a:off x="8831540" y="4690213"/>
+              <a:off x="8922369" y="4654703"/>
               <a:ext cx="0" cy="971630"/>
             </a:xfrm>
             <a:prstGeom prst="line">
@@ -9262,7 +9262,7 @@
           </p:nvCxnSpPr>
           <p:spPr>
             <a:xfrm>
-              <a:off x="6769336" y="3061904"/>
+              <a:off x="6860165" y="3026394"/>
               <a:ext cx="1523246" cy="0"/>
             </a:xfrm>
             <a:prstGeom prst="straightConnector1">
@@ -9306,7 +9306,7 @@
           </p:nvCxnSpPr>
           <p:spPr>
             <a:xfrm>
-              <a:off x="4277775" y="3232544"/>
+              <a:off x="4368604" y="3197034"/>
               <a:ext cx="0" cy="359288"/>
             </a:xfrm>
             <a:prstGeom prst="line">
@@ -9349,7 +9349,7 @@
           </p:nvCxnSpPr>
           <p:spPr>
             <a:xfrm>
-              <a:off x="4279277" y="3591832"/>
+              <a:off x="4370106" y="3556322"/>
               <a:ext cx="4013305" cy="0"/>
             </a:xfrm>
             <a:prstGeom prst="straightConnector1">
@@ -9391,7 +9391,7 @@
           </p:nvCxnSpPr>
           <p:spPr>
             <a:xfrm>
-              <a:off x="4270210" y="3532044"/>
+              <a:off x="4361039" y="3496534"/>
               <a:ext cx="1" cy="395220"/>
             </a:xfrm>
             <a:prstGeom prst="straightConnector1">
@@ -9439,13 +9439,13 @@
           </p:nvCxnSpPr>
           <p:spPr>
             <a:xfrm flipH="1">
-              <a:off x="6787201" y="4320452"/>
+              <a:off x="6878030" y="4284942"/>
               <a:ext cx="1" cy="675752"/>
             </a:xfrm>
             <a:prstGeom prst="straightConnector1">
               <a:avLst/>
             </a:prstGeom>
-            <a:ln w="57150">
+            <a:ln w="19050">
               <a:solidFill>
                 <a:schemeClr val="tx1"/>
               </a:solidFill>
@@ -9483,7 +9483,7 @@
           </p:nvCxnSpPr>
           <p:spPr>
             <a:xfrm>
-              <a:off x="3734940" y="678035"/>
+              <a:off x="3825769" y="642525"/>
               <a:ext cx="1" cy="1044412"/>
             </a:xfrm>
             <a:prstGeom prst="straightConnector1">
@@ -9527,7 +9527,7 @@
           </p:nvCxnSpPr>
           <p:spPr>
             <a:xfrm>
-              <a:off x="6659879" y="753063"/>
+              <a:off x="6750708" y="717553"/>
               <a:ext cx="0" cy="991991"/>
             </a:xfrm>
             <a:prstGeom prst="straightConnector1">
@@ -9569,7 +9569,7 @@
           </p:nvSpPr>
           <p:spPr>
             <a:xfrm>
-              <a:off x="3396578" y="405400"/>
+              <a:off x="3487407" y="369890"/>
               <a:ext cx="7621449" cy="369332"/>
             </a:xfrm>
             <a:prstGeom prst="rect">
@@ -9610,7 +9610,7 @@
           </p:nvCxnSpPr>
           <p:spPr>
             <a:xfrm flipV="1">
-              <a:off x="646744" y="6197367"/>
+              <a:off x="680036" y="6161857"/>
               <a:ext cx="5572246" cy="5884"/>
             </a:xfrm>
             <a:prstGeom prst="straightConnector1">
@@ -9657,7 +9657,7 @@
           </p:nvCxnSpPr>
           <p:spPr>
             <a:xfrm flipH="1">
-              <a:off x="646744" y="3232544"/>
+              <a:off x="737573" y="3197034"/>
               <a:ext cx="1" cy="2973184"/>
             </a:xfrm>
             <a:prstGeom prst="line">
@@ -9701,7 +9701,7 @@
           </p:nvCxnSpPr>
           <p:spPr>
             <a:xfrm flipH="1">
-              <a:off x="2391629" y="3230066"/>
+              <a:off x="2482458" y="3194556"/>
               <a:ext cx="1" cy="2973184"/>
             </a:xfrm>
             <a:prstGeom prst="line">
@@ -9749,7 +9749,7 @@
           </p:nvCxnSpPr>
           <p:spPr>
             <a:xfrm>
-              <a:off x="5134817" y="4135786"/>
+              <a:off x="5225646" y="4100276"/>
               <a:ext cx="561233" cy="0"/>
             </a:xfrm>
             <a:prstGeom prst="straightConnector1">
@@ -9793,7 +9793,7 @@
           </p:nvCxnSpPr>
           <p:spPr>
             <a:xfrm flipH="1">
-              <a:off x="3885155" y="5012085"/>
+              <a:off x="3975984" y="4976575"/>
               <a:ext cx="1" cy="1191165"/>
             </a:xfrm>
             <a:prstGeom prst="line">
@@ -9837,7 +9837,7 @@
           </p:nvSpPr>
           <p:spPr>
             <a:xfrm>
-              <a:off x="3270460" y="4642753"/>
+              <a:off x="3361289" y="4607243"/>
               <a:ext cx="1637243" cy="369332"/>
             </a:xfrm>
             <a:prstGeom prst="rect">
@@ -9879,7 +9879,7 @@
           </p:nvCxnSpPr>
           <p:spPr>
             <a:xfrm>
-              <a:off x="3879803" y="4320452"/>
+              <a:off x="3970632" y="4284942"/>
               <a:ext cx="0" cy="334067"/>
             </a:xfrm>
             <a:prstGeom prst="straightConnector1">
@@ -9926,7 +9926,7 @@
           </p:nvCxnSpPr>
           <p:spPr>
             <a:xfrm>
-              <a:off x="10875408" y="753063"/>
+              <a:off x="10966237" y="717553"/>
               <a:ext cx="0" cy="2056747"/>
             </a:xfrm>
             <a:prstGeom prst="straightConnector1">
@@ -9968,7 +9968,7 @@
           </p:nvSpPr>
           <p:spPr>
             <a:xfrm>
-              <a:off x="6330319" y="3516804"/>
+              <a:off x="6421148" y="3481294"/>
               <a:ext cx="128248" cy="145222"/>
             </a:xfrm>
             <a:prstGeom prst="rect">
@@ -10022,7 +10022,7 @@
           </p:nvCxnSpPr>
           <p:spPr>
             <a:xfrm>
-              <a:off x="6387707" y="3231305"/>
+              <a:off x="6478536" y="3195795"/>
               <a:ext cx="0" cy="721054"/>
             </a:xfrm>
             <a:prstGeom prst="straightConnector1">
@@ -10064,7 +10064,7 @@
           </p:nvSpPr>
           <p:spPr>
             <a:xfrm>
-              <a:off x="6949797" y="3498578"/>
+              <a:off x="7040626" y="3463068"/>
               <a:ext cx="128248" cy="145222"/>
             </a:xfrm>
             <a:prstGeom prst="rect">
@@ -10116,7 +10116,7 @@
           </p:nvSpPr>
           <p:spPr>
             <a:xfrm>
-              <a:off x="6951277" y="3002904"/>
+              <a:off x="7042106" y="2967394"/>
               <a:ext cx="128248" cy="145222"/>
             </a:xfrm>
             <a:prstGeom prst="rect">
@@ -10170,13 +10170,13 @@
           </p:nvCxnSpPr>
           <p:spPr>
             <a:xfrm flipH="1">
-              <a:off x="7014462" y="2092389"/>
+              <a:off x="7105291" y="2056879"/>
               <a:ext cx="2" cy="1832263"/>
             </a:xfrm>
             <a:prstGeom prst="straightConnector1">
               <a:avLst/>
             </a:prstGeom>
-            <a:ln w="57150">
+            <a:ln w="19050">
               <a:solidFill>
                 <a:schemeClr val="tx1"/>
               </a:solidFill>
@@ -10212,7 +10212,7 @@
           </p:nvCxnSpPr>
           <p:spPr>
             <a:xfrm>
-              <a:off x="5954072" y="3599850"/>
+              <a:off x="6044901" y="3564340"/>
               <a:ext cx="1" cy="351270"/>
             </a:xfrm>
             <a:prstGeom prst="straightConnector1">
@@ -10254,7 +10254,7 @@
           </p:nvSpPr>
           <p:spPr>
             <a:xfrm>
-              <a:off x="4850214" y="3536432"/>
+              <a:off x="4941043" y="3500922"/>
               <a:ext cx="128248" cy="145222"/>
             </a:xfrm>
             <a:prstGeom prst="rect">
@@ -10308,7 +10308,7 @@
           </p:nvCxnSpPr>
           <p:spPr>
             <a:xfrm>
-              <a:off x="4920886" y="3412188"/>
+              <a:off x="5011715" y="3376678"/>
               <a:ext cx="0" cy="538932"/>
             </a:xfrm>
             <a:prstGeom prst="straightConnector1">
@@ -10352,7 +10352,7 @@
           </p:nvCxnSpPr>
           <p:spPr>
             <a:xfrm>
-              <a:off x="4920359" y="3417570"/>
+              <a:off x="5011188" y="3382060"/>
               <a:ext cx="1470181" cy="0"/>
             </a:xfrm>
             <a:prstGeom prst="line">

</xml_diff>

<commit_message>
path analysis try 1
</commit_message>
<xml_diff>
--- a/manuscript/rafa-style-schematic-v1.pptx
+++ b/manuscript/rafa-style-schematic-v1.pptx
@@ -8,7 +8,8 @@
     <p:sldId id="256" r:id="rId2"/>
     <p:sldId id="258" r:id="rId3"/>
     <p:sldId id="259" r:id="rId4"/>
-    <p:sldId id="257" r:id="rId5"/>
+    <p:sldId id="260" r:id="rId5"/>
+    <p:sldId id="257" r:id="rId6"/>
   </p:sldIdLst>
   <p:sldSz cx="12192000" cy="6858000"/>
   <p:notesSz cx="6858000" cy="9144000"/>
@@ -262,7 +263,7 @@
           <a:p>
             <a:fld id="{C1479234-584E-4873-8CD3-B53B1333C3D5}" type="datetimeFigureOut">
               <a:rPr lang="en-US" smtClean="0"/>
-              <a:t>5/5/2021</a:t>
+              <a:t>6/15/2021</a:t>
             </a:fld>
             <a:endParaRPr lang="en-US"/>
           </a:p>
@@ -460,7 +461,7 @@
           <a:p>
             <a:fld id="{C1479234-584E-4873-8CD3-B53B1333C3D5}" type="datetimeFigureOut">
               <a:rPr lang="en-US" smtClean="0"/>
-              <a:t>5/5/2021</a:t>
+              <a:t>6/15/2021</a:t>
             </a:fld>
             <a:endParaRPr lang="en-US"/>
           </a:p>
@@ -668,7 +669,7 @@
           <a:p>
             <a:fld id="{C1479234-584E-4873-8CD3-B53B1333C3D5}" type="datetimeFigureOut">
               <a:rPr lang="en-US" smtClean="0"/>
-              <a:t>5/5/2021</a:t>
+              <a:t>6/15/2021</a:t>
             </a:fld>
             <a:endParaRPr lang="en-US"/>
           </a:p>
@@ -866,7 +867,7 @@
           <a:p>
             <a:fld id="{C1479234-584E-4873-8CD3-B53B1333C3D5}" type="datetimeFigureOut">
               <a:rPr lang="en-US" smtClean="0"/>
-              <a:t>5/5/2021</a:t>
+              <a:t>6/15/2021</a:t>
             </a:fld>
             <a:endParaRPr lang="en-US"/>
           </a:p>
@@ -1141,7 +1142,7 @@
           <a:p>
             <a:fld id="{C1479234-584E-4873-8CD3-B53B1333C3D5}" type="datetimeFigureOut">
               <a:rPr lang="en-US" smtClean="0"/>
-              <a:t>5/5/2021</a:t>
+              <a:t>6/15/2021</a:t>
             </a:fld>
             <a:endParaRPr lang="en-US"/>
           </a:p>
@@ -1406,7 +1407,7 @@
           <a:p>
             <a:fld id="{C1479234-584E-4873-8CD3-B53B1333C3D5}" type="datetimeFigureOut">
               <a:rPr lang="en-US" smtClean="0"/>
-              <a:t>5/5/2021</a:t>
+              <a:t>6/15/2021</a:t>
             </a:fld>
             <a:endParaRPr lang="en-US"/>
           </a:p>
@@ -1818,7 +1819,7 @@
           <a:p>
             <a:fld id="{C1479234-584E-4873-8CD3-B53B1333C3D5}" type="datetimeFigureOut">
               <a:rPr lang="en-US" smtClean="0"/>
-              <a:t>5/5/2021</a:t>
+              <a:t>6/15/2021</a:t>
             </a:fld>
             <a:endParaRPr lang="en-US"/>
           </a:p>
@@ -1959,7 +1960,7 @@
           <a:p>
             <a:fld id="{C1479234-584E-4873-8CD3-B53B1333C3D5}" type="datetimeFigureOut">
               <a:rPr lang="en-US" smtClean="0"/>
-              <a:t>5/5/2021</a:t>
+              <a:t>6/15/2021</a:t>
             </a:fld>
             <a:endParaRPr lang="en-US"/>
           </a:p>
@@ -2072,7 +2073,7 @@
           <a:p>
             <a:fld id="{C1479234-584E-4873-8CD3-B53B1333C3D5}" type="datetimeFigureOut">
               <a:rPr lang="en-US" smtClean="0"/>
-              <a:t>5/5/2021</a:t>
+              <a:t>6/15/2021</a:t>
             </a:fld>
             <a:endParaRPr lang="en-US"/>
           </a:p>
@@ -2383,7 +2384,7 @@
           <a:p>
             <a:fld id="{C1479234-584E-4873-8CD3-B53B1333C3D5}" type="datetimeFigureOut">
               <a:rPr lang="en-US" smtClean="0"/>
-              <a:t>5/5/2021</a:t>
+              <a:t>6/15/2021</a:t>
             </a:fld>
             <a:endParaRPr lang="en-US"/>
           </a:p>
@@ -2671,7 +2672,7 @@
           <a:p>
             <a:fld id="{C1479234-584E-4873-8CD3-B53B1333C3D5}" type="datetimeFigureOut">
               <a:rPr lang="en-US" smtClean="0"/>
-              <a:t>5/5/2021</a:t>
+              <a:t>6/15/2021</a:t>
             </a:fld>
             <a:endParaRPr lang="en-US"/>
           </a:p>
@@ -2912,7 +2913,7 @@
           <a:p>
             <a:fld id="{C1479234-584E-4873-8CD3-B53B1333C3D5}" type="datetimeFigureOut">
               <a:rPr lang="en-US" smtClean="0"/>
-              <a:t>5/5/2021</a:t>
+              <a:t>6/15/2021</a:t>
             </a:fld>
             <a:endParaRPr lang="en-US"/>
           </a:p>
@@ -10412,6 +10413,2430 @@
       </p:grpSpPr>
       <p:grpSp>
         <p:nvGrpSpPr>
+          <p:cNvPr id="4" name="Group 3">
+            <a:extLst>
+              <a:ext uri="{FF2B5EF4-FFF2-40B4-BE49-F238E27FC236}">
+                <a16:creationId xmlns:a16="http://schemas.microsoft.com/office/drawing/2014/main" id="{123C9A9A-4D29-4C83-ACC1-391F1BADE728}"/>
+              </a:ext>
+            </a:extLst>
+          </p:cNvPr>
+          <p:cNvGrpSpPr/>
+          <p:nvPr/>
+        </p:nvGrpSpPr>
+        <p:grpSpPr>
+          <a:xfrm>
+            <a:off x="0" y="369890"/>
+            <a:ext cx="11108856" cy="5976633"/>
+            <a:chOff x="0" y="369890"/>
+            <a:chExt cx="11108856" cy="5976633"/>
+          </a:xfrm>
+        </p:grpSpPr>
+        <p:sp>
+          <p:nvSpPr>
+            <p:cNvPr id="43" name="Rectangle 42">
+              <a:extLst>
+                <a:ext uri="{FF2B5EF4-FFF2-40B4-BE49-F238E27FC236}">
+                  <a16:creationId xmlns:a16="http://schemas.microsoft.com/office/drawing/2014/main" id="{BBBE6F46-2A42-4A8D-B1C1-E038B0C3D875}"/>
+                </a:ext>
+              </a:extLst>
+            </p:cNvPr>
+            <p:cNvSpPr/>
+            <p:nvPr/>
+          </p:nvSpPr>
+          <p:spPr>
+            <a:xfrm>
+              <a:off x="8383411" y="2774300"/>
+              <a:ext cx="2725445" cy="1880403"/>
+            </a:xfrm>
+            <a:prstGeom prst="rect">
+              <a:avLst/>
+            </a:prstGeom>
+            <a:solidFill>
+              <a:schemeClr val="accent3"/>
+            </a:solidFill>
+          </p:spPr>
+          <p:style>
+            <a:lnRef idx="2">
+              <a:schemeClr val="accent1">
+                <a:shade val="50000"/>
+              </a:schemeClr>
+            </a:lnRef>
+            <a:fillRef idx="1">
+              <a:schemeClr val="accent1"/>
+            </a:fillRef>
+            <a:effectRef idx="0">
+              <a:schemeClr val="accent1"/>
+            </a:effectRef>
+            <a:fontRef idx="minor">
+              <a:schemeClr val="lt1"/>
+            </a:fontRef>
+          </p:style>
+          <p:txBody>
+            <a:bodyPr rtlCol="0" anchor="ctr"/>
+            <a:lstStyle/>
+            <a:p>
+              <a:pPr algn="ctr"/>
+              <a:endParaRPr lang="en-US"/>
+            </a:p>
+          </p:txBody>
+        </p:sp>
+        <p:sp>
+          <p:nvSpPr>
+            <p:cNvPr id="6" name="TextBox 5">
+              <a:extLst>
+                <a:ext uri="{FF2B5EF4-FFF2-40B4-BE49-F238E27FC236}">
+                  <a16:creationId xmlns:a16="http://schemas.microsoft.com/office/drawing/2014/main" id="{21876E51-290C-4303-A6AD-0D8D552ADC8C}"/>
+                </a:ext>
+              </a:extLst>
+            </p:cNvPr>
+            <p:cNvSpPr txBox="1"/>
+            <p:nvPr/>
+          </p:nvSpPr>
+          <p:spPr>
+            <a:xfrm>
+              <a:off x="5573919" y="1703006"/>
+              <a:ext cx="2334485" cy="369332"/>
+            </a:xfrm>
+            <a:prstGeom prst="rect">
+              <a:avLst/>
+            </a:prstGeom>
+            <a:solidFill>
+              <a:schemeClr val="bg2">
+                <a:lumMod val="40000"/>
+                <a:lumOff val="60000"/>
+              </a:schemeClr>
+            </a:solidFill>
+          </p:spPr>
+          <p:txBody>
+            <a:bodyPr wrap="none" rtlCol="0">
+              <a:spAutoFit/>
+            </a:bodyPr>
+            <a:lstStyle/>
+            <a:p>
+              <a:r>
+                <a:rPr lang="en-US" dirty="0"/>
+                <a:t>Below-ground Biomass</a:t>
+              </a:r>
+            </a:p>
+          </p:txBody>
+        </p:sp>
+        <p:sp>
+          <p:nvSpPr>
+            <p:cNvPr id="7" name="TextBox 6">
+              <a:extLst>
+                <a:ext uri="{FF2B5EF4-FFF2-40B4-BE49-F238E27FC236}">
+                  <a16:creationId xmlns:a16="http://schemas.microsoft.com/office/drawing/2014/main" id="{4CBE0429-E328-4B03-9806-D12E4D5356C8}"/>
+                </a:ext>
+              </a:extLst>
+            </p:cNvPr>
+            <p:cNvSpPr txBox="1"/>
+            <p:nvPr/>
+          </p:nvSpPr>
+          <p:spPr>
+            <a:xfrm>
+              <a:off x="3516700" y="2827702"/>
+              <a:ext cx="1757661" cy="369332"/>
+            </a:xfrm>
+            <a:prstGeom prst="rect">
+              <a:avLst/>
+            </a:prstGeom>
+            <a:solidFill>
+              <a:schemeClr val="bg2">
+                <a:lumMod val="40000"/>
+                <a:lumOff val="60000"/>
+              </a:schemeClr>
+            </a:solidFill>
+          </p:spPr>
+          <p:txBody>
+            <a:bodyPr wrap="none" rtlCol="0">
+              <a:spAutoFit/>
+            </a:bodyPr>
+            <a:lstStyle/>
+            <a:p>
+              <a:r>
+                <a:rPr lang="en-US" dirty="0"/>
+                <a:t>Soil temperature</a:t>
+              </a:r>
+            </a:p>
+          </p:txBody>
+        </p:sp>
+        <p:sp>
+          <p:nvSpPr>
+            <p:cNvPr id="8" name="TextBox 7">
+              <a:extLst>
+                <a:ext uri="{FF2B5EF4-FFF2-40B4-BE49-F238E27FC236}">
+                  <a16:creationId xmlns:a16="http://schemas.microsoft.com/office/drawing/2014/main" id="{DE9C3297-30F2-4EDE-BBE3-90264159B724}"/>
+                </a:ext>
+              </a:extLst>
+            </p:cNvPr>
+            <p:cNvSpPr txBox="1"/>
+            <p:nvPr/>
+          </p:nvSpPr>
+          <p:spPr>
+            <a:xfrm>
+              <a:off x="9807114" y="2864091"/>
+              <a:ext cx="1183529" cy="369332"/>
+            </a:xfrm>
+            <a:prstGeom prst="rect">
+              <a:avLst/>
+            </a:prstGeom>
+            <a:solidFill>
+              <a:schemeClr val="bg2">
+                <a:lumMod val="40000"/>
+                <a:lumOff val="60000"/>
+              </a:schemeClr>
+            </a:solidFill>
+          </p:spPr>
+          <p:txBody>
+            <a:bodyPr wrap="none" rtlCol="0">
+              <a:spAutoFit/>
+            </a:bodyPr>
+            <a:lstStyle/>
+            <a:p>
+              <a:r>
+                <a:rPr lang="en-US" dirty="0"/>
+                <a:t>Soil N Pool</a:t>
+              </a:r>
+            </a:p>
+          </p:txBody>
+        </p:sp>
+        <p:sp>
+          <p:nvSpPr>
+            <p:cNvPr id="12" name="TextBox 11">
+              <a:extLst>
+                <a:ext uri="{FF2B5EF4-FFF2-40B4-BE49-F238E27FC236}">
+                  <a16:creationId xmlns:a16="http://schemas.microsoft.com/office/drawing/2014/main" id="{746B2C31-FA0B-46FE-8943-7254BCEF2D15}"/>
+                </a:ext>
+              </a:extLst>
+            </p:cNvPr>
+            <p:cNvSpPr txBox="1"/>
+            <p:nvPr/>
+          </p:nvSpPr>
+          <p:spPr>
+            <a:xfrm>
+              <a:off x="6252282" y="5977191"/>
+              <a:ext cx="1251496" cy="369332"/>
+            </a:xfrm>
+            <a:prstGeom prst="rect">
+              <a:avLst/>
+            </a:prstGeom>
+            <a:solidFill>
+              <a:schemeClr val="accent4"/>
+            </a:solidFill>
+          </p:spPr>
+          <p:txBody>
+            <a:bodyPr wrap="none" rtlCol="0">
+              <a:spAutoFit/>
+            </a:bodyPr>
+            <a:lstStyle/>
+            <a:p>
+              <a:r>
+                <a:rPr lang="en-US" dirty="0"/>
+                <a:t>Maize Yield</a:t>
+              </a:r>
+            </a:p>
+          </p:txBody>
+        </p:sp>
+        <p:sp>
+          <p:nvSpPr>
+            <p:cNvPr id="16" name="TextBox 15">
+              <a:extLst>
+                <a:ext uri="{FF2B5EF4-FFF2-40B4-BE49-F238E27FC236}">
+                  <a16:creationId xmlns:a16="http://schemas.microsoft.com/office/drawing/2014/main" id="{6EFC2D2F-82ED-4332-86E1-5D3DCB71E395}"/>
+                </a:ext>
+              </a:extLst>
+            </p:cNvPr>
+            <p:cNvSpPr txBox="1"/>
+            <p:nvPr/>
+          </p:nvSpPr>
+          <p:spPr>
+            <a:xfrm>
+              <a:off x="8869101" y="1698118"/>
+              <a:ext cx="1687257" cy="369332"/>
+            </a:xfrm>
+            <a:prstGeom prst="rect">
+              <a:avLst/>
+            </a:prstGeom>
+            <a:solidFill>
+              <a:schemeClr val="bg2">
+                <a:lumMod val="40000"/>
+                <a:lumOff val="60000"/>
+              </a:schemeClr>
+            </a:solidFill>
+          </p:spPr>
+          <p:txBody>
+            <a:bodyPr wrap="none" rtlCol="0">
+              <a:spAutoFit/>
+            </a:bodyPr>
+            <a:lstStyle/>
+            <a:p>
+              <a:r>
+                <a:rPr lang="en-US" dirty="0"/>
+                <a:t>Organic C and N</a:t>
+              </a:r>
+            </a:p>
+          </p:txBody>
+        </p:sp>
+        <p:sp>
+          <p:nvSpPr>
+            <p:cNvPr id="27" name="TextBox 26">
+              <a:extLst>
+                <a:ext uri="{FF2B5EF4-FFF2-40B4-BE49-F238E27FC236}">
+                  <a16:creationId xmlns:a16="http://schemas.microsoft.com/office/drawing/2014/main" id="{A8BF0BC3-B10A-4BC5-9397-D880332680E1}"/>
+                </a:ext>
+              </a:extLst>
+            </p:cNvPr>
+            <p:cNvSpPr txBox="1"/>
+            <p:nvPr/>
+          </p:nvSpPr>
+          <p:spPr>
+            <a:xfrm>
+              <a:off x="2653794" y="1709544"/>
+              <a:ext cx="2348143" cy="369332"/>
+            </a:xfrm>
+            <a:prstGeom prst="rect">
+              <a:avLst/>
+            </a:prstGeom>
+            <a:solidFill>
+              <a:schemeClr val="bg2">
+                <a:lumMod val="40000"/>
+                <a:lumOff val="60000"/>
+              </a:schemeClr>
+            </a:solidFill>
+          </p:spPr>
+          <p:txBody>
+            <a:bodyPr wrap="none" rtlCol="0">
+              <a:spAutoFit/>
+            </a:bodyPr>
+            <a:lstStyle/>
+            <a:p>
+              <a:r>
+                <a:rPr lang="en-US" dirty="0"/>
+                <a:t>Above-ground Biomass</a:t>
+              </a:r>
+            </a:p>
+          </p:txBody>
+        </p:sp>
+        <p:sp>
+          <p:nvSpPr>
+            <p:cNvPr id="28" name="TextBox 27">
+              <a:extLst>
+                <a:ext uri="{FF2B5EF4-FFF2-40B4-BE49-F238E27FC236}">
+                  <a16:creationId xmlns:a16="http://schemas.microsoft.com/office/drawing/2014/main" id="{3F812CC4-A17B-4FFE-8444-99E901669275}"/>
+                </a:ext>
+              </a:extLst>
+            </p:cNvPr>
+            <p:cNvSpPr txBox="1"/>
+            <p:nvPr/>
+          </p:nvSpPr>
+          <p:spPr>
+            <a:xfrm>
+              <a:off x="4919553" y="2009124"/>
+              <a:ext cx="803425" cy="369332"/>
+            </a:xfrm>
+            <a:prstGeom prst="rect">
+              <a:avLst/>
+            </a:prstGeom>
+            <a:noFill/>
+          </p:spPr>
+          <p:txBody>
+            <a:bodyPr wrap="none" rtlCol="0">
+              <a:spAutoFit/>
+            </a:bodyPr>
+            <a:lstStyle/>
+            <a:p>
+              <a:r>
+                <a:rPr lang="en-US" i="1" dirty="0"/>
+                <a:t>Tillage</a:t>
+              </a:r>
+            </a:p>
+          </p:txBody>
+        </p:sp>
+        <p:cxnSp>
+          <p:nvCxnSpPr>
+            <p:cNvPr id="30" name="Straight Arrow Connector 29">
+              <a:extLst>
+                <a:ext uri="{FF2B5EF4-FFF2-40B4-BE49-F238E27FC236}">
+                  <a16:creationId xmlns:a16="http://schemas.microsoft.com/office/drawing/2014/main" id="{25640F78-4FE1-4D28-8557-ED62F3D94D16}"/>
+                </a:ext>
+              </a:extLst>
+            </p:cNvPr>
+            <p:cNvCxnSpPr>
+              <a:stCxn id="27" idx="3"/>
+              <a:endCxn id="6" idx="1"/>
+            </p:cNvCxnSpPr>
+            <p:nvPr/>
+          </p:nvCxnSpPr>
+          <p:spPr>
+            <a:xfrm flipV="1">
+              <a:off x="5001937" y="1887672"/>
+              <a:ext cx="571982" cy="6538"/>
+            </a:xfrm>
+            <a:prstGeom prst="straightConnector1">
+              <a:avLst/>
+            </a:prstGeom>
+            <a:ln w="57150">
+              <a:solidFill>
+                <a:schemeClr val="tx1"/>
+              </a:solidFill>
+              <a:prstDash val="solid"/>
+              <a:tailEnd type="triangle"/>
+            </a:ln>
+          </p:spPr>
+          <p:style>
+            <a:lnRef idx="1">
+              <a:schemeClr val="accent1"/>
+            </a:lnRef>
+            <a:fillRef idx="0">
+              <a:schemeClr val="accent1"/>
+            </a:fillRef>
+            <a:effectRef idx="0">
+              <a:schemeClr val="accent1"/>
+            </a:effectRef>
+            <a:fontRef idx="minor">
+              <a:schemeClr val="tx1"/>
+            </a:fontRef>
+          </p:style>
+        </p:cxnSp>
+        <p:sp>
+          <p:nvSpPr>
+            <p:cNvPr id="34" name="TextBox 33">
+              <a:extLst>
+                <a:ext uri="{FF2B5EF4-FFF2-40B4-BE49-F238E27FC236}">
+                  <a16:creationId xmlns:a16="http://schemas.microsoft.com/office/drawing/2014/main" id="{A5F7D44D-E9ED-4B85-9A55-0A0CEED27E5A}"/>
+                </a:ext>
+              </a:extLst>
+            </p:cNvPr>
+            <p:cNvSpPr txBox="1"/>
+            <p:nvPr/>
+          </p:nvSpPr>
+          <p:spPr>
+            <a:xfrm>
+              <a:off x="9250679" y="3365410"/>
+              <a:ext cx="1103764" cy="369332"/>
+            </a:xfrm>
+            <a:prstGeom prst="rect">
+              <a:avLst/>
+            </a:prstGeom>
+            <a:solidFill>
+              <a:schemeClr val="bg1">
+                <a:lumMod val="50000"/>
+              </a:schemeClr>
+            </a:solidFill>
+          </p:spPr>
+          <p:txBody>
+            <a:bodyPr wrap="none" rtlCol="0">
+              <a:spAutoFit/>
+            </a:bodyPr>
+            <a:lstStyle/>
+            <a:p>
+              <a:r>
+                <a:rPr lang="en-US" dirty="0"/>
+                <a:t>Organic N</a:t>
+              </a:r>
+            </a:p>
+          </p:txBody>
+        </p:sp>
+        <p:sp>
+          <p:nvSpPr>
+            <p:cNvPr id="35" name="TextBox 34">
+              <a:extLst>
+                <a:ext uri="{FF2B5EF4-FFF2-40B4-BE49-F238E27FC236}">
+                  <a16:creationId xmlns:a16="http://schemas.microsoft.com/office/drawing/2014/main" id="{CD3D4ADE-6820-40EF-BD68-3C0CDBF5FDE4}"/>
+                </a:ext>
+              </a:extLst>
+            </p:cNvPr>
+            <p:cNvSpPr txBox="1"/>
+            <p:nvPr/>
+          </p:nvSpPr>
+          <p:spPr>
+            <a:xfrm>
+              <a:off x="9250679" y="3940273"/>
+              <a:ext cx="1112869" cy="369332"/>
+            </a:xfrm>
+            <a:prstGeom prst="rect">
+              <a:avLst/>
+            </a:prstGeom>
+            <a:solidFill>
+              <a:schemeClr val="bg1">
+                <a:lumMod val="50000"/>
+              </a:schemeClr>
+            </a:solidFill>
+          </p:spPr>
+          <p:txBody>
+            <a:bodyPr wrap="none" rtlCol="0">
+              <a:spAutoFit/>
+            </a:bodyPr>
+            <a:lstStyle/>
+            <a:p>
+              <a:r>
+                <a:rPr lang="en-US" dirty="0"/>
+                <a:t>Mineral N</a:t>
+              </a:r>
+            </a:p>
+          </p:txBody>
+        </p:sp>
+        <p:sp>
+          <p:nvSpPr>
+            <p:cNvPr id="37" name="TextBox 36">
+              <a:extLst>
+                <a:ext uri="{FF2B5EF4-FFF2-40B4-BE49-F238E27FC236}">
+                  <a16:creationId xmlns:a16="http://schemas.microsoft.com/office/drawing/2014/main" id="{82704AEF-63B6-4115-BCA0-748519CD8A6F}"/>
+                </a:ext>
+              </a:extLst>
+            </p:cNvPr>
+            <p:cNvSpPr txBox="1"/>
+            <p:nvPr/>
+          </p:nvSpPr>
+          <p:spPr>
+            <a:xfrm>
+              <a:off x="3361289" y="3915610"/>
+              <a:ext cx="1864357" cy="369332"/>
+            </a:xfrm>
+            <a:prstGeom prst="rect">
+              <a:avLst/>
+            </a:prstGeom>
+            <a:solidFill>
+              <a:schemeClr val="bg2">
+                <a:lumMod val="40000"/>
+                <a:lumOff val="60000"/>
+              </a:schemeClr>
+            </a:solidFill>
+          </p:spPr>
+          <p:txBody>
+            <a:bodyPr wrap="none" rtlCol="0">
+              <a:spAutoFit/>
+            </a:bodyPr>
+            <a:lstStyle/>
+            <a:p>
+              <a:r>
+                <a:rPr lang="en-US" dirty="0"/>
+                <a:t>Emergence Speed</a:t>
+              </a:r>
+            </a:p>
+          </p:txBody>
+        </p:sp>
+        <p:sp>
+          <p:nvSpPr>
+            <p:cNvPr id="38" name="TextBox 37">
+              <a:extLst>
+                <a:ext uri="{FF2B5EF4-FFF2-40B4-BE49-F238E27FC236}">
+                  <a16:creationId xmlns:a16="http://schemas.microsoft.com/office/drawing/2014/main" id="{2E683A25-9597-4B36-9608-E86C6D3E22F4}"/>
+                </a:ext>
+              </a:extLst>
+            </p:cNvPr>
+            <p:cNvSpPr txBox="1"/>
+            <p:nvPr/>
+          </p:nvSpPr>
+          <p:spPr>
+            <a:xfrm>
+              <a:off x="5429772" y="2827702"/>
+              <a:ext cx="1421415" cy="369332"/>
+            </a:xfrm>
+            <a:prstGeom prst="rect">
+              <a:avLst/>
+            </a:prstGeom>
+            <a:solidFill>
+              <a:schemeClr val="bg2">
+                <a:lumMod val="40000"/>
+                <a:lumOff val="60000"/>
+              </a:schemeClr>
+            </a:solidFill>
+          </p:spPr>
+          <p:txBody>
+            <a:bodyPr wrap="none" rtlCol="0">
+              <a:spAutoFit/>
+            </a:bodyPr>
+            <a:lstStyle/>
+            <a:p>
+              <a:r>
+                <a:rPr lang="en-US" dirty="0"/>
+                <a:t>Soil Moisture</a:t>
+              </a:r>
+            </a:p>
+          </p:txBody>
+        </p:sp>
+        <p:sp>
+          <p:nvSpPr>
+            <p:cNvPr id="39" name="TextBox 38">
+              <a:extLst>
+                <a:ext uri="{FF2B5EF4-FFF2-40B4-BE49-F238E27FC236}">
+                  <a16:creationId xmlns:a16="http://schemas.microsoft.com/office/drawing/2014/main" id="{C88535CE-04F6-4F00-8976-230E49A5674A}"/>
+                </a:ext>
+              </a:extLst>
+            </p:cNvPr>
+            <p:cNvSpPr txBox="1"/>
+            <p:nvPr/>
+          </p:nvSpPr>
+          <p:spPr>
+            <a:xfrm>
+              <a:off x="1630559" y="2827702"/>
+              <a:ext cx="1730730" cy="369332"/>
+            </a:xfrm>
+            <a:prstGeom prst="rect">
+              <a:avLst/>
+            </a:prstGeom>
+            <a:solidFill>
+              <a:schemeClr val="bg2">
+                <a:lumMod val="40000"/>
+                <a:lumOff val="60000"/>
+              </a:schemeClr>
+            </a:solidFill>
+          </p:spPr>
+          <p:txBody>
+            <a:bodyPr wrap="none" rtlCol="0">
+              <a:spAutoFit/>
+            </a:bodyPr>
+            <a:lstStyle/>
+            <a:p>
+              <a:r>
+                <a:rPr lang="en-US" dirty="0"/>
+                <a:t>Plant Population</a:t>
+              </a:r>
+            </a:p>
+          </p:txBody>
+        </p:sp>
+        <p:sp>
+          <p:nvSpPr>
+            <p:cNvPr id="40" name="TextBox 39">
+              <a:extLst>
+                <a:ext uri="{FF2B5EF4-FFF2-40B4-BE49-F238E27FC236}">
+                  <a16:creationId xmlns:a16="http://schemas.microsoft.com/office/drawing/2014/main" id="{D29EBCB2-DAFE-4E53-9427-A32478F274C9}"/>
+                </a:ext>
+              </a:extLst>
+            </p:cNvPr>
+            <p:cNvSpPr txBox="1"/>
+            <p:nvPr/>
+          </p:nvSpPr>
+          <p:spPr>
+            <a:xfrm>
+              <a:off x="0" y="2827702"/>
+              <a:ext cx="1475147" cy="369332"/>
+            </a:xfrm>
+            <a:prstGeom prst="rect">
+              <a:avLst/>
+            </a:prstGeom>
+            <a:solidFill>
+              <a:schemeClr val="bg2">
+                <a:lumMod val="40000"/>
+                <a:lumOff val="60000"/>
+              </a:schemeClr>
+            </a:solidFill>
+          </p:spPr>
+          <p:txBody>
+            <a:bodyPr wrap="none" rtlCol="0">
+              <a:spAutoFit/>
+            </a:bodyPr>
+            <a:lstStyle/>
+            <a:p>
+              <a:r>
+                <a:rPr lang="en-US" dirty="0"/>
+                <a:t>Foliar Disease</a:t>
+              </a:r>
+            </a:p>
+          </p:txBody>
+        </p:sp>
+        <p:sp>
+          <p:nvSpPr>
+            <p:cNvPr id="42" name="TextBox 41">
+              <a:extLst>
+                <a:ext uri="{FF2B5EF4-FFF2-40B4-BE49-F238E27FC236}">
+                  <a16:creationId xmlns:a16="http://schemas.microsoft.com/office/drawing/2014/main" id="{B50287FD-D8CF-4F3F-BB26-4D1EE2C652C4}"/>
+                </a:ext>
+              </a:extLst>
+            </p:cNvPr>
+            <p:cNvSpPr txBox="1"/>
+            <p:nvPr/>
+          </p:nvSpPr>
+          <p:spPr>
+            <a:xfrm>
+              <a:off x="5786879" y="3915610"/>
+              <a:ext cx="2182303" cy="369332"/>
+            </a:xfrm>
+            <a:prstGeom prst="rect">
+              <a:avLst/>
+            </a:prstGeom>
+            <a:solidFill>
+              <a:schemeClr val="bg2">
+                <a:lumMod val="40000"/>
+                <a:lumOff val="60000"/>
+              </a:schemeClr>
+            </a:solidFill>
+          </p:spPr>
+          <p:txBody>
+            <a:bodyPr wrap="square" rtlCol="0">
+              <a:spAutoFit/>
+            </a:bodyPr>
+            <a:lstStyle/>
+            <a:p>
+              <a:pPr algn="ctr"/>
+              <a:r>
+                <a:rPr lang="en-US" dirty="0"/>
+                <a:t>Root Disease</a:t>
+              </a:r>
+            </a:p>
+          </p:txBody>
+        </p:sp>
+        <p:cxnSp>
+          <p:nvCxnSpPr>
+            <p:cNvPr id="45" name="Straight Arrow Connector 44">
+              <a:extLst>
+                <a:ext uri="{FF2B5EF4-FFF2-40B4-BE49-F238E27FC236}">
+                  <a16:creationId xmlns:a16="http://schemas.microsoft.com/office/drawing/2014/main" id="{17E1A0A6-BA50-4618-8F03-27F30C4ACB4F}"/>
+                </a:ext>
+              </a:extLst>
+            </p:cNvPr>
+            <p:cNvCxnSpPr/>
+            <p:nvPr/>
+          </p:nvCxnSpPr>
+          <p:spPr>
+            <a:xfrm>
+              <a:off x="10354443" y="4663834"/>
+              <a:ext cx="0" cy="700042"/>
+            </a:xfrm>
+            <a:prstGeom prst="straightConnector1">
+              <a:avLst/>
+            </a:prstGeom>
+            <a:ln w="57150">
+              <a:solidFill>
+                <a:schemeClr val="tx1"/>
+              </a:solidFill>
+              <a:tailEnd type="triangle"/>
+            </a:ln>
+          </p:spPr>
+          <p:style>
+            <a:lnRef idx="1">
+              <a:schemeClr val="accent1"/>
+            </a:lnRef>
+            <a:fillRef idx="0">
+              <a:schemeClr val="accent1"/>
+            </a:fillRef>
+            <a:effectRef idx="0">
+              <a:schemeClr val="accent1"/>
+            </a:effectRef>
+            <a:fontRef idx="minor">
+              <a:schemeClr val="tx1"/>
+            </a:fontRef>
+          </p:style>
+        </p:cxnSp>
+        <p:sp>
+          <p:nvSpPr>
+            <p:cNvPr id="46" name="TextBox 45">
+              <a:extLst>
+                <a:ext uri="{FF2B5EF4-FFF2-40B4-BE49-F238E27FC236}">
+                  <a16:creationId xmlns:a16="http://schemas.microsoft.com/office/drawing/2014/main" id="{03E68496-FC9E-4E89-8753-BA5205E35FCE}"/>
+                </a:ext>
+              </a:extLst>
+            </p:cNvPr>
+            <p:cNvSpPr txBox="1"/>
+            <p:nvPr/>
+          </p:nvSpPr>
+          <p:spPr>
+            <a:xfrm>
+              <a:off x="9857820" y="5572949"/>
+              <a:ext cx="1016625" cy="369332"/>
+            </a:xfrm>
+            <a:prstGeom prst="rect">
+              <a:avLst/>
+            </a:prstGeom>
+            <a:noFill/>
+          </p:spPr>
+          <p:txBody>
+            <a:bodyPr wrap="none" rtlCol="0">
+              <a:spAutoFit/>
+            </a:bodyPr>
+            <a:lstStyle/>
+            <a:p>
+              <a:r>
+                <a:rPr lang="en-US" i="1" dirty="0"/>
+                <a:t>Leaching</a:t>
+              </a:r>
+            </a:p>
+          </p:txBody>
+        </p:sp>
+        <p:sp>
+          <p:nvSpPr>
+            <p:cNvPr id="47" name="TextBox 46">
+              <a:extLst>
+                <a:ext uri="{FF2B5EF4-FFF2-40B4-BE49-F238E27FC236}">
+                  <a16:creationId xmlns:a16="http://schemas.microsoft.com/office/drawing/2014/main" id="{71A64A20-948F-481E-9E7E-0DFCA922ED2D}"/>
+                </a:ext>
+              </a:extLst>
+            </p:cNvPr>
+            <p:cNvSpPr txBox="1"/>
+            <p:nvPr/>
+          </p:nvSpPr>
+          <p:spPr>
+            <a:xfrm>
+              <a:off x="6101888" y="4967910"/>
+              <a:ext cx="1552284" cy="369332"/>
+            </a:xfrm>
+            <a:prstGeom prst="rect">
+              <a:avLst/>
+            </a:prstGeom>
+            <a:solidFill>
+              <a:schemeClr val="bg2">
+                <a:lumMod val="40000"/>
+                <a:lumOff val="60000"/>
+              </a:schemeClr>
+            </a:solidFill>
+          </p:spPr>
+          <p:txBody>
+            <a:bodyPr wrap="none" rtlCol="0">
+              <a:spAutoFit/>
+            </a:bodyPr>
+            <a:lstStyle/>
+            <a:p>
+              <a:r>
+                <a:rPr lang="en-US" dirty="0"/>
+                <a:t>Root Structure</a:t>
+              </a:r>
+            </a:p>
+          </p:txBody>
+        </p:sp>
+        <p:cxnSp>
+          <p:nvCxnSpPr>
+            <p:cNvPr id="51" name="Straight Arrow Connector 50">
+              <a:extLst>
+                <a:ext uri="{FF2B5EF4-FFF2-40B4-BE49-F238E27FC236}">
+                  <a16:creationId xmlns:a16="http://schemas.microsoft.com/office/drawing/2014/main" id="{87EBDFAD-4A5A-4BE9-A809-4D8186D8DCEE}"/>
+                </a:ext>
+              </a:extLst>
+            </p:cNvPr>
+            <p:cNvCxnSpPr>
+              <a:endCxn id="40" idx="0"/>
+            </p:cNvCxnSpPr>
+            <p:nvPr/>
+          </p:nvCxnSpPr>
+          <p:spPr>
+            <a:xfrm>
+              <a:off x="737573" y="2432482"/>
+              <a:ext cx="1" cy="395220"/>
+            </a:xfrm>
+            <a:prstGeom prst="straightConnector1">
+              <a:avLst/>
+            </a:prstGeom>
+            <a:ln w="12700">
+              <a:solidFill>
+                <a:schemeClr val="bg2">
+                  <a:lumMod val="75000"/>
+                </a:schemeClr>
+              </a:solidFill>
+              <a:prstDash val="sysDash"/>
+              <a:tailEnd type="triangle"/>
+            </a:ln>
+          </p:spPr>
+          <p:style>
+            <a:lnRef idx="1">
+              <a:schemeClr val="accent1"/>
+            </a:lnRef>
+            <a:fillRef idx="0">
+              <a:schemeClr val="accent1"/>
+            </a:fillRef>
+            <a:effectRef idx="0">
+              <a:schemeClr val="accent1"/>
+            </a:effectRef>
+            <a:fontRef idx="minor">
+              <a:schemeClr val="tx1"/>
+            </a:fontRef>
+          </p:style>
+        </p:cxnSp>
+        <p:cxnSp>
+          <p:nvCxnSpPr>
+            <p:cNvPr id="52" name="Straight Arrow Connector 51">
+              <a:extLst>
+                <a:ext uri="{FF2B5EF4-FFF2-40B4-BE49-F238E27FC236}">
+                  <a16:creationId xmlns:a16="http://schemas.microsoft.com/office/drawing/2014/main" id="{DF4D5B51-D868-4ABE-B4DF-77C63F6D68E1}"/>
+                </a:ext>
+              </a:extLst>
+            </p:cNvPr>
+            <p:cNvCxnSpPr/>
+            <p:nvPr/>
+          </p:nvCxnSpPr>
+          <p:spPr>
+            <a:xfrm>
+              <a:off x="2482463" y="2432482"/>
+              <a:ext cx="1" cy="395220"/>
+            </a:xfrm>
+            <a:prstGeom prst="straightConnector1">
+              <a:avLst/>
+            </a:prstGeom>
+            <a:ln w="12700">
+              <a:solidFill>
+                <a:schemeClr val="bg2">
+                  <a:lumMod val="75000"/>
+                </a:schemeClr>
+              </a:solidFill>
+              <a:prstDash val="sysDash"/>
+              <a:tailEnd type="triangle"/>
+            </a:ln>
+          </p:spPr>
+          <p:style>
+            <a:lnRef idx="1">
+              <a:schemeClr val="accent1"/>
+            </a:lnRef>
+            <a:fillRef idx="0">
+              <a:schemeClr val="accent1"/>
+            </a:fillRef>
+            <a:effectRef idx="0">
+              <a:schemeClr val="accent1"/>
+            </a:effectRef>
+            <a:fontRef idx="minor">
+              <a:schemeClr val="tx1"/>
+            </a:fontRef>
+          </p:style>
+        </p:cxnSp>
+        <p:cxnSp>
+          <p:nvCxnSpPr>
+            <p:cNvPr id="53" name="Straight Arrow Connector 52">
+              <a:extLst>
+                <a:ext uri="{FF2B5EF4-FFF2-40B4-BE49-F238E27FC236}">
+                  <a16:creationId xmlns:a16="http://schemas.microsoft.com/office/drawing/2014/main" id="{B0D3A137-DF2B-45FF-A99F-CCB3DB683E2F}"/>
+                </a:ext>
+              </a:extLst>
+            </p:cNvPr>
+            <p:cNvCxnSpPr/>
+            <p:nvPr/>
+          </p:nvCxnSpPr>
+          <p:spPr>
+            <a:xfrm>
+              <a:off x="4368604" y="2432482"/>
+              <a:ext cx="1" cy="395220"/>
+            </a:xfrm>
+            <a:prstGeom prst="straightConnector1">
+              <a:avLst/>
+            </a:prstGeom>
+            <a:ln w="3175">
+              <a:solidFill>
+                <a:schemeClr val="tx1"/>
+              </a:solidFill>
+              <a:tailEnd type="triangle"/>
+            </a:ln>
+          </p:spPr>
+          <p:style>
+            <a:lnRef idx="1">
+              <a:schemeClr val="accent1"/>
+            </a:lnRef>
+            <a:fillRef idx="0">
+              <a:schemeClr val="accent1"/>
+            </a:fillRef>
+            <a:effectRef idx="0">
+              <a:schemeClr val="accent1"/>
+            </a:effectRef>
+            <a:fontRef idx="minor">
+              <a:schemeClr val="tx1"/>
+            </a:fontRef>
+          </p:style>
+        </p:cxnSp>
+        <p:cxnSp>
+          <p:nvCxnSpPr>
+            <p:cNvPr id="54" name="Straight Arrow Connector 53">
+              <a:extLst>
+                <a:ext uri="{FF2B5EF4-FFF2-40B4-BE49-F238E27FC236}">
+                  <a16:creationId xmlns:a16="http://schemas.microsoft.com/office/drawing/2014/main" id="{3033AB08-870D-4629-B0D8-BC7D3B22D391}"/>
+                </a:ext>
+              </a:extLst>
+            </p:cNvPr>
+            <p:cNvCxnSpPr/>
+            <p:nvPr/>
+          </p:nvCxnSpPr>
+          <p:spPr>
+            <a:xfrm>
+              <a:off x="6126264" y="2445730"/>
+              <a:ext cx="1" cy="395220"/>
+            </a:xfrm>
+            <a:prstGeom prst="straightConnector1">
+              <a:avLst/>
+            </a:prstGeom>
+            <a:ln w="3175">
+              <a:solidFill>
+                <a:schemeClr val="tx1"/>
+              </a:solidFill>
+              <a:tailEnd type="triangle"/>
+            </a:ln>
+          </p:spPr>
+          <p:style>
+            <a:lnRef idx="1">
+              <a:schemeClr val="accent1"/>
+            </a:lnRef>
+            <a:fillRef idx="0">
+              <a:schemeClr val="accent1"/>
+            </a:fillRef>
+            <a:effectRef idx="0">
+              <a:schemeClr val="accent1"/>
+            </a:effectRef>
+            <a:fontRef idx="minor">
+              <a:schemeClr val="tx1"/>
+            </a:fontRef>
+          </p:style>
+        </p:cxnSp>
+        <p:cxnSp>
+          <p:nvCxnSpPr>
+            <p:cNvPr id="56" name="Straight Connector 55">
+              <a:extLst>
+                <a:ext uri="{FF2B5EF4-FFF2-40B4-BE49-F238E27FC236}">
+                  <a16:creationId xmlns:a16="http://schemas.microsoft.com/office/drawing/2014/main" id="{7A2E10CA-4474-4A6C-9709-769561D28077}"/>
+                </a:ext>
+              </a:extLst>
+            </p:cNvPr>
+            <p:cNvCxnSpPr/>
+            <p:nvPr/>
+          </p:nvCxnSpPr>
+          <p:spPr>
+            <a:xfrm>
+              <a:off x="751734" y="2445730"/>
+              <a:ext cx="5374531" cy="0"/>
+            </a:xfrm>
+            <a:prstGeom prst="line">
+              <a:avLst/>
+            </a:prstGeom>
+            <a:ln w="3175">
+              <a:solidFill>
+                <a:schemeClr val="tx1"/>
+              </a:solidFill>
+            </a:ln>
+          </p:spPr>
+          <p:style>
+            <a:lnRef idx="1">
+              <a:schemeClr val="accent1"/>
+            </a:lnRef>
+            <a:fillRef idx="0">
+              <a:schemeClr val="accent1"/>
+            </a:fillRef>
+            <a:effectRef idx="0">
+              <a:schemeClr val="accent1"/>
+            </a:effectRef>
+            <a:fontRef idx="minor">
+              <a:schemeClr val="tx1"/>
+            </a:fontRef>
+          </p:style>
+        </p:cxnSp>
+        <p:cxnSp>
+          <p:nvCxnSpPr>
+            <p:cNvPr id="57" name="Straight Arrow Connector 56">
+              <a:extLst>
+                <a:ext uri="{FF2B5EF4-FFF2-40B4-BE49-F238E27FC236}">
+                  <a16:creationId xmlns:a16="http://schemas.microsoft.com/office/drawing/2014/main" id="{31BA66BD-48A8-4DD6-B57A-134D8438CFE3}"/>
+                </a:ext>
+              </a:extLst>
+            </p:cNvPr>
+            <p:cNvCxnSpPr/>
+            <p:nvPr/>
+          </p:nvCxnSpPr>
+          <p:spPr>
+            <a:xfrm>
+              <a:off x="3825770" y="2070191"/>
+              <a:ext cx="1" cy="395220"/>
+            </a:xfrm>
+            <a:prstGeom prst="straightConnector1">
+              <a:avLst/>
+            </a:prstGeom>
+            <a:ln w="3175">
+              <a:solidFill>
+                <a:schemeClr val="tx1"/>
+              </a:solidFill>
+              <a:tailEnd type="triangle"/>
+            </a:ln>
+          </p:spPr>
+          <p:style>
+            <a:lnRef idx="1">
+              <a:schemeClr val="accent1"/>
+            </a:lnRef>
+            <a:fillRef idx="0">
+              <a:schemeClr val="accent1"/>
+            </a:fillRef>
+            <a:effectRef idx="0">
+              <a:schemeClr val="accent1"/>
+            </a:effectRef>
+            <a:fontRef idx="minor">
+              <a:schemeClr val="tx1"/>
+            </a:fontRef>
+          </p:style>
+        </p:cxnSp>
+        <p:cxnSp>
+          <p:nvCxnSpPr>
+            <p:cNvPr id="59" name="Straight Arrow Connector 58">
+              <a:extLst>
+                <a:ext uri="{FF2B5EF4-FFF2-40B4-BE49-F238E27FC236}">
+                  <a16:creationId xmlns:a16="http://schemas.microsoft.com/office/drawing/2014/main" id="{04E70E58-42AC-4675-B455-935EC2D04F90}"/>
+                </a:ext>
+              </a:extLst>
+            </p:cNvPr>
+            <p:cNvCxnSpPr>
+              <a:cxnSpLocks/>
+              <a:stCxn id="6" idx="3"/>
+              <a:endCxn id="16" idx="1"/>
+            </p:cNvCxnSpPr>
+            <p:nvPr/>
+          </p:nvCxnSpPr>
+          <p:spPr>
+            <a:xfrm flipV="1">
+              <a:off x="7908404" y="1882784"/>
+              <a:ext cx="960697" cy="4888"/>
+            </a:xfrm>
+            <a:prstGeom prst="straightConnector1">
+              <a:avLst/>
+            </a:prstGeom>
+            <a:ln w="57150">
+              <a:solidFill>
+                <a:schemeClr val="tx1"/>
+              </a:solidFill>
+              <a:tailEnd type="triangle"/>
+            </a:ln>
+          </p:spPr>
+          <p:style>
+            <a:lnRef idx="1">
+              <a:schemeClr val="accent1"/>
+            </a:lnRef>
+            <a:fillRef idx="0">
+              <a:schemeClr val="accent1"/>
+            </a:fillRef>
+            <a:effectRef idx="0">
+              <a:schemeClr val="accent1"/>
+            </a:effectRef>
+            <a:fontRef idx="minor">
+              <a:schemeClr val="tx1"/>
+            </a:fontRef>
+          </p:style>
+        </p:cxnSp>
+        <p:cxnSp>
+          <p:nvCxnSpPr>
+            <p:cNvPr id="62" name="Straight Arrow Connector 61">
+              <a:extLst>
+                <a:ext uri="{FF2B5EF4-FFF2-40B4-BE49-F238E27FC236}">
+                  <a16:creationId xmlns:a16="http://schemas.microsoft.com/office/drawing/2014/main" id="{98BF088E-82BB-48E2-B48C-D3A32F67900B}"/>
+                </a:ext>
+              </a:extLst>
+            </p:cNvPr>
+            <p:cNvCxnSpPr/>
+            <p:nvPr/>
+          </p:nvCxnSpPr>
+          <p:spPr>
+            <a:xfrm>
+              <a:off x="9731665" y="2078876"/>
+              <a:ext cx="0" cy="700042"/>
+            </a:xfrm>
+            <a:prstGeom prst="straightConnector1">
+              <a:avLst/>
+            </a:prstGeom>
+            <a:ln w="57150">
+              <a:solidFill>
+                <a:schemeClr val="tx1"/>
+              </a:solidFill>
+              <a:tailEnd type="triangle"/>
+            </a:ln>
+          </p:spPr>
+          <p:style>
+            <a:lnRef idx="1">
+              <a:schemeClr val="accent1"/>
+            </a:lnRef>
+            <a:fillRef idx="0">
+              <a:schemeClr val="accent1"/>
+            </a:fillRef>
+            <a:effectRef idx="0">
+              <a:schemeClr val="accent1"/>
+            </a:effectRef>
+            <a:fontRef idx="minor">
+              <a:schemeClr val="tx1"/>
+            </a:fontRef>
+          </p:style>
+        </p:cxnSp>
+        <p:cxnSp>
+          <p:nvCxnSpPr>
+            <p:cNvPr id="65" name="Straight Arrow Connector 64">
+              <a:extLst>
+                <a:ext uri="{FF2B5EF4-FFF2-40B4-BE49-F238E27FC236}">
+                  <a16:creationId xmlns:a16="http://schemas.microsoft.com/office/drawing/2014/main" id="{4965D3D2-1395-41AA-8475-03AAB87FA8F8}"/>
+                </a:ext>
+              </a:extLst>
+            </p:cNvPr>
+            <p:cNvCxnSpPr>
+              <a:stCxn id="47" idx="2"/>
+              <a:endCxn id="12" idx="0"/>
+            </p:cNvCxnSpPr>
+            <p:nvPr/>
+          </p:nvCxnSpPr>
+          <p:spPr>
+            <a:xfrm>
+              <a:off x="6878030" y="5337242"/>
+              <a:ext cx="0" cy="639949"/>
+            </a:xfrm>
+            <a:prstGeom prst="straightConnector1">
+              <a:avLst/>
+            </a:prstGeom>
+            <a:ln w="57150">
+              <a:solidFill>
+                <a:schemeClr val="tx1"/>
+              </a:solidFill>
+              <a:tailEnd type="triangle"/>
+            </a:ln>
+          </p:spPr>
+          <p:style>
+            <a:lnRef idx="1">
+              <a:schemeClr val="accent1"/>
+            </a:lnRef>
+            <a:fillRef idx="0">
+              <a:schemeClr val="accent1"/>
+            </a:fillRef>
+            <a:effectRef idx="0">
+              <a:schemeClr val="accent1"/>
+            </a:effectRef>
+            <a:fontRef idx="minor">
+              <a:schemeClr val="tx1"/>
+            </a:fontRef>
+          </p:style>
+        </p:cxnSp>
+        <p:cxnSp>
+          <p:nvCxnSpPr>
+            <p:cNvPr id="68" name="Straight Arrow Connector 67">
+              <a:extLst>
+                <a:ext uri="{FF2B5EF4-FFF2-40B4-BE49-F238E27FC236}">
+                  <a16:creationId xmlns:a16="http://schemas.microsoft.com/office/drawing/2014/main" id="{1EF946F1-6A66-4B77-A814-CD71F166BADB}"/>
+                </a:ext>
+              </a:extLst>
+            </p:cNvPr>
+            <p:cNvCxnSpPr>
+              <a:cxnSpLocks/>
+            </p:cNvCxnSpPr>
+            <p:nvPr/>
+          </p:nvCxnSpPr>
+          <p:spPr>
+            <a:xfrm flipH="1">
+              <a:off x="6878030" y="5626333"/>
+              <a:ext cx="2054959" cy="0"/>
+            </a:xfrm>
+            <a:prstGeom prst="straightConnector1">
+              <a:avLst/>
+            </a:prstGeom>
+            <a:ln w="57150">
+              <a:solidFill>
+                <a:schemeClr val="tx1"/>
+              </a:solidFill>
+              <a:tailEnd type="triangle"/>
+            </a:ln>
+          </p:spPr>
+          <p:style>
+            <a:lnRef idx="1">
+              <a:schemeClr val="accent1"/>
+            </a:lnRef>
+            <a:fillRef idx="0">
+              <a:schemeClr val="accent1"/>
+            </a:fillRef>
+            <a:effectRef idx="0">
+              <a:schemeClr val="accent1"/>
+            </a:effectRef>
+            <a:fontRef idx="minor">
+              <a:schemeClr val="tx1"/>
+            </a:fontRef>
+          </p:style>
+        </p:cxnSp>
+        <p:cxnSp>
+          <p:nvCxnSpPr>
+            <p:cNvPr id="72" name="Straight Connector 71">
+              <a:extLst>
+                <a:ext uri="{FF2B5EF4-FFF2-40B4-BE49-F238E27FC236}">
+                  <a16:creationId xmlns:a16="http://schemas.microsoft.com/office/drawing/2014/main" id="{1DD3FCC7-0CE7-453E-B02F-2DC6EB94BE8A}"/>
+                </a:ext>
+              </a:extLst>
+            </p:cNvPr>
+            <p:cNvCxnSpPr/>
+            <p:nvPr/>
+          </p:nvCxnSpPr>
+          <p:spPr>
+            <a:xfrm>
+              <a:off x="8922369" y="4654703"/>
+              <a:ext cx="0" cy="971630"/>
+            </a:xfrm>
+            <a:prstGeom prst="line">
+              <a:avLst/>
+            </a:prstGeom>
+            <a:ln w="57150">
+              <a:solidFill>
+                <a:schemeClr val="tx1"/>
+              </a:solidFill>
+            </a:ln>
+          </p:spPr>
+          <p:style>
+            <a:lnRef idx="1">
+              <a:schemeClr val="accent1"/>
+            </a:lnRef>
+            <a:fillRef idx="0">
+              <a:schemeClr val="accent1"/>
+            </a:fillRef>
+            <a:effectRef idx="0">
+              <a:schemeClr val="accent1"/>
+            </a:effectRef>
+            <a:fontRef idx="minor">
+              <a:schemeClr val="tx1"/>
+            </a:fontRef>
+          </p:style>
+        </p:cxnSp>
+        <p:cxnSp>
+          <p:nvCxnSpPr>
+            <p:cNvPr id="73" name="Straight Arrow Connector 72">
+              <a:extLst>
+                <a:ext uri="{FF2B5EF4-FFF2-40B4-BE49-F238E27FC236}">
+                  <a16:creationId xmlns:a16="http://schemas.microsoft.com/office/drawing/2014/main" id="{AEA4EBB5-9187-4147-9D3F-FA252E91157F}"/>
+                </a:ext>
+              </a:extLst>
+            </p:cNvPr>
+            <p:cNvCxnSpPr>
+              <a:cxnSpLocks/>
+            </p:cNvCxnSpPr>
+            <p:nvPr/>
+          </p:nvCxnSpPr>
+          <p:spPr>
+            <a:xfrm>
+              <a:off x="6860165" y="3026394"/>
+              <a:ext cx="1523246" cy="0"/>
+            </a:xfrm>
+            <a:prstGeom prst="straightConnector1">
+              <a:avLst/>
+            </a:prstGeom>
+            <a:ln w="19050">
+              <a:solidFill>
+                <a:schemeClr val="tx1"/>
+              </a:solidFill>
+              <a:tailEnd type="triangle"/>
+            </a:ln>
+          </p:spPr>
+          <p:style>
+            <a:lnRef idx="1">
+              <a:schemeClr val="accent1"/>
+            </a:lnRef>
+            <a:fillRef idx="0">
+              <a:schemeClr val="accent1"/>
+            </a:fillRef>
+            <a:effectRef idx="0">
+              <a:schemeClr val="accent1"/>
+            </a:effectRef>
+            <a:fontRef idx="minor">
+              <a:schemeClr val="tx1"/>
+            </a:fontRef>
+          </p:style>
+        </p:cxnSp>
+        <p:cxnSp>
+          <p:nvCxnSpPr>
+            <p:cNvPr id="79" name="Straight Connector 78">
+              <a:extLst>
+                <a:ext uri="{FF2B5EF4-FFF2-40B4-BE49-F238E27FC236}">
+                  <a16:creationId xmlns:a16="http://schemas.microsoft.com/office/drawing/2014/main" id="{0931AD5F-99AF-42C8-B490-DFF8FDC93D0C}"/>
+                </a:ext>
+              </a:extLst>
+            </p:cNvPr>
+            <p:cNvCxnSpPr>
+              <a:cxnSpLocks/>
+            </p:cNvCxnSpPr>
+            <p:nvPr/>
+          </p:nvCxnSpPr>
+          <p:spPr>
+            <a:xfrm>
+              <a:off x="4368604" y="3197034"/>
+              <a:ext cx="0" cy="359288"/>
+            </a:xfrm>
+            <a:prstGeom prst="line">
+              <a:avLst/>
+            </a:prstGeom>
+            <a:ln w="19050">
+              <a:solidFill>
+                <a:schemeClr val="tx1"/>
+              </a:solidFill>
+            </a:ln>
+          </p:spPr>
+          <p:style>
+            <a:lnRef idx="1">
+              <a:schemeClr val="accent1"/>
+            </a:lnRef>
+            <a:fillRef idx="0">
+              <a:schemeClr val="accent1"/>
+            </a:fillRef>
+            <a:effectRef idx="0">
+              <a:schemeClr val="accent1"/>
+            </a:effectRef>
+            <a:fontRef idx="minor">
+              <a:schemeClr val="tx1"/>
+            </a:fontRef>
+          </p:style>
+        </p:cxnSp>
+        <p:cxnSp>
+          <p:nvCxnSpPr>
+            <p:cNvPr id="81" name="Straight Arrow Connector 80">
+              <a:extLst>
+                <a:ext uri="{FF2B5EF4-FFF2-40B4-BE49-F238E27FC236}">
+                  <a16:creationId xmlns:a16="http://schemas.microsoft.com/office/drawing/2014/main" id="{9D4AD687-BD91-428F-B600-C779938FB226}"/>
+                </a:ext>
+              </a:extLst>
+            </p:cNvPr>
+            <p:cNvCxnSpPr>
+              <a:cxnSpLocks/>
+            </p:cNvCxnSpPr>
+            <p:nvPr/>
+          </p:nvCxnSpPr>
+          <p:spPr>
+            <a:xfrm>
+              <a:off x="4370106" y="3556322"/>
+              <a:ext cx="4013305" cy="0"/>
+            </a:xfrm>
+            <a:prstGeom prst="straightConnector1">
+              <a:avLst/>
+            </a:prstGeom>
+            <a:ln w="19050">
+              <a:solidFill>
+                <a:schemeClr val="tx1"/>
+              </a:solidFill>
+              <a:tailEnd type="triangle"/>
+            </a:ln>
+          </p:spPr>
+          <p:style>
+            <a:lnRef idx="1">
+              <a:schemeClr val="accent1"/>
+            </a:lnRef>
+            <a:fillRef idx="0">
+              <a:schemeClr val="accent1"/>
+            </a:fillRef>
+            <a:effectRef idx="0">
+              <a:schemeClr val="accent1"/>
+            </a:effectRef>
+            <a:fontRef idx="minor">
+              <a:schemeClr val="tx1"/>
+            </a:fontRef>
+          </p:style>
+        </p:cxnSp>
+        <p:cxnSp>
+          <p:nvCxnSpPr>
+            <p:cNvPr id="83" name="Straight Arrow Connector 82">
+              <a:extLst>
+                <a:ext uri="{FF2B5EF4-FFF2-40B4-BE49-F238E27FC236}">
+                  <a16:creationId xmlns:a16="http://schemas.microsoft.com/office/drawing/2014/main" id="{F38062AB-3426-468E-A20F-02D159FF5BE0}"/>
+                </a:ext>
+              </a:extLst>
+            </p:cNvPr>
+            <p:cNvCxnSpPr/>
+            <p:nvPr/>
+          </p:nvCxnSpPr>
+          <p:spPr>
+            <a:xfrm>
+              <a:off x="4361039" y="3496534"/>
+              <a:ext cx="1" cy="395220"/>
+            </a:xfrm>
+            <a:prstGeom prst="straightConnector1">
+              <a:avLst/>
+            </a:prstGeom>
+            <a:ln w="12700">
+              <a:solidFill>
+                <a:schemeClr val="bg2">
+                  <a:lumMod val="75000"/>
+                </a:schemeClr>
+              </a:solidFill>
+              <a:prstDash val="sysDash"/>
+              <a:tailEnd type="triangle"/>
+            </a:ln>
+          </p:spPr>
+          <p:style>
+            <a:lnRef idx="1">
+              <a:schemeClr val="accent1"/>
+            </a:lnRef>
+            <a:fillRef idx="0">
+              <a:schemeClr val="accent1"/>
+            </a:fillRef>
+            <a:effectRef idx="0">
+              <a:schemeClr val="accent1"/>
+            </a:effectRef>
+            <a:fontRef idx="minor">
+              <a:schemeClr val="tx1"/>
+            </a:fontRef>
+          </p:style>
+        </p:cxnSp>
+        <p:cxnSp>
+          <p:nvCxnSpPr>
+            <p:cNvPr id="84" name="Straight Arrow Connector 83">
+              <a:extLst>
+                <a:ext uri="{FF2B5EF4-FFF2-40B4-BE49-F238E27FC236}">
+                  <a16:creationId xmlns:a16="http://schemas.microsoft.com/office/drawing/2014/main" id="{A40F3762-1150-4392-9305-F7F771E78299}"/>
+                </a:ext>
+              </a:extLst>
+            </p:cNvPr>
+            <p:cNvCxnSpPr>
+              <a:cxnSpLocks/>
+              <a:stCxn id="42" idx="2"/>
+            </p:cNvCxnSpPr>
+            <p:nvPr/>
+          </p:nvCxnSpPr>
+          <p:spPr>
+            <a:xfrm flipH="1">
+              <a:off x="6878030" y="4284942"/>
+              <a:ext cx="1" cy="675752"/>
+            </a:xfrm>
+            <a:prstGeom prst="straightConnector1">
+              <a:avLst/>
+            </a:prstGeom>
+            <a:ln w="19050">
+              <a:solidFill>
+                <a:schemeClr val="tx1"/>
+              </a:solidFill>
+              <a:tailEnd type="triangle"/>
+            </a:ln>
+          </p:spPr>
+          <p:style>
+            <a:lnRef idx="1">
+              <a:schemeClr val="accent1"/>
+            </a:lnRef>
+            <a:fillRef idx="0">
+              <a:schemeClr val="accent1"/>
+            </a:fillRef>
+            <a:effectRef idx="0">
+              <a:schemeClr val="accent1"/>
+            </a:effectRef>
+            <a:fontRef idx="minor">
+              <a:schemeClr val="tx1"/>
+            </a:fontRef>
+          </p:style>
+        </p:cxnSp>
+        <p:cxnSp>
+          <p:nvCxnSpPr>
+            <p:cNvPr id="90" name="Straight Arrow Connector 89">
+              <a:extLst>
+                <a:ext uri="{FF2B5EF4-FFF2-40B4-BE49-F238E27FC236}">
+                  <a16:creationId xmlns:a16="http://schemas.microsoft.com/office/drawing/2014/main" id="{BB890F74-A463-4C40-A27B-35FB56527423}"/>
+                </a:ext>
+              </a:extLst>
+            </p:cNvPr>
+            <p:cNvCxnSpPr>
+              <a:cxnSpLocks/>
+            </p:cNvCxnSpPr>
+            <p:nvPr/>
+          </p:nvCxnSpPr>
+          <p:spPr>
+            <a:xfrm>
+              <a:off x="3825769" y="642525"/>
+              <a:ext cx="1" cy="1044412"/>
+            </a:xfrm>
+            <a:prstGeom prst="straightConnector1">
+              <a:avLst/>
+            </a:prstGeom>
+            <a:ln w="57150">
+              <a:solidFill>
+                <a:schemeClr val="tx1"/>
+              </a:solidFill>
+              <a:tailEnd type="triangle"/>
+            </a:ln>
+          </p:spPr>
+          <p:style>
+            <a:lnRef idx="1">
+              <a:schemeClr val="accent1"/>
+            </a:lnRef>
+            <a:fillRef idx="0">
+              <a:schemeClr val="accent1"/>
+            </a:fillRef>
+            <a:effectRef idx="0">
+              <a:schemeClr val="accent1"/>
+            </a:effectRef>
+            <a:fontRef idx="minor">
+              <a:schemeClr val="tx1"/>
+            </a:fontRef>
+          </p:style>
+        </p:cxnSp>
+        <p:cxnSp>
+          <p:nvCxnSpPr>
+            <p:cNvPr id="91" name="Straight Arrow Connector 90">
+              <a:extLst>
+                <a:ext uri="{FF2B5EF4-FFF2-40B4-BE49-F238E27FC236}">
+                  <a16:creationId xmlns:a16="http://schemas.microsoft.com/office/drawing/2014/main" id="{7E40E1B6-6876-41B9-90D2-E708A7BFB424}"/>
+                </a:ext>
+              </a:extLst>
+            </p:cNvPr>
+            <p:cNvCxnSpPr>
+              <a:cxnSpLocks/>
+            </p:cNvCxnSpPr>
+            <p:nvPr/>
+          </p:nvCxnSpPr>
+          <p:spPr>
+            <a:xfrm>
+              <a:off x="6750708" y="717553"/>
+              <a:ext cx="0" cy="991991"/>
+            </a:xfrm>
+            <a:prstGeom prst="straightConnector1">
+              <a:avLst/>
+            </a:prstGeom>
+            <a:ln w="57150">
+              <a:solidFill>
+                <a:schemeClr val="tx1"/>
+              </a:solidFill>
+              <a:tailEnd type="triangle"/>
+            </a:ln>
+          </p:spPr>
+          <p:style>
+            <a:lnRef idx="1">
+              <a:schemeClr val="accent1"/>
+            </a:lnRef>
+            <a:fillRef idx="0">
+              <a:schemeClr val="accent1"/>
+            </a:fillRef>
+            <a:effectRef idx="0">
+              <a:schemeClr val="accent1"/>
+            </a:effectRef>
+            <a:fontRef idx="minor">
+              <a:schemeClr val="tx1"/>
+            </a:fontRef>
+          </p:style>
+        </p:cxnSp>
+        <p:sp>
+          <p:nvSpPr>
+            <p:cNvPr id="5" name="TextBox 4">
+              <a:extLst>
+                <a:ext uri="{FF2B5EF4-FFF2-40B4-BE49-F238E27FC236}">
+                  <a16:creationId xmlns:a16="http://schemas.microsoft.com/office/drawing/2014/main" id="{FB7D1191-B076-4898-9B0F-3270A8A581F9}"/>
+                </a:ext>
+              </a:extLst>
+            </p:cNvPr>
+            <p:cNvSpPr txBox="1"/>
+            <p:nvPr/>
+          </p:nvSpPr>
+          <p:spPr>
+            <a:xfrm>
+              <a:off x="3487407" y="369890"/>
+              <a:ext cx="7621449" cy="369332"/>
+            </a:xfrm>
+            <a:prstGeom prst="rect">
+              <a:avLst/>
+            </a:prstGeom>
+            <a:solidFill>
+              <a:schemeClr val="accent2"/>
+            </a:solidFill>
+          </p:spPr>
+          <p:txBody>
+            <a:bodyPr wrap="square" rtlCol="0">
+              <a:spAutoFit/>
+            </a:bodyPr>
+            <a:lstStyle/>
+            <a:p>
+              <a:pPr algn="ctr"/>
+              <a:r>
+                <a:rPr lang="en-US" dirty="0"/>
+                <a:t>Maize Crop (Previous Year)</a:t>
+              </a:r>
+            </a:p>
+          </p:txBody>
+        </p:sp>
+        <p:cxnSp>
+          <p:nvCxnSpPr>
+            <p:cNvPr id="94" name="Straight Arrow Connector 93">
+              <a:extLst>
+                <a:ext uri="{FF2B5EF4-FFF2-40B4-BE49-F238E27FC236}">
+                  <a16:creationId xmlns:a16="http://schemas.microsoft.com/office/drawing/2014/main" id="{690588DE-30A4-4BEC-A610-E55B1803AB55}"/>
+                </a:ext>
+              </a:extLst>
+            </p:cNvPr>
+            <p:cNvCxnSpPr>
+              <a:cxnSpLocks/>
+              <a:endCxn id="12" idx="1"/>
+            </p:cNvCxnSpPr>
+            <p:nvPr/>
+          </p:nvCxnSpPr>
+          <p:spPr>
+            <a:xfrm flipV="1">
+              <a:off x="680036" y="6161857"/>
+              <a:ext cx="5572246" cy="5884"/>
+            </a:xfrm>
+            <a:prstGeom prst="straightConnector1">
+              <a:avLst/>
+            </a:prstGeom>
+            <a:ln w="12700">
+              <a:solidFill>
+                <a:schemeClr val="bg2">
+                  <a:lumMod val="75000"/>
+                </a:schemeClr>
+              </a:solidFill>
+              <a:prstDash val="sysDash"/>
+              <a:tailEnd type="triangle"/>
+            </a:ln>
+          </p:spPr>
+          <p:style>
+            <a:lnRef idx="1">
+              <a:schemeClr val="accent1"/>
+            </a:lnRef>
+            <a:fillRef idx="0">
+              <a:schemeClr val="accent1"/>
+            </a:fillRef>
+            <a:effectRef idx="0">
+              <a:schemeClr val="accent1"/>
+            </a:effectRef>
+            <a:fontRef idx="minor">
+              <a:schemeClr val="tx1"/>
+            </a:fontRef>
+          </p:style>
+        </p:cxnSp>
+        <p:cxnSp>
+          <p:nvCxnSpPr>
+            <p:cNvPr id="97" name="Straight Connector 96">
+              <a:extLst>
+                <a:ext uri="{FF2B5EF4-FFF2-40B4-BE49-F238E27FC236}">
+                  <a16:creationId xmlns:a16="http://schemas.microsoft.com/office/drawing/2014/main" id="{5A3131BE-2CCC-4F21-8B85-8FE573AA913C}"/>
+                </a:ext>
+              </a:extLst>
+            </p:cNvPr>
+            <p:cNvCxnSpPr>
+              <a:stCxn id="40" idx="2"/>
+            </p:cNvCxnSpPr>
+            <p:nvPr/>
+          </p:nvCxnSpPr>
+          <p:spPr>
+            <a:xfrm flipH="1">
+              <a:off x="737573" y="3197034"/>
+              <a:ext cx="1" cy="2973184"/>
+            </a:xfrm>
+            <a:prstGeom prst="line">
+              <a:avLst/>
+            </a:prstGeom>
+            <a:ln w="12700">
+              <a:solidFill>
+                <a:schemeClr val="bg2">
+                  <a:lumMod val="75000"/>
+                </a:schemeClr>
+              </a:solidFill>
+              <a:prstDash val="sysDash"/>
+            </a:ln>
+          </p:spPr>
+          <p:style>
+            <a:lnRef idx="1">
+              <a:schemeClr val="accent1"/>
+            </a:lnRef>
+            <a:fillRef idx="0">
+              <a:schemeClr val="accent1"/>
+            </a:fillRef>
+            <a:effectRef idx="0">
+              <a:schemeClr val="accent1"/>
+            </a:effectRef>
+            <a:fontRef idx="minor">
+              <a:schemeClr val="tx1"/>
+            </a:fontRef>
+          </p:style>
+        </p:cxnSp>
+        <p:cxnSp>
+          <p:nvCxnSpPr>
+            <p:cNvPr id="99" name="Straight Connector 98">
+              <a:extLst>
+                <a:ext uri="{FF2B5EF4-FFF2-40B4-BE49-F238E27FC236}">
+                  <a16:creationId xmlns:a16="http://schemas.microsoft.com/office/drawing/2014/main" id="{0421ADB1-7B54-4E34-9C80-9EF687584961}"/>
+                </a:ext>
+              </a:extLst>
+            </p:cNvPr>
+            <p:cNvCxnSpPr/>
+            <p:nvPr/>
+          </p:nvCxnSpPr>
+          <p:spPr>
+            <a:xfrm flipH="1">
+              <a:off x="2482458" y="3194556"/>
+              <a:ext cx="1" cy="2973184"/>
+            </a:xfrm>
+            <a:prstGeom prst="line">
+              <a:avLst/>
+            </a:prstGeom>
+            <a:ln w="12700">
+              <a:solidFill>
+                <a:schemeClr val="bg2">
+                  <a:lumMod val="75000"/>
+                </a:schemeClr>
+              </a:solidFill>
+              <a:prstDash val="sysDash"/>
+            </a:ln>
+          </p:spPr>
+          <p:style>
+            <a:lnRef idx="1">
+              <a:schemeClr val="accent1"/>
+            </a:lnRef>
+            <a:fillRef idx="0">
+              <a:schemeClr val="accent1"/>
+            </a:fillRef>
+            <a:effectRef idx="0">
+              <a:schemeClr val="accent1"/>
+            </a:effectRef>
+            <a:fontRef idx="minor">
+              <a:schemeClr val="tx1"/>
+            </a:fontRef>
+          </p:style>
+        </p:cxnSp>
+        <p:cxnSp>
+          <p:nvCxnSpPr>
+            <p:cNvPr id="100" name="Straight Arrow Connector 99">
+              <a:extLst>
+                <a:ext uri="{FF2B5EF4-FFF2-40B4-BE49-F238E27FC236}">
+                  <a16:creationId xmlns:a16="http://schemas.microsoft.com/office/drawing/2014/main" id="{E017AB7F-25DC-4D92-B58D-D77D92CA8150}"/>
+                </a:ext>
+              </a:extLst>
+            </p:cNvPr>
+            <p:cNvCxnSpPr>
+              <a:cxnSpLocks/>
+              <a:stCxn id="37" idx="3"/>
+              <a:endCxn id="42" idx="1"/>
+            </p:cNvCxnSpPr>
+            <p:nvPr/>
+          </p:nvCxnSpPr>
+          <p:spPr>
+            <a:xfrm>
+              <a:off x="5225646" y="4100276"/>
+              <a:ext cx="561233" cy="0"/>
+            </a:xfrm>
+            <a:prstGeom prst="straightConnector1">
+              <a:avLst/>
+            </a:prstGeom>
+            <a:ln w="19050">
+              <a:solidFill>
+                <a:schemeClr val="tx1"/>
+              </a:solidFill>
+              <a:tailEnd type="triangle"/>
+            </a:ln>
+          </p:spPr>
+          <p:style>
+            <a:lnRef idx="1">
+              <a:schemeClr val="accent1"/>
+            </a:lnRef>
+            <a:fillRef idx="0">
+              <a:schemeClr val="accent1"/>
+            </a:fillRef>
+            <a:effectRef idx="0">
+              <a:schemeClr val="accent1"/>
+            </a:effectRef>
+            <a:fontRef idx="minor">
+              <a:schemeClr val="tx1"/>
+            </a:fontRef>
+          </p:style>
+        </p:cxnSp>
+        <p:cxnSp>
+          <p:nvCxnSpPr>
+            <p:cNvPr id="103" name="Straight Connector 102">
+              <a:extLst>
+                <a:ext uri="{FF2B5EF4-FFF2-40B4-BE49-F238E27FC236}">
+                  <a16:creationId xmlns:a16="http://schemas.microsoft.com/office/drawing/2014/main" id="{C031D529-3B64-4D02-8D22-B111957738C3}"/>
+                </a:ext>
+              </a:extLst>
+            </p:cNvPr>
+            <p:cNvCxnSpPr>
+              <a:cxnSpLocks/>
+            </p:cNvCxnSpPr>
+            <p:nvPr/>
+          </p:nvCxnSpPr>
+          <p:spPr>
+            <a:xfrm flipH="1">
+              <a:off x="3975984" y="4976575"/>
+              <a:ext cx="1" cy="1191165"/>
+            </a:xfrm>
+            <a:prstGeom prst="line">
+              <a:avLst/>
+            </a:prstGeom>
+            <a:ln w="12700">
+              <a:solidFill>
+                <a:schemeClr val="bg2">
+                  <a:lumMod val="75000"/>
+                </a:schemeClr>
+              </a:solidFill>
+              <a:prstDash val="sysDash"/>
+            </a:ln>
+          </p:spPr>
+          <p:style>
+            <a:lnRef idx="1">
+              <a:schemeClr val="accent1"/>
+            </a:lnRef>
+            <a:fillRef idx="0">
+              <a:schemeClr val="accent1"/>
+            </a:fillRef>
+            <a:effectRef idx="0">
+              <a:schemeClr val="accent1"/>
+            </a:effectRef>
+            <a:fontRef idx="minor">
+              <a:schemeClr val="tx1"/>
+            </a:fontRef>
+          </p:style>
+        </p:cxnSp>
+        <p:sp>
+          <p:nvSpPr>
+            <p:cNvPr id="58" name="TextBox 57">
+              <a:extLst>
+                <a:ext uri="{FF2B5EF4-FFF2-40B4-BE49-F238E27FC236}">
+                  <a16:creationId xmlns:a16="http://schemas.microsoft.com/office/drawing/2014/main" id="{9C5D36EB-7B3E-4476-870C-F7C91DFDF3C2}"/>
+                </a:ext>
+              </a:extLst>
+            </p:cNvPr>
+            <p:cNvSpPr txBox="1"/>
+            <p:nvPr/>
+          </p:nvSpPr>
+          <p:spPr>
+            <a:xfrm>
+              <a:off x="3361289" y="4607243"/>
+              <a:ext cx="1637243" cy="369332"/>
+            </a:xfrm>
+            <a:prstGeom prst="rect">
+              <a:avLst/>
+            </a:prstGeom>
+            <a:solidFill>
+              <a:schemeClr val="bg2">
+                <a:lumMod val="40000"/>
+                <a:lumOff val="60000"/>
+              </a:schemeClr>
+            </a:solidFill>
+          </p:spPr>
+          <p:txBody>
+            <a:bodyPr wrap="none" rtlCol="0">
+              <a:spAutoFit/>
+            </a:bodyPr>
+            <a:lstStyle/>
+            <a:p>
+              <a:r>
+                <a:rPr lang="en-US" dirty="0"/>
+                <a:t>Emergence Day</a:t>
+              </a:r>
+            </a:p>
+          </p:txBody>
+        </p:sp>
+        <p:cxnSp>
+          <p:nvCxnSpPr>
+            <p:cNvPr id="60" name="Straight Arrow Connector 59">
+              <a:extLst>
+                <a:ext uri="{FF2B5EF4-FFF2-40B4-BE49-F238E27FC236}">
+                  <a16:creationId xmlns:a16="http://schemas.microsoft.com/office/drawing/2014/main" id="{6ADF7F4A-E999-4873-AED9-391655338804}"/>
+                </a:ext>
+              </a:extLst>
+            </p:cNvPr>
+            <p:cNvCxnSpPr>
+              <a:cxnSpLocks/>
+            </p:cNvCxnSpPr>
+            <p:nvPr/>
+          </p:nvCxnSpPr>
+          <p:spPr>
+            <a:xfrm>
+              <a:off x="3970632" y="4284942"/>
+              <a:ext cx="0" cy="334067"/>
+            </a:xfrm>
+            <a:prstGeom prst="straightConnector1">
+              <a:avLst/>
+            </a:prstGeom>
+            <a:ln w="12700">
+              <a:solidFill>
+                <a:schemeClr val="bg2">
+                  <a:lumMod val="75000"/>
+                </a:schemeClr>
+              </a:solidFill>
+              <a:prstDash val="sysDash"/>
+              <a:tailEnd type="triangle"/>
+            </a:ln>
+          </p:spPr>
+          <p:style>
+            <a:lnRef idx="1">
+              <a:schemeClr val="accent1"/>
+            </a:lnRef>
+            <a:fillRef idx="0">
+              <a:schemeClr val="accent1"/>
+            </a:fillRef>
+            <a:effectRef idx="0">
+              <a:schemeClr val="accent1"/>
+            </a:effectRef>
+            <a:fontRef idx="minor">
+              <a:schemeClr val="tx1"/>
+            </a:fontRef>
+          </p:style>
+        </p:cxnSp>
+        <p:cxnSp>
+          <p:nvCxnSpPr>
+            <p:cNvPr id="61" name="Straight Arrow Connector 60">
+              <a:extLst>
+                <a:ext uri="{FF2B5EF4-FFF2-40B4-BE49-F238E27FC236}">
+                  <a16:creationId xmlns:a16="http://schemas.microsoft.com/office/drawing/2014/main" id="{2F4B8D6B-6F34-4F20-8E8A-75225967EF40}"/>
+                </a:ext>
+              </a:extLst>
+            </p:cNvPr>
+            <p:cNvCxnSpPr>
+              <a:cxnSpLocks/>
+            </p:cNvCxnSpPr>
+            <p:nvPr/>
+          </p:nvCxnSpPr>
+          <p:spPr>
+            <a:xfrm>
+              <a:off x="10966237" y="717553"/>
+              <a:ext cx="0" cy="2056747"/>
+            </a:xfrm>
+            <a:prstGeom prst="straightConnector1">
+              <a:avLst/>
+            </a:prstGeom>
+            <a:ln w="57150">
+              <a:solidFill>
+                <a:schemeClr val="tx1"/>
+              </a:solidFill>
+              <a:tailEnd type="triangle"/>
+            </a:ln>
+          </p:spPr>
+          <p:style>
+            <a:lnRef idx="1">
+              <a:schemeClr val="accent1"/>
+            </a:lnRef>
+            <a:fillRef idx="0">
+              <a:schemeClr val="accent1"/>
+            </a:fillRef>
+            <a:effectRef idx="0">
+              <a:schemeClr val="accent1"/>
+            </a:effectRef>
+            <a:fontRef idx="minor">
+              <a:schemeClr val="tx1"/>
+            </a:fontRef>
+          </p:style>
+        </p:cxnSp>
+        <p:sp>
+          <p:nvSpPr>
+            <p:cNvPr id="2" name="Rectangle 1">
+              <a:extLst>
+                <a:ext uri="{FF2B5EF4-FFF2-40B4-BE49-F238E27FC236}">
+                  <a16:creationId xmlns:a16="http://schemas.microsoft.com/office/drawing/2014/main" id="{07BEBFF8-A687-48C4-937A-B4F2BE28ADA5}"/>
+                </a:ext>
+              </a:extLst>
+            </p:cNvPr>
+            <p:cNvSpPr/>
+            <p:nvPr/>
+          </p:nvSpPr>
+          <p:spPr>
+            <a:xfrm>
+              <a:off x="6421148" y="3481294"/>
+              <a:ext cx="128248" cy="145222"/>
+            </a:xfrm>
+            <a:prstGeom prst="rect">
+              <a:avLst/>
+            </a:prstGeom>
+            <a:solidFill>
+              <a:schemeClr val="bg1"/>
+            </a:solidFill>
+            <a:ln>
+              <a:noFill/>
+            </a:ln>
+          </p:spPr>
+          <p:style>
+            <a:lnRef idx="2">
+              <a:schemeClr val="accent1">
+                <a:shade val="50000"/>
+              </a:schemeClr>
+            </a:lnRef>
+            <a:fillRef idx="1">
+              <a:schemeClr val="accent1"/>
+            </a:fillRef>
+            <a:effectRef idx="0">
+              <a:schemeClr val="accent1"/>
+            </a:effectRef>
+            <a:fontRef idx="minor">
+              <a:schemeClr val="lt1"/>
+            </a:fontRef>
+          </p:style>
+          <p:txBody>
+            <a:bodyPr rtlCol="0" anchor="ctr"/>
+            <a:lstStyle/>
+            <a:p>
+              <a:pPr algn="ctr"/>
+              <a:endParaRPr lang="en-US"/>
+            </a:p>
+          </p:txBody>
+        </p:sp>
+        <p:cxnSp>
+          <p:nvCxnSpPr>
+            <p:cNvPr id="75" name="Straight Arrow Connector 74">
+              <a:extLst>
+                <a:ext uri="{FF2B5EF4-FFF2-40B4-BE49-F238E27FC236}">
+                  <a16:creationId xmlns:a16="http://schemas.microsoft.com/office/drawing/2014/main" id="{76A977F8-4785-4E1A-909E-0F43CCC64B80}"/>
+                </a:ext>
+              </a:extLst>
+            </p:cNvPr>
+            <p:cNvCxnSpPr>
+              <a:cxnSpLocks/>
+            </p:cNvCxnSpPr>
+            <p:nvPr/>
+          </p:nvCxnSpPr>
+          <p:spPr>
+            <a:xfrm>
+              <a:off x="6478536" y="3195795"/>
+              <a:ext cx="0" cy="721054"/>
+            </a:xfrm>
+            <a:prstGeom prst="straightConnector1">
+              <a:avLst/>
+            </a:prstGeom>
+            <a:ln w="19050">
+              <a:solidFill>
+                <a:schemeClr val="tx1"/>
+              </a:solidFill>
+              <a:tailEnd type="triangle"/>
+            </a:ln>
+          </p:spPr>
+          <p:style>
+            <a:lnRef idx="1">
+              <a:schemeClr val="accent1"/>
+            </a:lnRef>
+            <a:fillRef idx="0">
+              <a:schemeClr val="accent1"/>
+            </a:fillRef>
+            <a:effectRef idx="0">
+              <a:schemeClr val="accent1"/>
+            </a:effectRef>
+            <a:fontRef idx="minor">
+              <a:schemeClr val="tx1"/>
+            </a:fontRef>
+          </p:style>
+        </p:cxnSp>
+        <p:sp>
+          <p:nvSpPr>
+            <p:cNvPr id="63" name="Rectangle 62">
+              <a:extLst>
+                <a:ext uri="{FF2B5EF4-FFF2-40B4-BE49-F238E27FC236}">
+                  <a16:creationId xmlns:a16="http://schemas.microsoft.com/office/drawing/2014/main" id="{21470CFF-E20D-4C5C-9253-984492DFD85F}"/>
+                </a:ext>
+              </a:extLst>
+            </p:cNvPr>
+            <p:cNvSpPr/>
+            <p:nvPr/>
+          </p:nvSpPr>
+          <p:spPr>
+            <a:xfrm>
+              <a:off x="7040626" y="3463068"/>
+              <a:ext cx="128248" cy="145222"/>
+            </a:xfrm>
+            <a:prstGeom prst="rect">
+              <a:avLst/>
+            </a:prstGeom>
+            <a:solidFill>
+              <a:schemeClr val="bg1"/>
+            </a:solidFill>
+            <a:ln>
+              <a:noFill/>
+            </a:ln>
+          </p:spPr>
+          <p:style>
+            <a:lnRef idx="2">
+              <a:schemeClr val="accent1">
+                <a:shade val="50000"/>
+              </a:schemeClr>
+            </a:lnRef>
+            <a:fillRef idx="1">
+              <a:schemeClr val="accent1"/>
+            </a:fillRef>
+            <a:effectRef idx="0">
+              <a:schemeClr val="accent1"/>
+            </a:effectRef>
+            <a:fontRef idx="minor">
+              <a:schemeClr val="lt1"/>
+            </a:fontRef>
+          </p:style>
+          <p:txBody>
+            <a:bodyPr rtlCol="0" anchor="ctr"/>
+            <a:lstStyle/>
+            <a:p>
+              <a:pPr algn="ctr"/>
+              <a:endParaRPr lang="en-US"/>
+            </a:p>
+          </p:txBody>
+        </p:sp>
+        <p:sp>
+          <p:nvSpPr>
+            <p:cNvPr id="64" name="Rectangle 63">
+              <a:extLst>
+                <a:ext uri="{FF2B5EF4-FFF2-40B4-BE49-F238E27FC236}">
+                  <a16:creationId xmlns:a16="http://schemas.microsoft.com/office/drawing/2014/main" id="{5E85C8EC-A4EB-405D-8B99-89A65282CA04}"/>
+                </a:ext>
+              </a:extLst>
+            </p:cNvPr>
+            <p:cNvSpPr/>
+            <p:nvPr/>
+          </p:nvSpPr>
+          <p:spPr>
+            <a:xfrm>
+              <a:off x="7042106" y="2967394"/>
+              <a:ext cx="128248" cy="145222"/>
+            </a:xfrm>
+            <a:prstGeom prst="rect">
+              <a:avLst/>
+            </a:prstGeom>
+            <a:solidFill>
+              <a:schemeClr val="bg1"/>
+            </a:solidFill>
+            <a:ln>
+              <a:noFill/>
+            </a:ln>
+          </p:spPr>
+          <p:style>
+            <a:lnRef idx="2">
+              <a:schemeClr val="accent1">
+                <a:shade val="50000"/>
+              </a:schemeClr>
+            </a:lnRef>
+            <a:fillRef idx="1">
+              <a:schemeClr val="accent1"/>
+            </a:fillRef>
+            <a:effectRef idx="0">
+              <a:schemeClr val="accent1"/>
+            </a:effectRef>
+            <a:fontRef idx="minor">
+              <a:schemeClr val="lt1"/>
+            </a:fontRef>
+          </p:style>
+          <p:txBody>
+            <a:bodyPr rtlCol="0" anchor="ctr"/>
+            <a:lstStyle/>
+            <a:p>
+              <a:pPr algn="ctr"/>
+              <a:endParaRPr lang="en-US"/>
+            </a:p>
+          </p:txBody>
+        </p:sp>
+        <p:cxnSp>
+          <p:nvCxnSpPr>
+            <p:cNvPr id="55" name="Straight Arrow Connector 54">
+              <a:extLst>
+                <a:ext uri="{FF2B5EF4-FFF2-40B4-BE49-F238E27FC236}">
+                  <a16:creationId xmlns:a16="http://schemas.microsoft.com/office/drawing/2014/main" id="{5D8D7D46-2A1D-45AD-B6A1-5746E33716E6}"/>
+                </a:ext>
+              </a:extLst>
+            </p:cNvPr>
+            <p:cNvCxnSpPr>
+              <a:cxnSpLocks/>
+            </p:cNvCxnSpPr>
+            <p:nvPr/>
+          </p:nvCxnSpPr>
+          <p:spPr>
+            <a:xfrm flipH="1">
+              <a:off x="7105291" y="2056879"/>
+              <a:ext cx="2" cy="1832263"/>
+            </a:xfrm>
+            <a:prstGeom prst="straightConnector1">
+              <a:avLst/>
+            </a:prstGeom>
+            <a:ln w="19050">
+              <a:solidFill>
+                <a:schemeClr val="tx1"/>
+              </a:solidFill>
+              <a:tailEnd type="triangle"/>
+            </a:ln>
+          </p:spPr>
+          <p:style>
+            <a:lnRef idx="1">
+              <a:schemeClr val="accent1"/>
+            </a:lnRef>
+            <a:fillRef idx="0">
+              <a:schemeClr val="accent1"/>
+            </a:fillRef>
+            <a:effectRef idx="0">
+              <a:schemeClr val="accent1"/>
+            </a:effectRef>
+            <a:fontRef idx="minor">
+              <a:schemeClr val="tx1"/>
+            </a:fontRef>
+          </p:style>
+        </p:cxnSp>
+        <p:cxnSp>
+          <p:nvCxnSpPr>
+            <p:cNvPr id="66" name="Straight Arrow Connector 65">
+              <a:extLst>
+                <a:ext uri="{FF2B5EF4-FFF2-40B4-BE49-F238E27FC236}">
+                  <a16:creationId xmlns:a16="http://schemas.microsoft.com/office/drawing/2014/main" id="{F38062AB-3426-468E-A20F-02D159FF5BE0}"/>
+                </a:ext>
+              </a:extLst>
+            </p:cNvPr>
+            <p:cNvCxnSpPr/>
+            <p:nvPr/>
+          </p:nvCxnSpPr>
+          <p:spPr>
+            <a:xfrm>
+              <a:off x="6044901" y="3564340"/>
+              <a:ext cx="1" cy="351270"/>
+            </a:xfrm>
+            <a:prstGeom prst="straightConnector1">
+              <a:avLst/>
+            </a:prstGeom>
+            <a:ln w="19050">
+              <a:solidFill>
+                <a:schemeClr val="tx1"/>
+              </a:solidFill>
+              <a:tailEnd type="triangle"/>
+            </a:ln>
+          </p:spPr>
+          <p:style>
+            <a:lnRef idx="1">
+              <a:schemeClr val="accent1"/>
+            </a:lnRef>
+            <a:fillRef idx="0">
+              <a:schemeClr val="accent1"/>
+            </a:fillRef>
+            <a:effectRef idx="0">
+              <a:schemeClr val="accent1"/>
+            </a:effectRef>
+            <a:fontRef idx="minor">
+              <a:schemeClr val="tx1"/>
+            </a:fontRef>
+          </p:style>
+        </p:cxnSp>
+        <p:sp>
+          <p:nvSpPr>
+            <p:cNvPr id="69" name="Rectangle 68">
+              <a:extLst>
+                <a:ext uri="{FF2B5EF4-FFF2-40B4-BE49-F238E27FC236}">
+                  <a16:creationId xmlns:a16="http://schemas.microsoft.com/office/drawing/2014/main" id="{98EF623B-F444-4230-8E70-281038687623}"/>
+                </a:ext>
+              </a:extLst>
+            </p:cNvPr>
+            <p:cNvSpPr/>
+            <p:nvPr/>
+          </p:nvSpPr>
+          <p:spPr>
+            <a:xfrm>
+              <a:off x="4941043" y="3500922"/>
+              <a:ext cx="128248" cy="145222"/>
+            </a:xfrm>
+            <a:prstGeom prst="rect">
+              <a:avLst/>
+            </a:prstGeom>
+            <a:solidFill>
+              <a:schemeClr val="bg1"/>
+            </a:solidFill>
+            <a:ln>
+              <a:noFill/>
+            </a:ln>
+          </p:spPr>
+          <p:style>
+            <a:lnRef idx="2">
+              <a:schemeClr val="accent1">
+                <a:shade val="50000"/>
+              </a:schemeClr>
+            </a:lnRef>
+            <a:fillRef idx="1">
+              <a:schemeClr val="accent1"/>
+            </a:fillRef>
+            <a:effectRef idx="0">
+              <a:schemeClr val="accent1"/>
+            </a:effectRef>
+            <a:fontRef idx="minor">
+              <a:schemeClr val="lt1"/>
+            </a:fontRef>
+          </p:style>
+          <p:txBody>
+            <a:bodyPr rtlCol="0" anchor="ctr"/>
+            <a:lstStyle/>
+            <a:p>
+              <a:pPr algn="ctr"/>
+              <a:endParaRPr lang="en-US"/>
+            </a:p>
+          </p:txBody>
+        </p:sp>
+        <p:cxnSp>
+          <p:nvCxnSpPr>
+            <p:cNvPr id="67" name="Straight Arrow Connector 66">
+              <a:extLst>
+                <a:ext uri="{FF2B5EF4-FFF2-40B4-BE49-F238E27FC236}">
+                  <a16:creationId xmlns:a16="http://schemas.microsoft.com/office/drawing/2014/main" id="{76A977F8-4785-4E1A-909E-0F43CCC64B80}"/>
+                </a:ext>
+              </a:extLst>
+            </p:cNvPr>
+            <p:cNvCxnSpPr>
+              <a:cxnSpLocks/>
+            </p:cNvCxnSpPr>
+            <p:nvPr/>
+          </p:nvCxnSpPr>
+          <p:spPr>
+            <a:xfrm>
+              <a:off x="5011715" y="3376678"/>
+              <a:ext cx="0" cy="538932"/>
+            </a:xfrm>
+            <a:prstGeom prst="straightConnector1">
+              <a:avLst/>
+            </a:prstGeom>
+            <a:ln w="19050">
+              <a:solidFill>
+                <a:schemeClr val="tx1"/>
+              </a:solidFill>
+              <a:tailEnd type="triangle"/>
+            </a:ln>
+          </p:spPr>
+          <p:style>
+            <a:lnRef idx="1">
+              <a:schemeClr val="accent1"/>
+            </a:lnRef>
+            <a:fillRef idx="0">
+              <a:schemeClr val="accent1"/>
+            </a:fillRef>
+            <a:effectRef idx="0">
+              <a:schemeClr val="accent1"/>
+            </a:effectRef>
+            <a:fontRef idx="minor">
+              <a:schemeClr val="tx1"/>
+            </a:fontRef>
+          </p:style>
+        </p:cxnSp>
+        <p:cxnSp>
+          <p:nvCxnSpPr>
+            <p:cNvPr id="70" name="Straight Connector 69">
+              <a:extLst>
+                <a:ext uri="{FF2B5EF4-FFF2-40B4-BE49-F238E27FC236}">
+                  <a16:creationId xmlns:a16="http://schemas.microsoft.com/office/drawing/2014/main" id="{27D25462-1569-46E6-BE3A-49EB120D35BA}"/>
+                </a:ext>
+              </a:extLst>
+            </p:cNvPr>
+            <p:cNvCxnSpPr>
+              <a:cxnSpLocks/>
+            </p:cNvCxnSpPr>
+            <p:nvPr/>
+          </p:nvCxnSpPr>
+          <p:spPr>
+            <a:xfrm>
+              <a:off x="5011188" y="3382060"/>
+              <a:ext cx="1470181" cy="0"/>
+            </a:xfrm>
+            <a:prstGeom prst="line">
+              <a:avLst/>
+            </a:prstGeom>
+            <a:ln w="19050">
+              <a:solidFill>
+                <a:schemeClr val="tx1"/>
+              </a:solidFill>
+            </a:ln>
+          </p:spPr>
+          <p:style>
+            <a:lnRef idx="1">
+              <a:schemeClr val="accent1"/>
+            </a:lnRef>
+            <a:fillRef idx="0">
+              <a:schemeClr val="accent1"/>
+            </a:fillRef>
+            <a:effectRef idx="0">
+              <a:schemeClr val="accent1"/>
+            </a:effectRef>
+            <a:fontRef idx="minor">
+              <a:schemeClr val="tx1"/>
+            </a:fontRef>
+          </p:style>
+        </p:cxnSp>
+      </p:grpSp>
+    </p:spTree>
+    <p:extLst>
+      <p:ext uri="{BB962C8B-B14F-4D97-AF65-F5344CB8AC3E}">
+        <p14:creationId xmlns:p14="http://schemas.microsoft.com/office/powerpoint/2010/main" val="1042881156"/>
+      </p:ext>
+    </p:extLst>
+  </p:cSld>
+  <p:clrMapOvr>
+    <a:masterClrMapping/>
+  </p:clrMapOvr>
+</p:sld>
+</file>
+
+<file path=ppt/slides/slide5.xml><?xml version="1.0" encoding="utf-8"?>
+<p:sld xmlns:a="http://schemas.openxmlformats.org/drawingml/2006/main" xmlns:r="http://schemas.openxmlformats.org/officeDocument/2006/relationships" xmlns:p="http://schemas.openxmlformats.org/presentationml/2006/main">
+  <p:cSld>
+    <p:spTree>
+      <p:nvGrpSpPr>
+        <p:cNvPr id="1" name=""/>
+        <p:cNvGrpSpPr/>
+        <p:nvPr/>
+      </p:nvGrpSpPr>
+      <p:grpSpPr>
+        <a:xfrm>
+          <a:off x="0" y="0"/>
+          <a:ext cx="0" cy="0"/>
+          <a:chOff x="0" y="0"/>
+          <a:chExt cx="0" cy="0"/>
+        </a:xfrm>
+      </p:grpSpPr>
+      <p:grpSp>
+        <p:nvGrpSpPr>
           <p:cNvPr id="24" name="Group 23">
             <a:extLst>
               <a:ext uri="{FF2B5EF4-FFF2-40B4-BE49-F238E27FC236}">

</xml_diff>